<commit_message>
added the base for the slide taking from the lesson plan but will need to update and expand and update the lesson plan.
</commit_message>
<xml_diff>
--- a/Counter_Malign_Information/4-Implement-For_Instructors/Lesson_Plans/Lesson_05-Identify_Malign_Information/Audio_Visual-Identify_Misinformation/Instructor-Lesson_Slide-Identify_Misinformation.pptx
+++ b/Counter_Malign_Information/4-Implement-For_Instructors/Lesson_Plans/Lesson_05-Identify_Malign_Information/Audio_Visual-Identify_Misinformation/Instructor-Lesson_Slide-Identify_Misinformation.pptx
@@ -6,16 +6,26 @@
     <p:sldMasterId id="2147483675" r:id="rId2"/>
   </p:sldMasterIdLst>
   <p:notesMasterIdLst>
-    <p:notesMasterId r:id="rId10"/>
+    <p:notesMasterId r:id="rId20"/>
   </p:notesMasterIdLst>
   <p:sldIdLst>
     <p:sldId id="620" r:id="rId3"/>
-    <p:sldId id="621" r:id="rId4"/>
-    <p:sldId id="383" r:id="rId5"/>
-    <p:sldId id="269" r:id="rId6"/>
-    <p:sldId id="270" r:id="rId7"/>
-    <p:sldId id="271" r:id="rId8"/>
-    <p:sldId id="272" r:id="rId9"/>
+    <p:sldId id="383" r:id="rId4"/>
+    <p:sldId id="621" r:id="rId5"/>
+    <p:sldId id="622" r:id="rId6"/>
+    <p:sldId id="623" r:id="rId7"/>
+    <p:sldId id="626" r:id="rId8"/>
+    <p:sldId id="625" r:id="rId9"/>
+    <p:sldId id="627" r:id="rId10"/>
+    <p:sldId id="628" r:id="rId11"/>
+    <p:sldId id="630" r:id="rId12"/>
+    <p:sldId id="631" r:id="rId13"/>
+    <p:sldId id="629" r:id="rId14"/>
+    <p:sldId id="624" r:id="rId15"/>
+    <p:sldId id="269" r:id="rId16"/>
+    <p:sldId id="270" r:id="rId17"/>
+    <p:sldId id="271" r:id="rId18"/>
+    <p:sldId id="272" r:id="rId19"/>
   </p:sldIdLst>
   <p:sldSz cx="12192000" cy="6858000"/>
   <p:notesSz cx="6858000" cy="9144000"/>
@@ -750,7 +760,7 @@
                 </a:solidFill>
                 <a:latin typeface="Times New Roman"/>
               </a:rPr>
-              <a:t>2</a:t>
+              <a:t>3</a:t>
             </a:fld>
             <a:endParaRPr lang="en-US" sz="1400" b="0" strike="noStrike" spc="-1">
               <a:solidFill>
@@ -765,6 +775,1573 @@
     <p:extLst>
       <p:ext uri="{BB962C8B-B14F-4D97-AF65-F5344CB8AC3E}">
         <p14:creationId xmlns:p14="http://schemas.microsoft.com/office/powerpoint/2010/main" val="2282271852"/>
+      </p:ext>
+    </p:extLst>
+  </p:cSld>
+  <p:clrMapOvr>
+    <a:masterClrMapping/>
+  </p:clrMapOvr>
+</p:notes>
+</file>
+
+<file path=ppt/notesSlides/notesSlide3.xml><?xml version="1.0" encoding="utf-8"?>
+<p:notes xmlns:a="http://schemas.openxmlformats.org/drawingml/2006/main" xmlns:r="http://schemas.openxmlformats.org/officeDocument/2006/relationships" xmlns:p="http://schemas.openxmlformats.org/presentationml/2006/main">
+  <p:cSld>
+    <p:spTree>
+      <p:nvGrpSpPr>
+        <p:cNvPr id="1" name=""/>
+        <p:cNvGrpSpPr/>
+        <p:nvPr/>
+      </p:nvGrpSpPr>
+      <p:grpSpPr>
+        <a:xfrm>
+          <a:off x="0" y="0"/>
+          <a:ext cx="0" cy="0"/>
+          <a:chOff x="0" y="0"/>
+          <a:chExt cx="0" cy="0"/>
+        </a:xfrm>
+      </p:grpSpPr>
+      <p:sp>
+        <p:nvSpPr>
+          <p:cNvPr id="2" name="Slide Image Placeholder 1"/>
+          <p:cNvSpPr>
+            <a:spLocks noGrp="1" noRot="1" noChangeAspect="1"/>
+          </p:cNvSpPr>
+          <p:nvPr>
+            <p:ph type="sldImg"/>
+          </p:nvPr>
+        </p:nvSpPr>
+        <p:spPr>
+          <a:xfrm>
+            <a:off x="382588" y="695325"/>
+            <a:ext cx="6092825" cy="3427413"/>
+          </a:xfrm>
+        </p:spPr>
+      </p:sp>
+      <p:sp>
+        <p:nvSpPr>
+          <p:cNvPr id="3" name="Notes Placeholder 2"/>
+          <p:cNvSpPr>
+            <a:spLocks noGrp="1"/>
+          </p:cNvSpPr>
+          <p:nvPr>
+            <p:ph type="body" idx="1"/>
+          </p:nvPr>
+        </p:nvSpPr>
+        <p:spPr/>
+        <p:txBody>
+          <a:bodyPr/>
+          <a:lstStyle/>
+          <a:p>
+            <a:r>
+              <a:rPr lang="en-US" dirty="0"/>
+              <a:t>1. Present examples of different motives, opportunities, and means in influence operations:</a:t>
+            </a:r>
+          </a:p>
+          <a:p>
+            <a:r>
+              <a:rPr lang="en-US" dirty="0"/>
+              <a:t>    - Example: Political gains from spreading false allegation about rival.</a:t>
+            </a:r>
+          </a:p>
+          <a:p>
+            <a:r>
+              <a:rPr lang="en-US" dirty="0"/>
+              <a:t>    - Example: Using social media channels to disseminate false information.</a:t>
+            </a:r>
+          </a:p>
+          <a:p>
+            <a:r>
+              <a:rPr lang="en-US" dirty="0"/>
+              <a:t>2. Discuss how to assess these components in various scenarios:</a:t>
+            </a:r>
+          </a:p>
+          <a:p>
+            <a:r>
+              <a:rPr lang="en-US" dirty="0"/>
+              <a:t>    - Identify the goals and motives behind the information.</a:t>
+            </a:r>
+          </a:p>
+          <a:p>
+            <a:r>
+              <a:rPr lang="en-US" dirty="0"/>
+              <a:t>    - Evaluate the channels available for spreading misinformation.</a:t>
+            </a:r>
+          </a:p>
+          <a:p>
+            <a:r>
+              <a:rPr lang="en-US" dirty="0"/>
+              <a:t>    - Assess the risks and costs involved in the deception.</a:t>
+            </a:r>
+          </a:p>
+          <a:p>
+            <a:endParaRPr lang="en-US" dirty="0"/>
+          </a:p>
+        </p:txBody>
+      </p:sp>
+      <p:sp>
+        <p:nvSpPr>
+          <p:cNvPr id="4" name="Slide Number Placeholder 3"/>
+          <p:cNvSpPr>
+            <a:spLocks noGrp="1"/>
+          </p:cNvSpPr>
+          <p:nvPr>
+            <p:ph type="sldNum" idx="8"/>
+          </p:nvPr>
+        </p:nvSpPr>
+        <p:spPr/>
+        <p:txBody>
+          <a:bodyPr/>
+          <a:lstStyle/>
+          <a:p>
+            <a:pPr indent="0" algn="r">
+              <a:buNone/>
+            </a:pPr>
+            <a:fld id="{96D071C0-0F6A-4E5C-B3E5-B824FE66220F}" type="slidenum">
+              <a:rPr lang="en-US" sz="1400" b="0" strike="noStrike" spc="-1" smtClean="0">
+                <a:solidFill>
+                  <a:srgbClr val="000000"/>
+                </a:solidFill>
+                <a:latin typeface="Times New Roman"/>
+              </a:rPr>
+              <a:t>5</a:t>
+            </a:fld>
+            <a:endParaRPr lang="en-US" sz="1400" b="0" strike="noStrike" spc="-1">
+              <a:solidFill>
+                <a:srgbClr val="000000"/>
+              </a:solidFill>
+              <a:latin typeface="Times New Roman"/>
+            </a:endParaRPr>
+          </a:p>
+        </p:txBody>
+      </p:sp>
+    </p:spTree>
+    <p:extLst>
+      <p:ext uri="{BB962C8B-B14F-4D97-AF65-F5344CB8AC3E}">
+        <p14:creationId xmlns:p14="http://schemas.microsoft.com/office/powerpoint/2010/main" val="2244748498"/>
+      </p:ext>
+    </p:extLst>
+  </p:cSld>
+  <p:clrMapOvr>
+    <a:masterClrMapping/>
+  </p:clrMapOvr>
+</p:notes>
+</file>
+
+<file path=ppt/notesSlides/notesSlide4.xml><?xml version="1.0" encoding="utf-8"?>
+<p:notes xmlns:a="http://schemas.openxmlformats.org/drawingml/2006/main" xmlns:r="http://schemas.openxmlformats.org/officeDocument/2006/relationships" xmlns:p="http://schemas.openxmlformats.org/presentationml/2006/main">
+  <p:cSld>
+    <p:spTree>
+      <p:nvGrpSpPr>
+        <p:cNvPr id="1" name=""/>
+        <p:cNvGrpSpPr/>
+        <p:nvPr/>
+      </p:nvGrpSpPr>
+      <p:grpSpPr>
+        <a:xfrm>
+          <a:off x="0" y="0"/>
+          <a:ext cx="0" cy="0"/>
+          <a:chOff x="0" y="0"/>
+          <a:chExt cx="0" cy="0"/>
+        </a:xfrm>
+      </p:grpSpPr>
+      <p:sp>
+        <p:nvSpPr>
+          <p:cNvPr id="2" name="Slide Image Placeholder 1"/>
+          <p:cNvSpPr>
+            <a:spLocks noGrp="1" noRot="1" noChangeAspect="1"/>
+          </p:cNvSpPr>
+          <p:nvPr>
+            <p:ph type="sldImg"/>
+          </p:nvPr>
+        </p:nvSpPr>
+        <p:spPr>
+          <a:xfrm>
+            <a:off x="382588" y="695325"/>
+            <a:ext cx="6092825" cy="3427413"/>
+          </a:xfrm>
+        </p:spPr>
+      </p:sp>
+      <p:sp>
+        <p:nvSpPr>
+          <p:cNvPr id="3" name="Notes Placeholder 2"/>
+          <p:cNvSpPr>
+            <a:spLocks noGrp="1"/>
+          </p:cNvSpPr>
+          <p:nvPr>
+            <p:ph type="body" idx="1"/>
+          </p:nvPr>
+        </p:nvSpPr>
+        <p:spPr/>
+        <p:txBody>
+          <a:bodyPr/>
+          <a:lstStyle/>
+          <a:p>
+            <a:r>
+              <a:rPr lang="en-US" dirty="0"/>
+              <a:t>1. Present examples of different motives, opportunities, and means in influence operations:</a:t>
+            </a:r>
+          </a:p>
+          <a:p>
+            <a:r>
+              <a:rPr lang="en-US" dirty="0"/>
+              <a:t>    - Example: Political gains from spreading false allegation about rival.</a:t>
+            </a:r>
+          </a:p>
+          <a:p>
+            <a:r>
+              <a:rPr lang="en-US" dirty="0"/>
+              <a:t>    - Example: Using social media channels to disseminate false information.</a:t>
+            </a:r>
+          </a:p>
+          <a:p>
+            <a:r>
+              <a:rPr lang="en-US" dirty="0"/>
+              <a:t>2. Discuss how to assess these components in various scenarios:</a:t>
+            </a:r>
+          </a:p>
+          <a:p>
+            <a:r>
+              <a:rPr lang="en-US" dirty="0"/>
+              <a:t>    - Identify the goals and motives behind the information.</a:t>
+            </a:r>
+          </a:p>
+          <a:p>
+            <a:r>
+              <a:rPr lang="en-US" dirty="0"/>
+              <a:t>    - Evaluate the channels available for spreading misinformation.</a:t>
+            </a:r>
+          </a:p>
+          <a:p>
+            <a:r>
+              <a:rPr lang="en-US" dirty="0"/>
+              <a:t>    - Assess the risks and costs involved in the deception.</a:t>
+            </a:r>
+          </a:p>
+          <a:p>
+            <a:endParaRPr lang="en-US" dirty="0"/>
+          </a:p>
+        </p:txBody>
+      </p:sp>
+      <p:sp>
+        <p:nvSpPr>
+          <p:cNvPr id="4" name="Slide Number Placeholder 3"/>
+          <p:cNvSpPr>
+            <a:spLocks noGrp="1"/>
+          </p:cNvSpPr>
+          <p:nvPr>
+            <p:ph type="sldNum" idx="8"/>
+          </p:nvPr>
+        </p:nvSpPr>
+        <p:spPr/>
+        <p:txBody>
+          <a:bodyPr/>
+          <a:lstStyle/>
+          <a:p>
+            <a:pPr indent="0" algn="r">
+              <a:buNone/>
+            </a:pPr>
+            <a:fld id="{96D071C0-0F6A-4E5C-B3E5-B824FE66220F}" type="slidenum">
+              <a:rPr lang="en-US" sz="1400" b="0" strike="noStrike" spc="-1" smtClean="0">
+                <a:solidFill>
+                  <a:srgbClr val="000000"/>
+                </a:solidFill>
+                <a:latin typeface="Times New Roman"/>
+              </a:rPr>
+              <a:t>6</a:t>
+            </a:fld>
+            <a:endParaRPr lang="en-US" sz="1400" b="0" strike="noStrike" spc="-1">
+              <a:solidFill>
+                <a:srgbClr val="000000"/>
+              </a:solidFill>
+              <a:latin typeface="Times New Roman"/>
+            </a:endParaRPr>
+          </a:p>
+        </p:txBody>
+      </p:sp>
+    </p:spTree>
+    <p:extLst>
+      <p:ext uri="{BB962C8B-B14F-4D97-AF65-F5344CB8AC3E}">
+        <p14:creationId xmlns:p14="http://schemas.microsoft.com/office/powerpoint/2010/main" val="1751720323"/>
+      </p:ext>
+    </p:extLst>
+  </p:cSld>
+  <p:clrMapOvr>
+    <a:masterClrMapping/>
+  </p:clrMapOvr>
+</p:notes>
+</file>
+
+<file path=ppt/notesSlides/notesSlide5.xml><?xml version="1.0" encoding="utf-8"?>
+<p:notes xmlns:a="http://schemas.openxmlformats.org/drawingml/2006/main" xmlns:r="http://schemas.openxmlformats.org/officeDocument/2006/relationships" xmlns:p="http://schemas.openxmlformats.org/presentationml/2006/main">
+  <p:cSld>
+    <p:spTree>
+      <p:nvGrpSpPr>
+        <p:cNvPr id="1" name=""/>
+        <p:cNvGrpSpPr/>
+        <p:nvPr/>
+      </p:nvGrpSpPr>
+      <p:grpSpPr>
+        <a:xfrm>
+          <a:off x="0" y="0"/>
+          <a:ext cx="0" cy="0"/>
+          <a:chOff x="0" y="0"/>
+          <a:chExt cx="0" cy="0"/>
+        </a:xfrm>
+      </p:grpSpPr>
+      <p:sp>
+        <p:nvSpPr>
+          <p:cNvPr id="2" name="Slide Image Placeholder 1"/>
+          <p:cNvSpPr>
+            <a:spLocks noGrp="1" noRot="1" noChangeAspect="1"/>
+          </p:cNvSpPr>
+          <p:nvPr>
+            <p:ph type="sldImg"/>
+          </p:nvPr>
+        </p:nvSpPr>
+        <p:spPr>
+          <a:xfrm>
+            <a:off x="382588" y="695325"/>
+            <a:ext cx="6092825" cy="3427413"/>
+          </a:xfrm>
+        </p:spPr>
+      </p:sp>
+      <p:sp>
+        <p:nvSpPr>
+          <p:cNvPr id="3" name="Notes Placeholder 2"/>
+          <p:cNvSpPr>
+            <a:spLocks noGrp="1"/>
+          </p:cNvSpPr>
+          <p:nvPr>
+            <p:ph type="body" idx="1"/>
+          </p:nvPr>
+        </p:nvSpPr>
+        <p:spPr/>
+        <p:txBody>
+          <a:bodyPr/>
+          <a:lstStyle/>
+          <a:p>
+            <a:r>
+              <a:rPr lang="en-US" b="0" dirty="0">
+                <a:solidFill>
+                  <a:srgbClr val="6A9955"/>
+                </a:solidFill>
+                <a:effectLst/>
+                <a:highlight>
+                  <a:srgbClr val="1F1F1F"/>
+                </a:highlight>
+                <a:latin typeface="Menlo" panose="020B0609030804020204" pitchFamily="49" charset="0"/>
+              </a:rPr>
+              <a:t>&gt;</a:t>
+            </a:r>
+            <a:r>
+              <a:rPr lang="en-US" b="0" dirty="0">
+                <a:solidFill>
+                  <a:srgbClr val="CCCCCC"/>
+                </a:solidFill>
+                <a:effectLst/>
+                <a:highlight>
+                  <a:srgbClr val="1F1F1F"/>
+                </a:highlight>
+                <a:latin typeface="Menlo" panose="020B0609030804020204" pitchFamily="49" charset="0"/>
+              </a:rPr>
+              <a:t> Determine if the adversary has a history of engaging in deception.</a:t>
+            </a:r>
+          </a:p>
+          <a:p>
+            <a:br>
+              <a:rPr lang="en-US" b="0" dirty="0">
+                <a:solidFill>
+                  <a:srgbClr val="CCCCCC"/>
+                </a:solidFill>
+                <a:effectLst/>
+                <a:highlight>
+                  <a:srgbClr val="1F1F1F"/>
+                </a:highlight>
+                <a:latin typeface="Menlo" panose="020B0609030804020204" pitchFamily="49" charset="0"/>
+              </a:rPr>
+            </a:br>
+            <a:r>
+              <a:rPr lang="en-US" b="1" dirty="0">
+                <a:solidFill>
+                  <a:srgbClr val="569CD6"/>
+                </a:solidFill>
+                <a:effectLst/>
+                <a:highlight>
+                  <a:srgbClr val="1F1F1F"/>
+                </a:highlight>
+                <a:latin typeface="Menlo" panose="020B0609030804020204" pitchFamily="49" charset="0"/>
+              </a:rPr>
+              <a:t>**Activity**</a:t>
+            </a:r>
+            <a:endParaRPr lang="en-US" b="0" dirty="0">
+              <a:solidFill>
+                <a:srgbClr val="CCCCCC"/>
+              </a:solidFill>
+              <a:effectLst/>
+              <a:highlight>
+                <a:srgbClr val="1F1F1F"/>
+              </a:highlight>
+              <a:latin typeface="Menlo" panose="020B0609030804020204" pitchFamily="49" charset="0"/>
+            </a:endParaRPr>
+          </a:p>
+          <a:p>
+            <a:br>
+              <a:rPr lang="en-US" b="0" dirty="0">
+                <a:solidFill>
+                  <a:srgbClr val="CCCCCC"/>
+                </a:solidFill>
+                <a:effectLst/>
+                <a:highlight>
+                  <a:srgbClr val="1F1F1F"/>
+                </a:highlight>
+                <a:latin typeface="Menlo" panose="020B0609030804020204" pitchFamily="49" charset="0"/>
+              </a:rPr>
+            </a:br>
+            <a:r>
+              <a:rPr lang="en-US" b="0" dirty="0">
+                <a:solidFill>
+                  <a:srgbClr val="6796E6"/>
+                </a:solidFill>
+                <a:effectLst/>
+                <a:highlight>
+                  <a:srgbClr val="1F1F1F"/>
+                </a:highlight>
+                <a:latin typeface="Menlo" panose="020B0609030804020204" pitchFamily="49" charset="0"/>
+              </a:rPr>
+              <a:t>1.</a:t>
+            </a:r>
+            <a:r>
+              <a:rPr lang="en-US" b="0" dirty="0">
+                <a:solidFill>
+                  <a:srgbClr val="CCCCCC"/>
+                </a:solidFill>
+                <a:effectLst/>
+                <a:highlight>
+                  <a:srgbClr val="1F1F1F"/>
+                </a:highlight>
+                <a:latin typeface="Menlo" panose="020B0609030804020204" pitchFamily="49" charset="0"/>
+              </a:rPr>
+              <a:t> Ask students for examples of historical precedents of deception:</a:t>
+            </a:r>
+          </a:p>
+          <a:p>
+            <a:r>
+              <a:rPr lang="en-US" b="0" dirty="0">
+                <a:solidFill>
+                  <a:srgbClr val="CCCCCC"/>
+                </a:solidFill>
+                <a:effectLst/>
+                <a:highlight>
+                  <a:srgbClr val="1F1F1F"/>
+                </a:highlight>
+                <a:latin typeface="Menlo" panose="020B0609030804020204" pitchFamily="49" charset="0"/>
+              </a:rPr>
+              <a:t>Have examples ready to provide if students are unsure. Specific examples could include:</a:t>
+            </a:r>
+          </a:p>
+          <a:p>
+            <a:r>
+              <a:rPr lang="en-US" b="0" dirty="0">
+                <a:solidFill>
+                  <a:srgbClr val="CCCCCC"/>
+                </a:solidFill>
+                <a:effectLst/>
+                <a:highlight>
+                  <a:srgbClr val="1F1F1F"/>
+                </a:highlight>
+                <a:latin typeface="Menlo" panose="020B0609030804020204" pitchFamily="49" charset="0"/>
+              </a:rPr>
+              <a:t>- Ancient Greek and Roman military tactics.</a:t>
+            </a:r>
+          </a:p>
+          <a:p>
+            <a:r>
+              <a:rPr lang="en-US" b="0" dirty="0">
+                <a:solidFill>
+                  <a:srgbClr val="CCCCCC"/>
+                </a:solidFill>
+                <a:effectLst/>
+                <a:highlight>
+                  <a:srgbClr val="1F1F1F"/>
+                </a:highlight>
+                <a:latin typeface="Menlo" panose="020B0609030804020204" pitchFamily="49" charset="0"/>
+              </a:rPr>
+              <a:t>- Historical use of propaganda during wartime including World War I and World War II.</a:t>
+            </a:r>
+          </a:p>
+          <a:p>
+            <a:r>
+              <a:rPr lang="en-US" b="0" dirty="0">
+                <a:solidFill>
+                  <a:srgbClr val="CCCCCC"/>
+                </a:solidFill>
+                <a:effectLst/>
+                <a:highlight>
+                  <a:srgbClr val="1F1F1F"/>
+                </a:highlight>
+                <a:latin typeface="Menlo" panose="020B0609030804020204" pitchFamily="49" charset="0"/>
+              </a:rPr>
+              <a:t>- Previous instances of misinformation campaigns by rival states. </a:t>
+            </a:r>
+          </a:p>
+          <a:p>
+            <a:r>
+              <a:rPr lang="en-US" b="0" dirty="0">
+                <a:solidFill>
+                  <a:srgbClr val="CCCCCC"/>
+                </a:solidFill>
+                <a:effectLst/>
+                <a:highlight>
+                  <a:srgbClr val="1F1F1F"/>
+                </a:highlight>
+                <a:latin typeface="Menlo" panose="020B0609030804020204" pitchFamily="49" charset="0"/>
+              </a:rPr>
+              <a:t>- Example: Historical use of propaganda during wartime.</a:t>
+            </a:r>
+          </a:p>
+          <a:p>
+            <a:r>
+              <a:rPr lang="en-US" b="0" dirty="0">
+                <a:solidFill>
+                  <a:srgbClr val="CCCCCC"/>
+                </a:solidFill>
+                <a:effectLst/>
+                <a:highlight>
+                  <a:srgbClr val="1F1F1F"/>
+                </a:highlight>
+                <a:latin typeface="Menlo" panose="020B0609030804020204" pitchFamily="49" charset="0"/>
+              </a:rPr>
+              <a:t>- Example: Previous instances of misinformation campaigns by rival states.</a:t>
+            </a:r>
+          </a:p>
+          <a:p>
+            <a:r>
+              <a:rPr lang="en-US" b="0" dirty="0">
+                <a:solidFill>
+                  <a:srgbClr val="6796E6"/>
+                </a:solidFill>
+                <a:effectLst/>
+                <a:highlight>
+                  <a:srgbClr val="1F1F1F"/>
+                </a:highlight>
+                <a:latin typeface="Menlo" panose="020B0609030804020204" pitchFamily="49" charset="0"/>
+              </a:rPr>
+              <a:t>2.</a:t>
+            </a:r>
+            <a:r>
+              <a:rPr lang="en-US" b="0" dirty="0">
+                <a:solidFill>
+                  <a:srgbClr val="CCCCCC"/>
+                </a:solidFill>
+                <a:effectLst/>
+                <a:highlight>
+                  <a:srgbClr val="1F1F1F"/>
+                </a:highlight>
+                <a:latin typeface="Menlo" panose="020B0609030804020204" pitchFamily="49" charset="0"/>
+              </a:rPr>
+              <a:t> Discuss how to identify patterns of past opposition practices in various scenarios:</a:t>
+            </a:r>
+          </a:p>
+          <a:p>
+            <a:r>
+              <a:rPr lang="en-US" b="0" dirty="0">
+                <a:solidFill>
+                  <a:srgbClr val="6796E6"/>
+                </a:solidFill>
+                <a:effectLst/>
+                <a:highlight>
+                  <a:srgbClr val="1F1F1F"/>
+                </a:highlight>
+                <a:latin typeface="Menlo" panose="020B0609030804020204" pitchFamily="49" charset="0"/>
+              </a:rPr>
+              <a:t>-</a:t>
+            </a:r>
+            <a:r>
+              <a:rPr lang="en-US" b="0" dirty="0">
+                <a:solidFill>
+                  <a:srgbClr val="CCCCCC"/>
+                </a:solidFill>
+                <a:effectLst/>
+                <a:highlight>
+                  <a:srgbClr val="1F1F1F"/>
+                </a:highlight>
+                <a:latin typeface="Menlo" panose="020B0609030804020204" pitchFamily="49" charset="0"/>
+              </a:rPr>
+              <a:t> Analyze past behavior and tactics used in deception.</a:t>
+            </a:r>
+          </a:p>
+          <a:p>
+            <a:r>
+              <a:rPr lang="en-US" b="0" dirty="0">
+                <a:solidFill>
+                  <a:srgbClr val="6796E6"/>
+                </a:solidFill>
+                <a:effectLst/>
+                <a:highlight>
+                  <a:srgbClr val="1F1F1F"/>
+                </a:highlight>
+                <a:latin typeface="Menlo" panose="020B0609030804020204" pitchFamily="49" charset="0"/>
+              </a:rPr>
+              <a:t>-</a:t>
+            </a:r>
+            <a:r>
+              <a:rPr lang="en-US" b="0" dirty="0">
+                <a:solidFill>
+                  <a:srgbClr val="CCCCCC"/>
+                </a:solidFill>
+                <a:effectLst/>
+                <a:highlight>
+                  <a:srgbClr val="1F1F1F"/>
+                </a:highlight>
+                <a:latin typeface="Menlo" panose="020B0609030804020204" pitchFamily="49" charset="0"/>
+              </a:rPr>
+              <a:t> Compare current scenarios with historical examples.</a:t>
+            </a:r>
+          </a:p>
+          <a:p>
+            <a:endParaRPr lang="en-US" dirty="0"/>
+          </a:p>
+        </p:txBody>
+      </p:sp>
+      <p:sp>
+        <p:nvSpPr>
+          <p:cNvPr id="4" name="Slide Number Placeholder 3"/>
+          <p:cNvSpPr>
+            <a:spLocks noGrp="1"/>
+          </p:cNvSpPr>
+          <p:nvPr>
+            <p:ph type="sldNum" idx="8"/>
+          </p:nvPr>
+        </p:nvSpPr>
+        <p:spPr/>
+        <p:txBody>
+          <a:bodyPr/>
+          <a:lstStyle/>
+          <a:p>
+            <a:pPr indent="0" algn="r">
+              <a:buNone/>
+            </a:pPr>
+            <a:fld id="{96D071C0-0F6A-4E5C-B3E5-B824FE66220F}" type="slidenum">
+              <a:rPr lang="en-US" sz="1400" b="0" strike="noStrike" spc="-1" smtClean="0">
+                <a:solidFill>
+                  <a:srgbClr val="000000"/>
+                </a:solidFill>
+                <a:latin typeface="Times New Roman"/>
+              </a:rPr>
+              <a:t>7</a:t>
+            </a:fld>
+            <a:endParaRPr lang="en-US" sz="1400" b="0" strike="noStrike" spc="-1">
+              <a:solidFill>
+                <a:srgbClr val="000000"/>
+              </a:solidFill>
+              <a:latin typeface="Times New Roman"/>
+            </a:endParaRPr>
+          </a:p>
+        </p:txBody>
+      </p:sp>
+    </p:spTree>
+    <p:extLst>
+      <p:ext uri="{BB962C8B-B14F-4D97-AF65-F5344CB8AC3E}">
+        <p14:creationId xmlns:p14="http://schemas.microsoft.com/office/powerpoint/2010/main" val="261642412"/>
+      </p:ext>
+    </p:extLst>
+  </p:cSld>
+  <p:clrMapOvr>
+    <a:masterClrMapping/>
+  </p:clrMapOvr>
+</p:notes>
+</file>
+
+<file path=ppt/notesSlides/notesSlide6.xml><?xml version="1.0" encoding="utf-8"?>
+<p:notes xmlns:a="http://schemas.openxmlformats.org/drawingml/2006/main" xmlns:r="http://schemas.openxmlformats.org/officeDocument/2006/relationships" xmlns:p="http://schemas.openxmlformats.org/presentationml/2006/main">
+  <p:cSld>
+    <p:spTree>
+      <p:nvGrpSpPr>
+        <p:cNvPr id="1" name=""/>
+        <p:cNvGrpSpPr/>
+        <p:nvPr/>
+      </p:nvGrpSpPr>
+      <p:grpSpPr>
+        <a:xfrm>
+          <a:off x="0" y="0"/>
+          <a:ext cx="0" cy="0"/>
+          <a:chOff x="0" y="0"/>
+          <a:chExt cx="0" cy="0"/>
+        </a:xfrm>
+      </p:grpSpPr>
+      <p:sp>
+        <p:nvSpPr>
+          <p:cNvPr id="2" name="Slide Image Placeholder 1"/>
+          <p:cNvSpPr>
+            <a:spLocks noGrp="1" noRot="1" noChangeAspect="1"/>
+          </p:cNvSpPr>
+          <p:nvPr>
+            <p:ph type="sldImg"/>
+          </p:nvPr>
+        </p:nvSpPr>
+        <p:spPr>
+          <a:xfrm>
+            <a:off x="382588" y="695325"/>
+            <a:ext cx="6092825" cy="3427413"/>
+          </a:xfrm>
+        </p:spPr>
+      </p:sp>
+      <p:sp>
+        <p:nvSpPr>
+          <p:cNvPr id="3" name="Notes Placeholder 2"/>
+          <p:cNvSpPr>
+            <a:spLocks noGrp="1"/>
+          </p:cNvSpPr>
+          <p:nvPr>
+            <p:ph type="body" idx="1"/>
+          </p:nvPr>
+        </p:nvSpPr>
+        <p:spPr/>
+        <p:txBody>
+          <a:bodyPr/>
+          <a:lstStyle/>
+          <a:p>
+            <a:r>
+              <a:rPr lang="en-US" b="0" dirty="0">
+                <a:solidFill>
+                  <a:srgbClr val="6A9955"/>
+                </a:solidFill>
+                <a:effectLst/>
+                <a:highlight>
+                  <a:srgbClr val="1F1F1F"/>
+                </a:highlight>
+                <a:latin typeface="Menlo" panose="020B0609030804020204" pitchFamily="49" charset="0"/>
+              </a:rPr>
+              <a:t>&gt;</a:t>
+            </a:r>
+            <a:r>
+              <a:rPr lang="en-US" b="0" dirty="0">
+                <a:solidFill>
+                  <a:srgbClr val="CCCCCC"/>
+                </a:solidFill>
+                <a:effectLst/>
+                <a:highlight>
+                  <a:srgbClr val="1F1F1F"/>
+                </a:highlight>
+                <a:latin typeface="Menlo" panose="020B0609030804020204" pitchFamily="49" charset="0"/>
+              </a:rPr>
+              <a:t> Evaluate the vulnerability of the source to manipulation.</a:t>
+            </a:r>
+          </a:p>
+          <a:p>
+            <a:br>
+              <a:rPr lang="en-US" b="0" dirty="0">
+                <a:solidFill>
+                  <a:srgbClr val="CCCCCC"/>
+                </a:solidFill>
+                <a:effectLst/>
+                <a:highlight>
+                  <a:srgbClr val="1F1F1F"/>
+                </a:highlight>
+                <a:latin typeface="Menlo" panose="020B0609030804020204" pitchFamily="49" charset="0"/>
+              </a:rPr>
+            </a:br>
+            <a:r>
+              <a:rPr lang="en-US" b="1" dirty="0">
+                <a:solidFill>
+                  <a:srgbClr val="569CD6"/>
+                </a:solidFill>
+                <a:effectLst/>
+                <a:highlight>
+                  <a:srgbClr val="1F1F1F"/>
+                </a:highlight>
+                <a:latin typeface="Menlo" panose="020B0609030804020204" pitchFamily="49" charset="0"/>
+              </a:rPr>
+              <a:t>**Activity**</a:t>
+            </a:r>
+            <a:endParaRPr lang="en-US" b="0" dirty="0">
+              <a:solidFill>
+                <a:srgbClr val="CCCCCC"/>
+              </a:solidFill>
+              <a:effectLst/>
+              <a:highlight>
+                <a:srgbClr val="1F1F1F"/>
+              </a:highlight>
+              <a:latin typeface="Menlo" panose="020B0609030804020204" pitchFamily="49" charset="0"/>
+            </a:endParaRPr>
+          </a:p>
+          <a:p>
+            <a:br>
+              <a:rPr lang="en-US" b="0" dirty="0">
+                <a:solidFill>
+                  <a:srgbClr val="CCCCCC"/>
+                </a:solidFill>
+                <a:effectLst/>
+                <a:highlight>
+                  <a:srgbClr val="1F1F1F"/>
+                </a:highlight>
+                <a:latin typeface="Menlo" panose="020B0609030804020204" pitchFamily="49" charset="0"/>
+              </a:rPr>
+            </a:br>
+            <a:r>
+              <a:rPr lang="en-US" b="0" dirty="0">
+                <a:solidFill>
+                  <a:srgbClr val="6796E6"/>
+                </a:solidFill>
+                <a:effectLst/>
+                <a:highlight>
+                  <a:srgbClr val="1F1F1F"/>
+                </a:highlight>
+                <a:latin typeface="Menlo" panose="020B0609030804020204" pitchFamily="49" charset="0"/>
+              </a:rPr>
+              <a:t>1.</a:t>
+            </a:r>
+            <a:r>
+              <a:rPr lang="en-US" b="0" dirty="0">
+                <a:solidFill>
+                  <a:srgbClr val="CCCCCC"/>
+                </a:solidFill>
+                <a:effectLst/>
+                <a:highlight>
+                  <a:srgbClr val="1F1F1F"/>
+                </a:highlight>
+                <a:latin typeface="Menlo" panose="020B0609030804020204" pitchFamily="49" charset="0"/>
+              </a:rPr>
+              <a:t> Present examples of sources that can be manipulated:</a:t>
+            </a:r>
+          </a:p>
+          <a:p>
+            <a:r>
+              <a:rPr lang="en-US" b="0" dirty="0">
+                <a:solidFill>
+                  <a:srgbClr val="6796E6"/>
+                </a:solidFill>
+                <a:effectLst/>
+                <a:highlight>
+                  <a:srgbClr val="1F1F1F"/>
+                </a:highlight>
+                <a:latin typeface="Menlo" panose="020B0609030804020204" pitchFamily="49" charset="0"/>
+              </a:rPr>
+              <a:t>-</a:t>
+            </a:r>
+            <a:r>
+              <a:rPr lang="en-US" b="0" dirty="0">
+                <a:solidFill>
+                  <a:srgbClr val="CCCCCC"/>
+                </a:solidFill>
+                <a:effectLst/>
+                <a:highlight>
+                  <a:srgbClr val="1F1F1F"/>
+                </a:highlight>
+                <a:latin typeface="Menlo" panose="020B0609030804020204" pitchFamily="49" charset="0"/>
+              </a:rPr>
+              <a:t> Example: Social media influencers with questionable affiliations.</a:t>
+            </a:r>
+          </a:p>
+          <a:p>
+            <a:r>
+              <a:rPr lang="en-US" b="0" dirty="0">
+                <a:solidFill>
+                  <a:srgbClr val="6796E6"/>
+                </a:solidFill>
+                <a:effectLst/>
+                <a:highlight>
+                  <a:srgbClr val="1F1F1F"/>
+                </a:highlight>
+                <a:latin typeface="Menlo" panose="020B0609030804020204" pitchFamily="49" charset="0"/>
+              </a:rPr>
+              <a:t>-</a:t>
+            </a:r>
+            <a:r>
+              <a:rPr lang="en-US" b="0" dirty="0">
+                <a:solidFill>
+                  <a:srgbClr val="CCCCCC"/>
+                </a:solidFill>
+                <a:effectLst/>
+                <a:highlight>
+                  <a:srgbClr val="1F1F1F"/>
+                </a:highlight>
+                <a:latin typeface="Menlo" panose="020B0609030804020204" pitchFamily="49" charset="0"/>
+              </a:rPr>
+              <a:t> Example: Anonymous sources with unverifiable information.</a:t>
+            </a:r>
+          </a:p>
+          <a:p>
+            <a:r>
+              <a:rPr lang="en-US" b="0" dirty="0">
+                <a:solidFill>
+                  <a:srgbClr val="6796E6"/>
+                </a:solidFill>
+                <a:effectLst/>
+                <a:highlight>
+                  <a:srgbClr val="1F1F1F"/>
+                </a:highlight>
+                <a:latin typeface="Menlo" panose="020B0609030804020204" pitchFamily="49" charset="0"/>
+              </a:rPr>
+              <a:t>2.</a:t>
+            </a:r>
+            <a:r>
+              <a:rPr lang="en-US" b="0" dirty="0">
+                <a:solidFill>
+                  <a:srgbClr val="CCCCCC"/>
+                </a:solidFill>
+                <a:effectLst/>
+                <a:highlight>
+                  <a:srgbClr val="1F1F1F"/>
+                </a:highlight>
+                <a:latin typeface="Menlo" panose="020B0609030804020204" pitchFamily="49" charset="0"/>
+              </a:rPr>
+              <a:t> Discuss how to assess the manipulability of sources in various scenarios:</a:t>
+            </a:r>
+          </a:p>
+          <a:p>
+            <a:r>
+              <a:rPr lang="en-US" b="0" dirty="0">
+                <a:solidFill>
+                  <a:srgbClr val="6796E6"/>
+                </a:solidFill>
+                <a:effectLst/>
+                <a:highlight>
+                  <a:srgbClr val="1F1F1F"/>
+                </a:highlight>
+                <a:latin typeface="Menlo" panose="020B0609030804020204" pitchFamily="49" charset="0"/>
+              </a:rPr>
+              <a:t>-</a:t>
+            </a:r>
+            <a:r>
+              <a:rPr lang="en-US" b="0" dirty="0">
+                <a:solidFill>
+                  <a:srgbClr val="CCCCCC"/>
+                </a:solidFill>
+                <a:effectLst/>
+                <a:highlight>
+                  <a:srgbClr val="1F1F1F"/>
+                </a:highlight>
+                <a:latin typeface="Menlo" panose="020B0609030804020204" pitchFamily="49" charset="0"/>
+              </a:rPr>
+              <a:t> Determine the reliability and credibility of the source.</a:t>
+            </a:r>
+          </a:p>
+          <a:p>
+            <a:r>
+              <a:rPr lang="en-US" b="0" dirty="0">
+                <a:solidFill>
+                  <a:srgbClr val="6796E6"/>
+                </a:solidFill>
+                <a:effectLst/>
+                <a:highlight>
+                  <a:srgbClr val="1F1F1F"/>
+                </a:highlight>
+                <a:latin typeface="Menlo" panose="020B0609030804020204" pitchFamily="49" charset="0"/>
+              </a:rPr>
+              <a:t>-</a:t>
+            </a:r>
+            <a:r>
+              <a:rPr lang="en-US" b="0" dirty="0">
+                <a:solidFill>
+                  <a:srgbClr val="CCCCCC"/>
+                </a:solidFill>
+                <a:effectLst/>
+                <a:highlight>
+                  <a:srgbClr val="1F1F1F"/>
+                </a:highlight>
+                <a:latin typeface="Menlo" panose="020B0609030804020204" pitchFamily="49" charset="0"/>
+              </a:rPr>
+              <a:t> Analyze the source's access to information and track record.</a:t>
+            </a:r>
+          </a:p>
+        </p:txBody>
+      </p:sp>
+      <p:sp>
+        <p:nvSpPr>
+          <p:cNvPr id="4" name="Slide Number Placeholder 3"/>
+          <p:cNvSpPr>
+            <a:spLocks noGrp="1"/>
+          </p:cNvSpPr>
+          <p:nvPr>
+            <p:ph type="sldNum" idx="8"/>
+          </p:nvPr>
+        </p:nvSpPr>
+        <p:spPr/>
+        <p:txBody>
+          <a:bodyPr/>
+          <a:lstStyle/>
+          <a:p>
+            <a:pPr indent="0" algn="r">
+              <a:buNone/>
+            </a:pPr>
+            <a:fld id="{96D071C0-0F6A-4E5C-B3E5-B824FE66220F}" type="slidenum">
+              <a:rPr lang="en-US" sz="1400" b="0" strike="noStrike" spc="-1" smtClean="0">
+                <a:solidFill>
+                  <a:srgbClr val="000000"/>
+                </a:solidFill>
+                <a:latin typeface="Times New Roman"/>
+              </a:rPr>
+              <a:t>8</a:t>
+            </a:fld>
+            <a:endParaRPr lang="en-US" sz="1400" b="0" strike="noStrike" spc="-1">
+              <a:solidFill>
+                <a:srgbClr val="000000"/>
+              </a:solidFill>
+              <a:latin typeface="Times New Roman"/>
+            </a:endParaRPr>
+          </a:p>
+        </p:txBody>
+      </p:sp>
+    </p:spTree>
+    <p:extLst>
+      <p:ext uri="{BB962C8B-B14F-4D97-AF65-F5344CB8AC3E}">
+        <p14:creationId xmlns:p14="http://schemas.microsoft.com/office/powerpoint/2010/main" val="1939998934"/>
+      </p:ext>
+    </p:extLst>
+  </p:cSld>
+  <p:clrMapOvr>
+    <a:masterClrMapping/>
+  </p:clrMapOvr>
+</p:notes>
+</file>
+
+<file path=ppt/notesSlides/notesSlide7.xml><?xml version="1.0" encoding="utf-8"?>
+<p:notes xmlns:a="http://schemas.openxmlformats.org/drawingml/2006/main" xmlns:r="http://schemas.openxmlformats.org/officeDocument/2006/relationships" xmlns:p="http://schemas.openxmlformats.org/presentationml/2006/main">
+  <p:cSld>
+    <p:spTree>
+      <p:nvGrpSpPr>
+        <p:cNvPr id="1" name=""/>
+        <p:cNvGrpSpPr/>
+        <p:nvPr/>
+      </p:nvGrpSpPr>
+      <p:grpSpPr>
+        <a:xfrm>
+          <a:off x="0" y="0"/>
+          <a:ext cx="0" cy="0"/>
+          <a:chOff x="0" y="0"/>
+          <a:chExt cx="0" cy="0"/>
+        </a:xfrm>
+      </p:grpSpPr>
+      <p:sp>
+        <p:nvSpPr>
+          <p:cNvPr id="2" name="Slide Image Placeholder 1"/>
+          <p:cNvSpPr>
+            <a:spLocks noGrp="1" noRot="1" noChangeAspect="1"/>
+          </p:cNvSpPr>
+          <p:nvPr>
+            <p:ph type="sldImg"/>
+          </p:nvPr>
+        </p:nvSpPr>
+        <p:spPr>
+          <a:xfrm>
+            <a:off x="382588" y="695325"/>
+            <a:ext cx="6092825" cy="3427413"/>
+          </a:xfrm>
+        </p:spPr>
+      </p:sp>
+      <p:sp>
+        <p:nvSpPr>
+          <p:cNvPr id="3" name="Notes Placeholder 2"/>
+          <p:cNvSpPr>
+            <a:spLocks noGrp="1"/>
+          </p:cNvSpPr>
+          <p:nvPr>
+            <p:ph type="body" idx="1"/>
+          </p:nvPr>
+        </p:nvSpPr>
+        <p:spPr/>
+        <p:txBody>
+          <a:bodyPr/>
+          <a:lstStyle/>
+          <a:p>
+            <a:r>
+              <a:rPr lang="en-US" b="0" dirty="0">
+                <a:solidFill>
+                  <a:srgbClr val="6A9955"/>
+                </a:solidFill>
+                <a:effectLst/>
+                <a:highlight>
+                  <a:srgbClr val="1F1F1F"/>
+                </a:highlight>
+                <a:latin typeface="Menlo" panose="020B0609030804020204" pitchFamily="49" charset="0"/>
+              </a:rPr>
+              <a:t>&gt;</a:t>
+            </a:r>
+            <a:r>
+              <a:rPr lang="en-US" b="0" dirty="0">
+                <a:solidFill>
+                  <a:srgbClr val="CCCCCC"/>
+                </a:solidFill>
+                <a:effectLst/>
+                <a:highlight>
+                  <a:srgbClr val="1F1F1F"/>
+                </a:highlight>
+                <a:latin typeface="Menlo" panose="020B0609030804020204" pitchFamily="49" charset="0"/>
+              </a:rPr>
+              <a:t> Assess the accuracy and consistency of the evidence.</a:t>
+            </a:r>
+          </a:p>
+          <a:p>
+            <a:br>
+              <a:rPr lang="en-US" b="0" dirty="0">
+                <a:solidFill>
+                  <a:srgbClr val="CCCCCC"/>
+                </a:solidFill>
+                <a:effectLst/>
+                <a:highlight>
+                  <a:srgbClr val="1F1F1F"/>
+                </a:highlight>
+                <a:latin typeface="Menlo" panose="020B0609030804020204" pitchFamily="49" charset="0"/>
+              </a:rPr>
+            </a:br>
+            <a:r>
+              <a:rPr lang="en-US" b="1" dirty="0">
+                <a:solidFill>
+                  <a:srgbClr val="569CD6"/>
+                </a:solidFill>
+                <a:effectLst/>
+                <a:highlight>
+                  <a:srgbClr val="1F1F1F"/>
+                </a:highlight>
+                <a:latin typeface="Menlo" panose="020B0609030804020204" pitchFamily="49" charset="0"/>
+              </a:rPr>
+              <a:t>**Activity**</a:t>
+            </a:r>
+            <a:endParaRPr lang="en-US" b="0" dirty="0">
+              <a:solidFill>
+                <a:srgbClr val="CCCCCC"/>
+              </a:solidFill>
+              <a:effectLst/>
+              <a:highlight>
+                <a:srgbClr val="1F1F1F"/>
+              </a:highlight>
+              <a:latin typeface="Menlo" panose="020B0609030804020204" pitchFamily="49" charset="0"/>
+            </a:endParaRPr>
+          </a:p>
+          <a:p>
+            <a:br>
+              <a:rPr lang="en-US" b="0" dirty="0">
+                <a:solidFill>
+                  <a:srgbClr val="CCCCCC"/>
+                </a:solidFill>
+                <a:effectLst/>
+                <a:highlight>
+                  <a:srgbClr val="1F1F1F"/>
+                </a:highlight>
+                <a:latin typeface="Menlo" panose="020B0609030804020204" pitchFamily="49" charset="0"/>
+              </a:rPr>
+            </a:br>
+            <a:r>
+              <a:rPr lang="en-US" b="0" dirty="0">
+                <a:solidFill>
+                  <a:srgbClr val="6796E6"/>
+                </a:solidFill>
+                <a:effectLst/>
+                <a:highlight>
+                  <a:srgbClr val="1F1F1F"/>
+                </a:highlight>
+                <a:latin typeface="Menlo" panose="020B0609030804020204" pitchFamily="49" charset="0"/>
+              </a:rPr>
+              <a:t>1.</a:t>
+            </a:r>
+            <a:r>
+              <a:rPr lang="en-US" b="0" dirty="0">
+                <a:solidFill>
+                  <a:srgbClr val="CCCCCC"/>
+                </a:solidFill>
+                <a:effectLst/>
+                <a:highlight>
+                  <a:srgbClr val="1F1F1F"/>
+                </a:highlight>
+                <a:latin typeface="Menlo" panose="020B0609030804020204" pitchFamily="49" charset="0"/>
+              </a:rPr>
+              <a:t> Present examples of evaluating evidence in influence operations:</a:t>
+            </a:r>
+          </a:p>
+          <a:p>
+            <a:r>
+              <a:rPr lang="en-US" b="0" dirty="0">
+                <a:solidFill>
+                  <a:srgbClr val="6796E6"/>
+                </a:solidFill>
+                <a:effectLst/>
+                <a:highlight>
+                  <a:srgbClr val="1F1F1F"/>
+                </a:highlight>
+                <a:latin typeface="Menlo" panose="020B0609030804020204" pitchFamily="49" charset="0"/>
+              </a:rPr>
+              <a:t>-</a:t>
+            </a:r>
+            <a:r>
+              <a:rPr lang="en-US" b="0" dirty="0">
+                <a:solidFill>
+                  <a:srgbClr val="CCCCCC"/>
+                </a:solidFill>
+                <a:effectLst/>
+                <a:highlight>
+                  <a:srgbClr val="1F1F1F"/>
+                </a:highlight>
+                <a:latin typeface="Menlo" panose="020B0609030804020204" pitchFamily="49" charset="0"/>
+              </a:rPr>
+              <a:t> Example: Cross-referencing information from multiple sources.</a:t>
+            </a:r>
+          </a:p>
+          <a:p>
+            <a:r>
+              <a:rPr lang="en-US" b="0" dirty="0">
+                <a:solidFill>
+                  <a:srgbClr val="6796E6"/>
+                </a:solidFill>
+                <a:effectLst/>
+                <a:highlight>
+                  <a:srgbClr val="1F1F1F"/>
+                </a:highlight>
+                <a:latin typeface="Menlo" panose="020B0609030804020204" pitchFamily="49" charset="0"/>
+              </a:rPr>
+              <a:t>-</a:t>
+            </a:r>
+            <a:r>
+              <a:rPr lang="en-US" b="0" dirty="0">
+                <a:solidFill>
+                  <a:srgbClr val="CCCCCC"/>
+                </a:solidFill>
+                <a:effectLst/>
+                <a:highlight>
+                  <a:srgbClr val="1F1F1F"/>
+                </a:highlight>
+                <a:latin typeface="Menlo" panose="020B0609030804020204" pitchFamily="49" charset="0"/>
+              </a:rPr>
+              <a:t> Example: Checking for consistency in reports from different channels.</a:t>
+            </a:r>
+          </a:p>
+          <a:p>
+            <a:r>
+              <a:rPr lang="en-US" b="0" dirty="0">
+                <a:solidFill>
+                  <a:srgbClr val="6796E6"/>
+                </a:solidFill>
+                <a:effectLst/>
+                <a:highlight>
+                  <a:srgbClr val="1F1F1F"/>
+                </a:highlight>
+                <a:latin typeface="Menlo" panose="020B0609030804020204" pitchFamily="49" charset="0"/>
+              </a:rPr>
+              <a:t>2.</a:t>
+            </a:r>
+            <a:r>
+              <a:rPr lang="en-US" b="0" dirty="0">
+                <a:solidFill>
+                  <a:srgbClr val="CCCCCC"/>
+                </a:solidFill>
+                <a:effectLst/>
+                <a:highlight>
+                  <a:srgbClr val="1F1F1F"/>
+                </a:highlight>
+                <a:latin typeface="Menlo" panose="020B0609030804020204" pitchFamily="49" charset="0"/>
+              </a:rPr>
+              <a:t> Discuss how to evaluate evidence in various scenarios:</a:t>
+            </a:r>
+          </a:p>
+          <a:p>
+            <a:r>
+              <a:rPr lang="en-US" b="0" dirty="0">
+                <a:solidFill>
+                  <a:srgbClr val="6796E6"/>
+                </a:solidFill>
+                <a:effectLst/>
+                <a:highlight>
+                  <a:srgbClr val="1F1F1F"/>
+                </a:highlight>
+                <a:latin typeface="Menlo" panose="020B0609030804020204" pitchFamily="49" charset="0"/>
+              </a:rPr>
+              <a:t>-</a:t>
+            </a:r>
+            <a:r>
+              <a:rPr lang="en-US" b="0" dirty="0">
+                <a:solidFill>
+                  <a:srgbClr val="CCCCCC"/>
+                </a:solidFill>
+                <a:effectLst/>
+                <a:highlight>
+                  <a:srgbClr val="1F1F1F"/>
+                </a:highlight>
+                <a:latin typeface="Menlo" panose="020B0609030804020204" pitchFamily="49" charset="0"/>
+              </a:rPr>
+              <a:t> Verify the accuracy of the information provided.</a:t>
+            </a:r>
+          </a:p>
+          <a:p>
+            <a:r>
+              <a:rPr lang="en-US" b="0" dirty="0">
+                <a:solidFill>
+                  <a:srgbClr val="6796E6"/>
+                </a:solidFill>
+                <a:effectLst/>
+                <a:highlight>
+                  <a:srgbClr val="1F1F1F"/>
+                </a:highlight>
+                <a:latin typeface="Menlo" panose="020B0609030804020204" pitchFamily="49" charset="0"/>
+              </a:rPr>
+              <a:t>-</a:t>
+            </a:r>
+            <a:r>
+              <a:rPr lang="en-US" b="0" dirty="0">
+                <a:solidFill>
+                  <a:srgbClr val="CCCCCC"/>
+                </a:solidFill>
+                <a:effectLst/>
+                <a:highlight>
+                  <a:srgbClr val="1F1F1F"/>
+                </a:highlight>
+                <a:latin typeface="Menlo" panose="020B0609030804020204" pitchFamily="49" charset="0"/>
+              </a:rPr>
+              <a:t> Identify inconsistencies and corroborate evidence from multiple sources.</a:t>
+            </a:r>
+          </a:p>
+        </p:txBody>
+      </p:sp>
+      <p:sp>
+        <p:nvSpPr>
+          <p:cNvPr id="4" name="Slide Number Placeholder 3"/>
+          <p:cNvSpPr>
+            <a:spLocks noGrp="1"/>
+          </p:cNvSpPr>
+          <p:nvPr>
+            <p:ph type="sldNum" idx="8"/>
+          </p:nvPr>
+        </p:nvSpPr>
+        <p:spPr/>
+        <p:txBody>
+          <a:bodyPr/>
+          <a:lstStyle/>
+          <a:p>
+            <a:pPr indent="0" algn="r">
+              <a:buNone/>
+            </a:pPr>
+            <a:fld id="{96D071C0-0F6A-4E5C-B3E5-B824FE66220F}" type="slidenum">
+              <a:rPr lang="en-US" sz="1400" b="0" strike="noStrike" spc="-1" smtClean="0">
+                <a:solidFill>
+                  <a:srgbClr val="000000"/>
+                </a:solidFill>
+                <a:latin typeface="Times New Roman"/>
+              </a:rPr>
+              <a:t>9</a:t>
+            </a:fld>
+            <a:endParaRPr lang="en-US" sz="1400" b="0" strike="noStrike" spc="-1">
+              <a:solidFill>
+                <a:srgbClr val="000000"/>
+              </a:solidFill>
+              <a:latin typeface="Times New Roman"/>
+            </a:endParaRPr>
+          </a:p>
+        </p:txBody>
+      </p:sp>
+    </p:spTree>
+    <p:extLst>
+      <p:ext uri="{BB962C8B-B14F-4D97-AF65-F5344CB8AC3E}">
+        <p14:creationId xmlns:p14="http://schemas.microsoft.com/office/powerpoint/2010/main" val="3941403886"/>
+      </p:ext>
+    </p:extLst>
+  </p:cSld>
+  <p:clrMapOvr>
+    <a:masterClrMapping/>
+  </p:clrMapOvr>
+</p:notes>
+</file>
+
+<file path=ppt/notesSlides/notesSlide8.xml><?xml version="1.0" encoding="utf-8"?>
+<p:notes xmlns:a="http://schemas.openxmlformats.org/drawingml/2006/main" xmlns:r="http://schemas.openxmlformats.org/officeDocument/2006/relationships" xmlns:p="http://schemas.openxmlformats.org/presentationml/2006/main">
+  <p:cSld>
+    <p:spTree>
+      <p:nvGrpSpPr>
+        <p:cNvPr id="1" name=""/>
+        <p:cNvGrpSpPr/>
+        <p:nvPr/>
+      </p:nvGrpSpPr>
+      <p:grpSpPr>
+        <a:xfrm>
+          <a:off x="0" y="0"/>
+          <a:ext cx="0" cy="0"/>
+          <a:chOff x="0" y="0"/>
+          <a:chExt cx="0" cy="0"/>
+        </a:xfrm>
+      </p:grpSpPr>
+      <p:sp>
+        <p:nvSpPr>
+          <p:cNvPr id="2" name="Slide Image Placeholder 1"/>
+          <p:cNvSpPr>
+            <a:spLocks noGrp="1" noRot="1" noChangeAspect="1"/>
+          </p:cNvSpPr>
+          <p:nvPr>
+            <p:ph type="sldImg"/>
+          </p:nvPr>
+        </p:nvSpPr>
+        <p:spPr>
+          <a:xfrm>
+            <a:off x="382588" y="695325"/>
+            <a:ext cx="6092825" cy="3427413"/>
+          </a:xfrm>
+        </p:spPr>
+      </p:sp>
+      <p:sp>
+        <p:nvSpPr>
+          <p:cNvPr id="3" name="Notes Placeholder 2"/>
+          <p:cNvSpPr>
+            <a:spLocks noGrp="1"/>
+          </p:cNvSpPr>
+          <p:nvPr>
+            <p:ph type="body" idx="1"/>
+          </p:nvPr>
+        </p:nvSpPr>
+        <p:spPr/>
+        <p:txBody>
+          <a:bodyPr/>
+          <a:lstStyle/>
+          <a:p>
+            <a:r>
+              <a:rPr lang="en-US" b="0" dirty="0">
+                <a:solidFill>
+                  <a:srgbClr val="6796E6"/>
+                </a:solidFill>
+                <a:effectLst/>
+                <a:highlight>
+                  <a:srgbClr val="1F1F1F"/>
+                </a:highlight>
+                <a:latin typeface="Menlo" panose="020B0609030804020204" pitchFamily="49" charset="0"/>
+              </a:rPr>
+              <a:t>1.</a:t>
+            </a:r>
+            <a:r>
+              <a:rPr lang="en-US" b="0" dirty="0">
+                <a:solidFill>
+                  <a:srgbClr val="CCCCCC"/>
+                </a:solidFill>
+                <a:effectLst/>
+                <a:highlight>
+                  <a:srgbClr val="1F1F1F"/>
+                </a:highlight>
+                <a:latin typeface="Menlo" panose="020B0609030804020204" pitchFamily="49" charset="0"/>
+              </a:rPr>
+              <a:t> Divide students into groups and provide each group with a scenario to analyze using the Deception Detection framework. (10 minutes)</a:t>
+            </a:r>
+          </a:p>
+          <a:p>
+            <a:r>
+              <a:rPr lang="en-US" b="0" dirty="0">
+                <a:solidFill>
+                  <a:srgbClr val="6796E6"/>
+                </a:solidFill>
+                <a:effectLst/>
+                <a:highlight>
+                  <a:srgbClr val="1F1F1F"/>
+                </a:highlight>
+                <a:latin typeface="Menlo" panose="020B0609030804020204" pitchFamily="49" charset="0"/>
+              </a:rPr>
+              <a:t>2.</a:t>
+            </a:r>
+            <a:r>
+              <a:rPr lang="en-US" b="0" dirty="0">
+                <a:solidFill>
+                  <a:srgbClr val="CCCCCC"/>
+                </a:solidFill>
+                <a:effectLst/>
+                <a:highlight>
+                  <a:srgbClr val="1F1F1F"/>
+                </a:highlight>
+                <a:latin typeface="Menlo" panose="020B0609030804020204" pitchFamily="49" charset="0"/>
+              </a:rPr>
+              <a:t> Have each group present their findings to the class. (10 minutes)</a:t>
+            </a:r>
+          </a:p>
+          <a:p>
+            <a:r>
+              <a:rPr lang="en-US" b="0" dirty="0">
+                <a:solidFill>
+                  <a:srgbClr val="6796E6"/>
+                </a:solidFill>
+                <a:effectLst/>
+                <a:highlight>
+                  <a:srgbClr val="1F1F1F"/>
+                </a:highlight>
+                <a:latin typeface="Menlo" panose="020B0609030804020204" pitchFamily="49" charset="0"/>
+              </a:rPr>
+              <a:t>3.</a:t>
+            </a:r>
+            <a:r>
+              <a:rPr lang="en-US" b="0" dirty="0">
+                <a:solidFill>
+                  <a:srgbClr val="CCCCCC"/>
+                </a:solidFill>
+                <a:effectLst/>
+                <a:highlight>
+                  <a:srgbClr val="1F1F1F"/>
+                </a:highlight>
+                <a:latin typeface="Menlo" panose="020B0609030804020204" pitchFamily="49" charset="0"/>
+              </a:rPr>
+              <a:t> Provide feedback and discuss the effectiveness of their analysis. (10 minutes)</a:t>
+            </a:r>
+          </a:p>
+          <a:p>
+            <a:br>
+              <a:rPr lang="en-US" b="0" dirty="0">
+                <a:solidFill>
+                  <a:srgbClr val="CCCCCC"/>
+                </a:solidFill>
+                <a:effectLst/>
+                <a:highlight>
+                  <a:srgbClr val="1F1F1F"/>
+                </a:highlight>
+                <a:latin typeface="Menlo" panose="020B0609030804020204" pitchFamily="49" charset="0"/>
+              </a:rPr>
+            </a:br>
+            <a:endParaRPr lang="en-US" b="0" dirty="0">
+              <a:solidFill>
+                <a:srgbClr val="CCCCCC"/>
+              </a:solidFill>
+              <a:effectLst/>
+              <a:highlight>
+                <a:srgbClr val="1F1F1F"/>
+              </a:highlight>
+              <a:latin typeface="Menlo" panose="020B0609030804020204" pitchFamily="49" charset="0"/>
+            </a:endParaRPr>
+          </a:p>
+          <a:p>
+            <a:endParaRPr lang="en-US" dirty="0"/>
+          </a:p>
+        </p:txBody>
+      </p:sp>
+      <p:sp>
+        <p:nvSpPr>
+          <p:cNvPr id="4" name="Slide Number Placeholder 3"/>
+          <p:cNvSpPr>
+            <a:spLocks noGrp="1"/>
+          </p:cNvSpPr>
+          <p:nvPr>
+            <p:ph type="sldNum" idx="8"/>
+          </p:nvPr>
+        </p:nvSpPr>
+        <p:spPr/>
+        <p:txBody>
+          <a:bodyPr/>
+          <a:lstStyle/>
+          <a:p>
+            <a:pPr indent="0" algn="r">
+              <a:buNone/>
+            </a:pPr>
+            <a:fld id="{96D071C0-0F6A-4E5C-B3E5-B824FE66220F}" type="slidenum">
+              <a:rPr lang="en-US" sz="1400" b="0" strike="noStrike" spc="-1" smtClean="0">
+                <a:solidFill>
+                  <a:srgbClr val="000000"/>
+                </a:solidFill>
+                <a:latin typeface="Times New Roman"/>
+              </a:rPr>
+              <a:t>12</a:t>
+            </a:fld>
+            <a:endParaRPr lang="en-US" sz="1400" b="0" strike="noStrike" spc="-1">
+              <a:solidFill>
+                <a:srgbClr val="000000"/>
+              </a:solidFill>
+              <a:latin typeface="Times New Roman"/>
+            </a:endParaRPr>
+          </a:p>
+        </p:txBody>
+      </p:sp>
+    </p:spTree>
+    <p:extLst>
+      <p:ext uri="{BB962C8B-B14F-4D97-AF65-F5344CB8AC3E}">
+        <p14:creationId xmlns:p14="http://schemas.microsoft.com/office/powerpoint/2010/main" val="2751407482"/>
       </p:ext>
     </p:extLst>
   </p:cSld>
@@ -921,7 +2498,7 @@
           <a:p>
             <a:fld id="{19E3F066-8095-7A47-8BBF-FB45577C0028}" type="datetimeFigureOut">
               <a:rPr lang="en-US" smtClean="0"/>
-              <a:t>6/19/24</a:t>
+              <a:t>6/22/24</a:t>
             </a:fld>
             <a:endParaRPr lang="en-US"/>
           </a:p>
@@ -1119,7 +2696,7 @@
           <a:p>
             <a:fld id="{19E3F066-8095-7A47-8BBF-FB45577C0028}" type="datetimeFigureOut">
               <a:rPr lang="en-US" smtClean="0"/>
-              <a:t>6/19/24</a:t>
+              <a:t>6/22/24</a:t>
             </a:fld>
             <a:endParaRPr lang="en-US"/>
           </a:p>
@@ -1327,7 +2904,7 @@
           <a:p>
             <a:fld id="{19E3F066-8095-7A47-8BBF-FB45577C0028}" type="datetimeFigureOut">
               <a:rPr lang="en-US" smtClean="0"/>
-              <a:t>6/19/24</a:t>
+              <a:t>6/22/24</a:t>
             </a:fld>
             <a:endParaRPr lang="en-US"/>
           </a:p>
@@ -1977,7 +3554,7 @@
           <a:p>
             <a:fld id="{19E3F066-8095-7A47-8BBF-FB45577C0028}" type="datetimeFigureOut">
               <a:rPr lang="en-US" smtClean="0"/>
-              <a:t>6/19/24</a:t>
+              <a:t>6/22/24</a:t>
             </a:fld>
             <a:endParaRPr lang="en-US"/>
           </a:p>
@@ -2252,7 +3829,7 @@
           <a:p>
             <a:fld id="{19E3F066-8095-7A47-8BBF-FB45577C0028}" type="datetimeFigureOut">
               <a:rPr lang="en-US" smtClean="0"/>
-              <a:t>6/19/24</a:t>
+              <a:t>6/22/24</a:t>
             </a:fld>
             <a:endParaRPr lang="en-US"/>
           </a:p>
@@ -2517,7 +4094,7 @@
           <a:p>
             <a:fld id="{19E3F066-8095-7A47-8BBF-FB45577C0028}" type="datetimeFigureOut">
               <a:rPr lang="en-US" smtClean="0"/>
-              <a:t>6/19/24</a:t>
+              <a:t>6/22/24</a:t>
             </a:fld>
             <a:endParaRPr lang="en-US"/>
           </a:p>
@@ -2929,7 +4506,7 @@
           <a:p>
             <a:fld id="{19E3F066-8095-7A47-8BBF-FB45577C0028}" type="datetimeFigureOut">
               <a:rPr lang="en-US" smtClean="0"/>
-              <a:t>6/19/24</a:t>
+              <a:t>6/22/24</a:t>
             </a:fld>
             <a:endParaRPr lang="en-US"/>
           </a:p>
@@ -3070,7 +4647,7 @@
           <a:p>
             <a:fld id="{19E3F066-8095-7A47-8BBF-FB45577C0028}" type="datetimeFigureOut">
               <a:rPr lang="en-US" smtClean="0"/>
-              <a:t>6/19/24</a:t>
+              <a:t>6/22/24</a:t>
             </a:fld>
             <a:endParaRPr lang="en-US"/>
           </a:p>
@@ -3183,7 +4760,7 @@
           <a:p>
             <a:fld id="{19E3F066-8095-7A47-8BBF-FB45577C0028}" type="datetimeFigureOut">
               <a:rPr lang="en-US" smtClean="0"/>
-              <a:t>6/19/24</a:t>
+              <a:t>6/22/24</a:t>
             </a:fld>
             <a:endParaRPr lang="en-US"/>
           </a:p>
@@ -3494,7 +5071,7 @@
           <a:p>
             <a:fld id="{19E3F066-8095-7A47-8BBF-FB45577C0028}" type="datetimeFigureOut">
               <a:rPr lang="en-US" smtClean="0"/>
-              <a:t>6/19/24</a:t>
+              <a:t>6/22/24</a:t>
             </a:fld>
             <a:endParaRPr lang="en-US"/>
           </a:p>
@@ -3782,7 +5359,7 @@
           <a:p>
             <a:fld id="{19E3F066-8095-7A47-8BBF-FB45577C0028}" type="datetimeFigureOut">
               <a:rPr lang="en-US" smtClean="0"/>
-              <a:t>6/19/24</a:t>
+              <a:t>6/22/24</a:t>
             </a:fld>
             <a:endParaRPr lang="en-US"/>
           </a:p>
@@ -4023,7 +5600,7 @@
           <a:p>
             <a:fld id="{19E3F066-8095-7A47-8BBF-FB45577C0028}" type="datetimeFigureOut">
               <a:rPr lang="en-US" smtClean="0"/>
-              <a:t>6/19/24</a:t>
+              <a:t>6/22/24</a:t>
             </a:fld>
             <a:endParaRPr lang="en-US"/>
           </a:p>
@@ -4488,7 +6065,7 @@
           <a:p>
             <a:fld id="{9530ACA4-BD8C-D448-95CA-FC1634E9A82C}" type="datetimeFigureOut">
               <a:rPr lang="en-US" smtClean="0"/>
-              <a:t>6/19/24</a:t>
+              <a:t>6/22/24</a:t>
             </a:fld>
             <a:endParaRPr lang="en-US"/>
           </a:p>
@@ -4938,7 +6515,7 @@
                 <a:latin typeface="Arial" panose="020B0604020202020204" pitchFamily="34" charset="0"/>
                 <a:cs typeface="Arial" panose="020B0604020202020204" pitchFamily="34" charset="0"/>
               </a:rPr>
-              <a:t>{Lesson}</a:t>
+              <a:t>Identifying Malign Information</a:t>
             </a:r>
           </a:p>
           <a:p>
@@ -5015,7 +6592,7 @@
           </a:ln>
           <a:extLst>
             <a:ext uri="{C572A759-6A51-4108-AA02-DFA0A04FC94B}">
-              <ma14:wrappingTextBoxFlag xmlns:ma14="http://schemas.microsoft.com/office/mac/drawingml/2011/main" xmlns:a14="http://schemas.microsoft.com/office/drawing/2010/main" xmlns:m="http://schemas.openxmlformats.org/officeDocument/2006/math" xmlns="" val="1"/>
+              <ma14:wrappingTextBoxFlag xmlns="" xmlns:m="http://schemas.openxmlformats.org/officeDocument/2006/math" xmlns:a14="http://schemas.microsoft.com/office/drawing/2010/main" xmlns:ma14="http://schemas.microsoft.com/office/mac/drawingml/2011/main" val="1"/>
             </a:ext>
           </a:extLst>
         </p:spPr>
@@ -5062,7 +6639,7 @@
           </a:ln>
           <a:extLst>
             <a:ext uri="{C572A759-6A51-4108-AA02-DFA0A04FC94B}">
-              <ma14:wrappingTextBoxFlag xmlns:ma14="http://schemas.microsoft.com/office/mac/drawingml/2011/main" xmlns:a14="http://schemas.microsoft.com/office/drawing/2010/main" xmlns:m="http://schemas.openxmlformats.org/officeDocument/2006/math" xmlns="" val="1"/>
+              <ma14:wrappingTextBoxFlag xmlns="" xmlns:m="http://schemas.openxmlformats.org/officeDocument/2006/math" xmlns:a14="http://schemas.microsoft.com/office/drawing/2010/main" xmlns:ma14="http://schemas.microsoft.com/office/mac/drawingml/2011/main" val="1"/>
             </a:ext>
           </a:extLst>
         </p:spPr>
@@ -5109,7 +6686,7 @@
           </a:ln>
           <a:extLst>
             <a:ext uri="{C572A759-6A51-4108-AA02-DFA0A04FC94B}">
-              <ma14:wrappingTextBoxFlag xmlns:ma14="http://schemas.microsoft.com/office/mac/drawingml/2011/main" xmlns:a14="http://schemas.microsoft.com/office/drawing/2010/main" xmlns:m="http://schemas.openxmlformats.org/officeDocument/2006/math" xmlns="" val="1"/>
+              <ma14:wrappingTextBoxFlag xmlns="" xmlns:m="http://schemas.openxmlformats.org/officeDocument/2006/math" xmlns:a14="http://schemas.microsoft.com/office/drawing/2010/main" xmlns:ma14="http://schemas.microsoft.com/office/mac/drawingml/2011/main" val="1"/>
             </a:ext>
           </a:extLst>
         </p:spPr>
@@ -5156,7 +6733,7 @@
           </a:ln>
           <a:extLst>
             <a:ext uri="{C572A759-6A51-4108-AA02-DFA0A04FC94B}">
-              <ma14:wrappingTextBoxFlag xmlns:ma14="http://schemas.microsoft.com/office/mac/drawingml/2011/main" xmlns:a14="http://schemas.microsoft.com/office/drawing/2010/main" xmlns:m="http://schemas.openxmlformats.org/officeDocument/2006/math" xmlns="" val="1"/>
+              <ma14:wrappingTextBoxFlag xmlns="" xmlns:m="http://schemas.openxmlformats.org/officeDocument/2006/math" xmlns:a14="http://schemas.microsoft.com/office/drawing/2010/main" xmlns:ma14="http://schemas.microsoft.com/office/mac/drawingml/2011/main" val="1"/>
             </a:ext>
           </a:extLst>
         </p:spPr>
@@ -5187,7 +6764,7 @@
 </p:sld>
 </file>
 
-<file path=ppt/slides/slide2.xml><?xml version="1.0" encoding="utf-8"?>
+<file path=ppt/slides/slide10.xml><?xml version="1.0" encoding="utf-8"?>
 <p:sld xmlns:a="http://schemas.openxmlformats.org/drawingml/2006/main" xmlns:r="http://schemas.openxmlformats.org/officeDocument/2006/relationships" xmlns:p="http://schemas.openxmlformats.org/presentationml/2006/main">
   <p:cSld>
     <p:spTree>
@@ -5206,57 +6783,18 @@
       </p:grpSpPr>
       <p:sp>
         <p:nvSpPr>
-          <p:cNvPr id="2" name="Content Placeholder 1">
-            <a:extLst>
-              <a:ext uri="{FF2B5EF4-FFF2-40B4-BE49-F238E27FC236}">
-                <a16:creationId xmlns:a16="http://schemas.microsoft.com/office/drawing/2014/main" id="{7C1822AB-D5F0-D579-A820-812EE3C83EDD}"/>
-              </a:ext>
-            </a:extLst>
-          </p:cNvPr>
-          <p:cNvSpPr>
-            <a:spLocks noGrp="1"/>
-          </p:cNvSpPr>
-          <p:nvPr>
-            <p:ph/>
-          </p:nvPr>
-        </p:nvSpPr>
-        <p:spPr>
-          <a:xfrm>
-            <a:off x="375127" y="2963211"/>
-            <a:ext cx="11441743" cy="1061102"/>
-          </a:xfrm>
-        </p:spPr>
-        <p:txBody>
-          <a:bodyPr/>
-          <a:lstStyle/>
-          <a:p>
-            <a:pPr marL="0" indent="0" algn="ctr">
-              <a:buNone/>
-            </a:pPr>
-            <a:r>
-              <a:rPr lang="en-US" sz="6000" dirty="0">
-                <a:latin typeface="Arial" panose="020B0604020202020204" pitchFamily="34" charset="0"/>
-                <a:cs typeface="Arial" panose="020B0604020202020204" pitchFamily="34" charset="0"/>
-              </a:rPr>
-              <a:t>{Lesson}</a:t>
-            </a:r>
-          </a:p>
-        </p:txBody>
-      </p:sp>
-      <p:sp>
-        <p:nvSpPr>
-          <p:cNvPr id="3" name="Text Placeholder 2">
-            <a:extLst>
-              <a:ext uri="{FF2B5EF4-FFF2-40B4-BE49-F238E27FC236}">
-                <a16:creationId xmlns:a16="http://schemas.microsoft.com/office/drawing/2014/main" id="{D94C7E47-63B7-8E9D-6345-B12B99DBCE2B}"/>
-              </a:ext>
-            </a:extLst>
-          </p:cNvPr>
-          <p:cNvSpPr>
-            <a:spLocks noGrp="1"/>
-          </p:cNvSpPr>
-          <p:nvPr>
-            <p:ph type="body" sz="quarter" idx="10"/>
+          <p:cNvPr id="2" name="Title 1">
+            <a:extLst>
+              <a:ext uri="{FF2B5EF4-FFF2-40B4-BE49-F238E27FC236}">
+                <a16:creationId xmlns:a16="http://schemas.microsoft.com/office/drawing/2014/main" id="{6B937A14-F099-A9E5-AE60-86131F123055}"/>
+              </a:ext>
+            </a:extLst>
+          </p:cNvPr>
+          <p:cNvSpPr>
+            <a:spLocks noGrp="1"/>
+          </p:cNvSpPr>
+          <p:nvPr>
+            <p:ph type="title"/>
           </p:nvPr>
         </p:nvSpPr>
         <p:spPr/>
@@ -5264,14 +6802,42 @@
           <a:bodyPr/>
           <a:lstStyle/>
           <a:p>
-            <a:endParaRPr lang="en-US"/>
+            <a:r>
+              <a:rPr lang="en-US" dirty="0"/>
+              <a:t>Deception Detection Check On Learning</a:t>
+            </a:r>
+          </a:p>
+        </p:txBody>
+      </p:sp>
+      <p:sp>
+        <p:nvSpPr>
+          <p:cNvPr id="3" name="Content Placeholder 2">
+            <a:extLst>
+              <a:ext uri="{FF2B5EF4-FFF2-40B4-BE49-F238E27FC236}">
+                <a16:creationId xmlns:a16="http://schemas.microsoft.com/office/drawing/2014/main" id="{C2AE1516-AD30-1968-D700-CEA2179263C0}"/>
+              </a:ext>
+            </a:extLst>
+          </p:cNvPr>
+          <p:cNvSpPr>
+            <a:spLocks noGrp="1"/>
+          </p:cNvSpPr>
+          <p:nvPr>
+            <p:ph idx="1"/>
+          </p:nvPr>
+        </p:nvSpPr>
+        <p:spPr/>
+        <p:txBody>
+          <a:bodyPr/>
+          <a:lstStyle/>
+          <a:p>
+            <a:endParaRPr lang="en-US" dirty="0"/>
           </a:p>
         </p:txBody>
       </p:sp>
     </p:spTree>
     <p:extLst>
       <p:ext uri="{BB962C8B-B14F-4D97-AF65-F5344CB8AC3E}">
-        <p14:creationId xmlns:p14="http://schemas.microsoft.com/office/powerpoint/2010/main" val="2329516533"/>
+        <p14:creationId xmlns:p14="http://schemas.microsoft.com/office/powerpoint/2010/main" val="1577004903"/>
       </p:ext>
     </p:extLst>
   </p:cSld>
@@ -5281,7 +6847,7 @@
 </p:sld>
 </file>
 
-<file path=ppt/slides/slide3.xml><?xml version="1.0" encoding="utf-8"?>
+<file path=ppt/slides/slide11.xml><?xml version="1.0" encoding="utf-8"?>
 <p:sld xmlns:a="http://schemas.openxmlformats.org/drawingml/2006/main" xmlns:r="http://schemas.openxmlformats.org/officeDocument/2006/relationships" xmlns:p="http://schemas.openxmlformats.org/presentationml/2006/main">
   <p:cSld>
     <p:spTree>
@@ -5303,7 +6869,7 @@
           <p:cNvPr id="2" name="Title 1">
             <a:extLst>
               <a:ext uri="{FF2B5EF4-FFF2-40B4-BE49-F238E27FC236}">
-                <a16:creationId xmlns:a16="http://schemas.microsoft.com/office/drawing/2014/main" id="{0E7CCAEB-D84E-456D-3B6B-2E9573C73F98}"/>
+                <a16:creationId xmlns:a16="http://schemas.microsoft.com/office/drawing/2014/main" id="{6B937A14-F099-A9E5-AE60-86131F123055}"/>
               </a:ext>
             </a:extLst>
           </p:cNvPr>
@@ -5319,7 +6885,10 @@
           <a:bodyPr/>
           <a:lstStyle/>
           <a:p>
-            <a:endParaRPr lang="en-US"/>
+            <a:r>
+              <a:rPr lang="en-US" dirty="0"/>
+              <a:t>Deception Detection Check On Learning</a:t>
+            </a:r>
           </a:p>
         </p:txBody>
       </p:sp>
@@ -5328,7 +6897,7 @@
           <p:cNvPr id="3" name="Content Placeholder 2">
             <a:extLst>
               <a:ext uri="{FF2B5EF4-FFF2-40B4-BE49-F238E27FC236}">
-                <a16:creationId xmlns:a16="http://schemas.microsoft.com/office/drawing/2014/main" id="{0A5EC664-EFAD-501E-02EA-4124C835D47B}"/>
+                <a16:creationId xmlns:a16="http://schemas.microsoft.com/office/drawing/2014/main" id="{C2AE1516-AD30-1968-D700-CEA2179263C0}"/>
               </a:ext>
             </a:extLst>
           </p:cNvPr>
@@ -5344,14 +6913,20 @@
           <a:bodyPr/>
           <a:lstStyle/>
           <a:p>
-            <a:endParaRPr lang="en-US"/>
+            <a:r>
+              <a:rPr lang="en-US" dirty="0"/>
+              <a:t>What framework would you use for:</a:t>
+            </a:r>
+          </a:p>
+          <a:p>
+            <a:endParaRPr lang="en-US" dirty="0"/>
           </a:p>
         </p:txBody>
       </p:sp>
     </p:spTree>
     <p:extLst>
       <p:ext uri="{BB962C8B-B14F-4D97-AF65-F5344CB8AC3E}">
-        <p14:creationId xmlns:p14="http://schemas.microsoft.com/office/powerpoint/2010/main" val="2792640674"/>
+        <p14:creationId xmlns:p14="http://schemas.microsoft.com/office/powerpoint/2010/main" val="2296125235"/>
       </p:ext>
     </p:extLst>
   </p:cSld>
@@ -5361,7 +6936,173 @@
 </p:sld>
 </file>
 
-<file path=ppt/slides/slide4.xml><?xml version="1.0" encoding="utf-8"?>
+<file path=ppt/slides/slide12.xml><?xml version="1.0" encoding="utf-8"?>
+<p:sld xmlns:a="http://schemas.openxmlformats.org/drawingml/2006/main" xmlns:r="http://schemas.openxmlformats.org/officeDocument/2006/relationships" xmlns:p="http://schemas.openxmlformats.org/presentationml/2006/main">
+  <p:cSld>
+    <p:spTree>
+      <p:nvGrpSpPr>
+        <p:cNvPr id="1" name=""/>
+        <p:cNvGrpSpPr/>
+        <p:nvPr/>
+      </p:nvGrpSpPr>
+      <p:grpSpPr>
+        <a:xfrm>
+          <a:off x="0" y="0"/>
+          <a:ext cx="0" cy="0"/>
+          <a:chOff x="0" y="0"/>
+          <a:chExt cx="0" cy="0"/>
+        </a:xfrm>
+      </p:grpSpPr>
+      <p:sp>
+        <p:nvSpPr>
+          <p:cNvPr id="2" name="Title 1">
+            <a:extLst>
+              <a:ext uri="{FF2B5EF4-FFF2-40B4-BE49-F238E27FC236}">
+                <a16:creationId xmlns:a16="http://schemas.microsoft.com/office/drawing/2014/main" id="{D1C68DAF-912D-4872-669E-01FDE476A5E6}"/>
+              </a:ext>
+            </a:extLst>
+          </p:cNvPr>
+          <p:cNvSpPr>
+            <a:spLocks noGrp="1"/>
+          </p:cNvSpPr>
+          <p:nvPr>
+            <p:ph type="title"/>
+          </p:nvPr>
+        </p:nvSpPr>
+        <p:spPr/>
+        <p:txBody>
+          <a:bodyPr/>
+          <a:lstStyle/>
+          <a:p>
+            <a:r>
+              <a:rPr lang="en-US" dirty="0"/>
+              <a:t>Practical Application of Deception Detection Framework</a:t>
+            </a:r>
+          </a:p>
+        </p:txBody>
+      </p:sp>
+      <p:sp>
+        <p:nvSpPr>
+          <p:cNvPr id="3" name="Content Placeholder 2">
+            <a:extLst>
+              <a:ext uri="{FF2B5EF4-FFF2-40B4-BE49-F238E27FC236}">
+                <a16:creationId xmlns:a16="http://schemas.microsoft.com/office/drawing/2014/main" id="{ACBE4B2E-A404-1205-5D03-74E17CF90DDA}"/>
+              </a:ext>
+            </a:extLst>
+          </p:cNvPr>
+          <p:cNvSpPr>
+            <a:spLocks noGrp="1"/>
+          </p:cNvSpPr>
+          <p:nvPr>
+            <p:ph idx="1"/>
+          </p:nvPr>
+        </p:nvSpPr>
+        <p:spPr/>
+        <p:txBody>
+          <a:bodyPr/>
+          <a:lstStyle/>
+          <a:p>
+            <a:endParaRPr lang="en-US"/>
+          </a:p>
+        </p:txBody>
+      </p:sp>
+    </p:spTree>
+    <p:extLst>
+      <p:ext uri="{BB962C8B-B14F-4D97-AF65-F5344CB8AC3E}">
+        <p14:creationId xmlns:p14="http://schemas.microsoft.com/office/powerpoint/2010/main" val="1581320203"/>
+      </p:ext>
+    </p:extLst>
+  </p:cSld>
+  <p:clrMapOvr>
+    <a:masterClrMapping/>
+  </p:clrMapOvr>
+</p:sld>
+</file>
+
+<file path=ppt/slides/slide13.xml><?xml version="1.0" encoding="utf-8"?>
+<p:sld xmlns:a="http://schemas.openxmlformats.org/drawingml/2006/main" xmlns:r="http://schemas.openxmlformats.org/officeDocument/2006/relationships" xmlns:p="http://schemas.openxmlformats.org/presentationml/2006/main">
+  <p:cSld>
+    <p:spTree>
+      <p:nvGrpSpPr>
+        <p:cNvPr id="1" name=""/>
+        <p:cNvGrpSpPr/>
+        <p:nvPr/>
+      </p:nvGrpSpPr>
+      <p:grpSpPr>
+        <a:xfrm>
+          <a:off x="0" y="0"/>
+          <a:ext cx="0" cy="0"/>
+          <a:chOff x="0" y="0"/>
+          <a:chExt cx="0" cy="0"/>
+        </a:xfrm>
+      </p:grpSpPr>
+      <p:sp>
+        <p:nvSpPr>
+          <p:cNvPr id="2" name="Title 1">
+            <a:extLst>
+              <a:ext uri="{FF2B5EF4-FFF2-40B4-BE49-F238E27FC236}">
+                <a16:creationId xmlns:a16="http://schemas.microsoft.com/office/drawing/2014/main" id="{0E7CCAEB-D84E-456D-3B6B-2E9573C73F98}"/>
+              </a:ext>
+            </a:extLst>
+          </p:cNvPr>
+          <p:cNvSpPr>
+            <a:spLocks noGrp="1"/>
+          </p:cNvSpPr>
+          <p:nvPr>
+            <p:ph type="title"/>
+          </p:nvPr>
+        </p:nvSpPr>
+        <p:spPr/>
+        <p:txBody>
+          <a:bodyPr/>
+          <a:lstStyle/>
+          <a:p>
+            <a:r>
+              <a:rPr lang="en-US" dirty="0"/>
+              <a:t>Apply</a:t>
+            </a:r>
+          </a:p>
+        </p:txBody>
+      </p:sp>
+      <p:sp>
+        <p:nvSpPr>
+          <p:cNvPr id="3" name="Content Placeholder 2">
+            <a:extLst>
+              <a:ext uri="{FF2B5EF4-FFF2-40B4-BE49-F238E27FC236}">
+                <a16:creationId xmlns:a16="http://schemas.microsoft.com/office/drawing/2014/main" id="{0A5EC664-EFAD-501E-02EA-4124C835D47B}"/>
+              </a:ext>
+            </a:extLst>
+          </p:cNvPr>
+          <p:cNvSpPr>
+            <a:spLocks noGrp="1"/>
+          </p:cNvSpPr>
+          <p:nvPr>
+            <p:ph idx="1"/>
+          </p:nvPr>
+        </p:nvSpPr>
+        <p:spPr/>
+        <p:txBody>
+          <a:bodyPr/>
+          <a:lstStyle/>
+          <a:p>
+            <a:endParaRPr lang="en-US"/>
+          </a:p>
+        </p:txBody>
+      </p:sp>
+    </p:spTree>
+    <p:extLst>
+      <p:ext uri="{BB962C8B-B14F-4D97-AF65-F5344CB8AC3E}">
+        <p14:creationId xmlns:p14="http://schemas.microsoft.com/office/powerpoint/2010/main" val="2173913679"/>
+      </p:ext>
+    </p:extLst>
+  </p:cSld>
+  <p:clrMapOvr>
+    <a:masterClrMapping/>
+  </p:clrMapOvr>
+</p:sld>
+</file>
+
+<file path=ppt/slides/slide14.xml><?xml version="1.0" encoding="utf-8"?>
 <p:sld xmlns:a="http://schemas.openxmlformats.org/drawingml/2006/main" xmlns:r="http://schemas.openxmlformats.org/officeDocument/2006/relationships" xmlns:p="http://schemas.openxmlformats.org/presentationml/2006/main">
   <p:cSld>
     <p:bg>
@@ -5458,7 +7199,7 @@
           </a:prstGeom>
           <a:extLst>
             <a:ext uri="{C572A759-6A51-4108-AA02-DFA0A04FC94B}">
-              <ma14:wrappingTextBoxFlag xmlns:ma14="http://schemas.microsoft.com/office/mac/drawingml/2011/main" xmlns:a14="http://schemas.microsoft.com/office/drawing/2010/main" xmlns:m="http://schemas.openxmlformats.org/officeDocument/2006/math" xmlns="" val="1"/>
+              <ma14:wrappingTextBoxFlag xmlns="" xmlns:m="http://schemas.openxmlformats.org/officeDocument/2006/math" xmlns:a14="http://schemas.microsoft.com/office/drawing/2010/main" xmlns:ma14="http://schemas.microsoft.com/office/mac/drawingml/2011/main" val="1"/>
             </a:ext>
           </a:extLst>
         </p:spPr>
@@ -5467,7 +7208,7 @@
           <a:lstStyle/>
           <a:p>
             <a:fld id="{86CB4B4D-7CA3-9044-876B-883B54F8677D}" type="slidenum">
-              <a:t>4</a:t>
+              <a:t>14</a:t>
             </a:fld>
             <a:endParaRPr/>
           </a:p>
@@ -5482,7 +7223,7 @@
 </p:sld>
 </file>
 
-<file path=ppt/slides/slide5.xml><?xml version="1.0" encoding="utf-8"?>
+<file path=ppt/slides/slide15.xml><?xml version="1.0" encoding="utf-8"?>
 <p:sld xmlns:a="http://schemas.openxmlformats.org/drawingml/2006/main" xmlns:r="http://schemas.openxmlformats.org/officeDocument/2006/relationships" xmlns:p="http://schemas.openxmlformats.org/presentationml/2006/main">
   <p:cSld>
     <p:spTree>
@@ -5571,7 +7312,7 @@
           </a:prstGeom>
           <a:extLst>
             <a:ext uri="{C572A759-6A51-4108-AA02-DFA0A04FC94B}">
-              <ma14:wrappingTextBoxFlag xmlns:ma14="http://schemas.microsoft.com/office/mac/drawingml/2011/main" xmlns:a14="http://schemas.microsoft.com/office/drawing/2010/main" xmlns:m="http://schemas.openxmlformats.org/officeDocument/2006/math" xmlns="" val="1"/>
+              <ma14:wrappingTextBoxFlag xmlns="" xmlns:m="http://schemas.openxmlformats.org/officeDocument/2006/math" xmlns:a14="http://schemas.microsoft.com/office/drawing/2010/main" xmlns:ma14="http://schemas.microsoft.com/office/mac/drawingml/2011/main" val="1"/>
             </a:ext>
           </a:extLst>
         </p:spPr>
@@ -5580,7 +7321,7 @@
           <a:lstStyle/>
           <a:p>
             <a:fld id="{86CB4B4D-7CA3-9044-876B-883B54F8677D}" type="slidenum">
-              <a:t>5</a:t>
+              <a:t>15</a:t>
             </a:fld>
             <a:endParaRPr/>
           </a:p>
@@ -5597,7 +7338,7 @@
         <p:push dir="u"/>
       </p:transition>
     </mc:Choice>
-    <mc:Fallback xmlns:a14="http://schemas.microsoft.com/office/drawing/2010/main" xmlns:m="http://schemas.openxmlformats.org/officeDocument/2006/math" xmlns="">
+    <mc:Fallback xmlns="" xmlns:m="http://schemas.openxmlformats.org/officeDocument/2006/math" xmlns:a14="http://schemas.microsoft.com/office/drawing/2010/main">
       <p:transition spd="slow">
         <p:fade/>
       </p:transition>
@@ -5606,7 +7347,7 @@
 </p:sld>
 </file>
 
-<file path=ppt/slides/slide6.xml><?xml version="1.0" encoding="utf-8"?>
+<file path=ppt/slides/slide16.xml><?xml version="1.0" encoding="utf-8"?>
 <p:sld xmlns:a="http://schemas.openxmlformats.org/drawingml/2006/main" xmlns:r="http://schemas.openxmlformats.org/officeDocument/2006/relationships" xmlns:p="http://schemas.openxmlformats.org/presentationml/2006/main">
   <p:cSld>
     <p:bg>
@@ -5718,7 +7459,7 @@
           </a:ln>
           <a:extLst>
             <a:ext uri="{C572A759-6A51-4108-AA02-DFA0A04FC94B}">
-              <ma14:wrappingTextBoxFlag xmlns:ma14="http://schemas.microsoft.com/office/mac/drawingml/2011/main" xmlns:a14="http://schemas.microsoft.com/office/drawing/2010/main" xmlns:m="http://schemas.openxmlformats.org/officeDocument/2006/math" xmlns="" val="1"/>
+              <ma14:wrappingTextBoxFlag xmlns="" xmlns:m="http://schemas.openxmlformats.org/officeDocument/2006/math" xmlns:a14="http://schemas.microsoft.com/office/drawing/2010/main" xmlns:ma14="http://schemas.microsoft.com/office/mac/drawingml/2011/main" val="1"/>
             </a:ext>
           </a:extLst>
         </p:spPr>
@@ -5754,7 +7495,7 @@
           </a:prstGeom>
           <a:extLst>
             <a:ext uri="{C572A759-6A51-4108-AA02-DFA0A04FC94B}">
-              <ma14:wrappingTextBoxFlag xmlns:ma14="http://schemas.microsoft.com/office/mac/drawingml/2011/main" xmlns:a14="http://schemas.microsoft.com/office/drawing/2010/main" xmlns:m="http://schemas.openxmlformats.org/officeDocument/2006/math" xmlns="" val="1"/>
+              <ma14:wrappingTextBoxFlag xmlns="" xmlns:m="http://schemas.openxmlformats.org/officeDocument/2006/math" xmlns:a14="http://schemas.microsoft.com/office/drawing/2010/main" xmlns:ma14="http://schemas.microsoft.com/office/mac/drawingml/2011/main" val="1"/>
             </a:ext>
           </a:extLst>
         </p:spPr>
@@ -5764,7 +7505,7 @@
           <a:p>
             <a:fld id="{86CB4B4D-7CA3-9044-876B-883B54F8677D}" type="slidenum">
               <a:rPr/>
-              <a:t>6</a:t>
+              <a:t>16</a:t>
             </a:fld>
             <a:endParaRPr/>
           </a:p>
@@ -5781,7 +7522,7 @@
         <p:push dir="u"/>
       </p:transition>
     </mc:Choice>
-    <mc:Fallback xmlns:a14="http://schemas.microsoft.com/office/drawing/2010/main" xmlns:m="http://schemas.openxmlformats.org/officeDocument/2006/math" xmlns="">
+    <mc:Fallback xmlns="" xmlns:m="http://schemas.openxmlformats.org/officeDocument/2006/math" xmlns:a14="http://schemas.microsoft.com/office/drawing/2010/main">
       <p:transition spd="slow">
         <p:fade/>
       </p:transition>
@@ -5790,7 +7531,7 @@
 </p:sld>
 </file>
 
-<file path=ppt/slides/slide7.xml><?xml version="1.0" encoding="utf-8"?>
+<file path=ppt/slides/slide17.xml><?xml version="1.0" encoding="utf-8"?>
 <p:sld xmlns:a="http://schemas.openxmlformats.org/drawingml/2006/main" xmlns:r="http://schemas.openxmlformats.org/officeDocument/2006/relationships" xmlns:p="http://schemas.openxmlformats.org/presentationml/2006/main">
   <p:cSld>
     <p:spTree>
@@ -5894,7 +7635,7 @@
           </a:ln>
           <a:extLst>
             <a:ext uri="{C572A759-6A51-4108-AA02-DFA0A04FC94B}">
-              <ma14:wrappingTextBoxFlag xmlns:ma14="http://schemas.microsoft.com/office/mac/drawingml/2011/main" xmlns:a14="http://schemas.microsoft.com/office/drawing/2010/main" xmlns:m="http://schemas.openxmlformats.org/officeDocument/2006/math" xmlns="" val="1"/>
+              <ma14:wrappingTextBoxFlag xmlns="" xmlns:m="http://schemas.openxmlformats.org/officeDocument/2006/math" xmlns:a14="http://schemas.microsoft.com/office/drawing/2010/main" xmlns:ma14="http://schemas.microsoft.com/office/mac/drawingml/2011/main" val="1"/>
             </a:ext>
           </a:extLst>
         </p:spPr>
@@ -5930,7 +7671,7 @@
           </a:prstGeom>
           <a:extLst>
             <a:ext uri="{C572A759-6A51-4108-AA02-DFA0A04FC94B}">
-              <ma14:wrappingTextBoxFlag xmlns:ma14="http://schemas.microsoft.com/office/mac/drawingml/2011/main" xmlns:a14="http://schemas.microsoft.com/office/drawing/2010/main" xmlns:m="http://schemas.openxmlformats.org/officeDocument/2006/math" xmlns="" val="1"/>
+              <ma14:wrappingTextBoxFlag xmlns="" xmlns:m="http://schemas.openxmlformats.org/officeDocument/2006/math" xmlns:a14="http://schemas.microsoft.com/office/drawing/2010/main" xmlns:ma14="http://schemas.microsoft.com/office/mac/drawingml/2011/main" val="1"/>
             </a:ext>
           </a:extLst>
         </p:spPr>
@@ -5939,7 +7680,7 @@
           <a:lstStyle/>
           <a:p>
             <a:fld id="{86CB4B4D-7CA3-9044-876B-883B54F8677D}" type="slidenum">
-              <a:t>7</a:t>
+              <a:t>17</a:t>
             </a:fld>
             <a:endParaRPr/>
           </a:p>
@@ -5951,6 +7692,792 @@
     <a:masterClrMapping/>
   </p:clrMapOvr>
   <p:transition spd="med"/>
+</p:sld>
+</file>
+
+<file path=ppt/slides/slide2.xml><?xml version="1.0" encoding="utf-8"?>
+<p:sld xmlns:a="http://schemas.openxmlformats.org/drawingml/2006/main" xmlns:r="http://schemas.openxmlformats.org/officeDocument/2006/relationships" xmlns:p="http://schemas.openxmlformats.org/presentationml/2006/main">
+  <p:cSld>
+    <p:spTree>
+      <p:nvGrpSpPr>
+        <p:cNvPr id="1" name=""/>
+        <p:cNvGrpSpPr/>
+        <p:nvPr/>
+      </p:nvGrpSpPr>
+      <p:grpSpPr>
+        <a:xfrm>
+          <a:off x="0" y="0"/>
+          <a:ext cx="0" cy="0"/>
+          <a:chOff x="0" y="0"/>
+          <a:chExt cx="0" cy="0"/>
+        </a:xfrm>
+      </p:grpSpPr>
+      <p:sp>
+        <p:nvSpPr>
+          <p:cNvPr id="2" name="Title 1">
+            <a:extLst>
+              <a:ext uri="{FF2B5EF4-FFF2-40B4-BE49-F238E27FC236}">
+                <a16:creationId xmlns:a16="http://schemas.microsoft.com/office/drawing/2014/main" id="{0E7CCAEB-D84E-456D-3B6B-2E9573C73F98}"/>
+              </a:ext>
+            </a:extLst>
+          </p:cNvPr>
+          <p:cNvSpPr>
+            <a:spLocks noGrp="1"/>
+          </p:cNvSpPr>
+          <p:nvPr>
+            <p:ph type="title"/>
+          </p:nvPr>
+        </p:nvSpPr>
+        <p:spPr/>
+        <p:txBody>
+          <a:bodyPr/>
+          <a:lstStyle/>
+          <a:p>
+            <a:r>
+              <a:rPr lang="en-US" dirty="0"/>
+              <a:t>Concrete Experience</a:t>
+            </a:r>
+          </a:p>
+        </p:txBody>
+      </p:sp>
+      <p:sp>
+        <p:nvSpPr>
+          <p:cNvPr id="4" name="Content Placeholder 3">
+            <a:extLst>
+              <a:ext uri="{FF2B5EF4-FFF2-40B4-BE49-F238E27FC236}">
+                <a16:creationId xmlns:a16="http://schemas.microsoft.com/office/drawing/2014/main" id="{6829B1A1-22E4-F78F-D9BF-6FBA3FDF0A5B}"/>
+              </a:ext>
+            </a:extLst>
+          </p:cNvPr>
+          <p:cNvSpPr>
+            <a:spLocks noGrp="1"/>
+          </p:cNvSpPr>
+          <p:nvPr>
+            <p:ph sz="half" idx="1"/>
+          </p:nvPr>
+        </p:nvSpPr>
+        <p:spPr/>
+        <p:txBody>
+          <a:bodyPr/>
+          <a:lstStyle/>
+          <a:p>
+            <a:r>
+              <a:rPr lang="en-US" dirty="0"/>
+              <a:t>The Earth is Flat	</a:t>
+            </a:r>
+          </a:p>
+        </p:txBody>
+      </p:sp>
+      <p:sp>
+        <p:nvSpPr>
+          <p:cNvPr id="5" name="Content Placeholder 4">
+            <a:extLst>
+              <a:ext uri="{FF2B5EF4-FFF2-40B4-BE49-F238E27FC236}">
+                <a16:creationId xmlns:a16="http://schemas.microsoft.com/office/drawing/2014/main" id="{5F4F656B-7E5D-5B6A-49BD-608B49861CF4}"/>
+              </a:ext>
+            </a:extLst>
+          </p:cNvPr>
+          <p:cNvSpPr>
+            <a:spLocks noGrp="1"/>
+          </p:cNvSpPr>
+          <p:nvPr>
+            <p:ph sz="half" idx="2"/>
+          </p:nvPr>
+        </p:nvSpPr>
+        <p:spPr/>
+        <p:txBody>
+          <a:bodyPr/>
+          <a:lstStyle/>
+          <a:p>
+            <a:r>
+              <a:rPr lang="en-US" dirty="0"/>
+              <a:t>The Earth is a Cube</a:t>
+            </a:r>
+          </a:p>
+        </p:txBody>
+      </p:sp>
+    </p:spTree>
+    <p:extLst>
+      <p:ext uri="{BB962C8B-B14F-4D97-AF65-F5344CB8AC3E}">
+        <p14:creationId xmlns:p14="http://schemas.microsoft.com/office/powerpoint/2010/main" val="2792640674"/>
+      </p:ext>
+    </p:extLst>
+  </p:cSld>
+  <p:clrMapOvr>
+    <a:masterClrMapping/>
+  </p:clrMapOvr>
+</p:sld>
+</file>
+
+<file path=ppt/slides/slide3.xml><?xml version="1.0" encoding="utf-8"?>
+<p:sld xmlns:a="http://schemas.openxmlformats.org/drawingml/2006/main" xmlns:r="http://schemas.openxmlformats.org/officeDocument/2006/relationships" xmlns:p="http://schemas.openxmlformats.org/presentationml/2006/main">
+  <p:cSld>
+    <p:spTree>
+      <p:nvGrpSpPr>
+        <p:cNvPr id="1" name=""/>
+        <p:cNvGrpSpPr/>
+        <p:nvPr/>
+      </p:nvGrpSpPr>
+      <p:grpSpPr>
+        <a:xfrm>
+          <a:off x="0" y="0"/>
+          <a:ext cx="0" cy="0"/>
+          <a:chOff x="0" y="0"/>
+          <a:chExt cx="0" cy="0"/>
+        </a:xfrm>
+      </p:grpSpPr>
+      <p:sp>
+        <p:nvSpPr>
+          <p:cNvPr id="2" name="Content Placeholder 1">
+            <a:extLst>
+              <a:ext uri="{FF2B5EF4-FFF2-40B4-BE49-F238E27FC236}">
+                <a16:creationId xmlns:a16="http://schemas.microsoft.com/office/drawing/2014/main" id="{7C1822AB-D5F0-D579-A820-812EE3C83EDD}"/>
+              </a:ext>
+            </a:extLst>
+          </p:cNvPr>
+          <p:cNvSpPr>
+            <a:spLocks noGrp="1"/>
+          </p:cNvSpPr>
+          <p:nvPr>
+            <p:ph/>
+          </p:nvPr>
+        </p:nvSpPr>
+        <p:spPr>
+          <a:xfrm>
+            <a:off x="375127" y="2963211"/>
+            <a:ext cx="11441743" cy="1061102"/>
+          </a:xfrm>
+        </p:spPr>
+        <p:txBody>
+          <a:bodyPr/>
+          <a:lstStyle/>
+          <a:p>
+            <a:pPr marL="0" indent="0" algn="ctr">
+              <a:buNone/>
+            </a:pPr>
+            <a:r>
+              <a:rPr lang="en-US" sz="6000" dirty="0">
+                <a:latin typeface="Arial" panose="020B0604020202020204" pitchFamily="34" charset="0"/>
+                <a:cs typeface="Arial" panose="020B0604020202020204" pitchFamily="34" charset="0"/>
+              </a:rPr>
+              <a:t>Identifying Malign Information</a:t>
+            </a:r>
+          </a:p>
+        </p:txBody>
+      </p:sp>
+      <p:sp>
+        <p:nvSpPr>
+          <p:cNvPr id="3" name="Text Placeholder 2">
+            <a:extLst>
+              <a:ext uri="{FF2B5EF4-FFF2-40B4-BE49-F238E27FC236}">
+                <a16:creationId xmlns:a16="http://schemas.microsoft.com/office/drawing/2014/main" id="{D94C7E47-63B7-8E9D-6345-B12B99DBCE2B}"/>
+              </a:ext>
+            </a:extLst>
+          </p:cNvPr>
+          <p:cNvSpPr>
+            <a:spLocks noGrp="1"/>
+          </p:cNvSpPr>
+          <p:nvPr>
+            <p:ph type="body" sz="quarter" idx="10"/>
+          </p:nvPr>
+        </p:nvSpPr>
+        <p:spPr/>
+        <p:txBody>
+          <a:bodyPr/>
+          <a:lstStyle/>
+          <a:p>
+            <a:endParaRPr lang="en-US"/>
+          </a:p>
+        </p:txBody>
+      </p:sp>
+    </p:spTree>
+    <p:extLst>
+      <p:ext uri="{BB962C8B-B14F-4D97-AF65-F5344CB8AC3E}">
+        <p14:creationId xmlns:p14="http://schemas.microsoft.com/office/powerpoint/2010/main" val="2329516533"/>
+      </p:ext>
+    </p:extLst>
+  </p:cSld>
+  <p:clrMapOvr>
+    <a:masterClrMapping/>
+  </p:clrMapOvr>
+</p:sld>
+</file>
+
+<file path=ppt/slides/slide4.xml><?xml version="1.0" encoding="utf-8"?>
+<p:sld xmlns:a="http://schemas.openxmlformats.org/drawingml/2006/main" xmlns:r="http://schemas.openxmlformats.org/officeDocument/2006/relationships" xmlns:p="http://schemas.openxmlformats.org/presentationml/2006/main">
+  <p:cSld>
+    <p:spTree>
+      <p:nvGrpSpPr>
+        <p:cNvPr id="1" name=""/>
+        <p:cNvGrpSpPr/>
+        <p:nvPr/>
+      </p:nvGrpSpPr>
+      <p:grpSpPr>
+        <a:xfrm>
+          <a:off x="0" y="0"/>
+          <a:ext cx="0" cy="0"/>
+          <a:chOff x="0" y="0"/>
+          <a:chExt cx="0" cy="0"/>
+        </a:xfrm>
+      </p:grpSpPr>
+      <p:sp>
+        <p:nvSpPr>
+          <p:cNvPr id="2" name="Title 1">
+            <a:extLst>
+              <a:ext uri="{FF2B5EF4-FFF2-40B4-BE49-F238E27FC236}">
+                <a16:creationId xmlns:a16="http://schemas.microsoft.com/office/drawing/2014/main" id="{0E7CCAEB-D84E-456D-3B6B-2E9573C73F98}"/>
+              </a:ext>
+            </a:extLst>
+          </p:cNvPr>
+          <p:cNvSpPr>
+            <a:spLocks noGrp="1"/>
+          </p:cNvSpPr>
+          <p:nvPr>
+            <p:ph type="title"/>
+          </p:nvPr>
+        </p:nvSpPr>
+        <p:spPr/>
+        <p:txBody>
+          <a:bodyPr/>
+          <a:lstStyle/>
+          <a:p>
+            <a:r>
+              <a:rPr lang="en-US" dirty="0"/>
+              <a:t>Publish and Process</a:t>
+            </a:r>
+          </a:p>
+        </p:txBody>
+      </p:sp>
+      <p:sp>
+        <p:nvSpPr>
+          <p:cNvPr id="3" name="Content Placeholder 2">
+            <a:extLst>
+              <a:ext uri="{FF2B5EF4-FFF2-40B4-BE49-F238E27FC236}">
+                <a16:creationId xmlns:a16="http://schemas.microsoft.com/office/drawing/2014/main" id="{0A5EC664-EFAD-501E-02EA-4124C835D47B}"/>
+              </a:ext>
+            </a:extLst>
+          </p:cNvPr>
+          <p:cNvSpPr>
+            <a:spLocks noGrp="1"/>
+          </p:cNvSpPr>
+          <p:nvPr>
+            <p:ph idx="1"/>
+          </p:nvPr>
+        </p:nvSpPr>
+        <p:spPr/>
+        <p:txBody>
+          <a:bodyPr/>
+          <a:lstStyle/>
+          <a:p>
+            <a:endParaRPr lang="en-US"/>
+          </a:p>
+        </p:txBody>
+      </p:sp>
+    </p:spTree>
+    <p:extLst>
+      <p:ext uri="{BB962C8B-B14F-4D97-AF65-F5344CB8AC3E}">
+        <p14:creationId xmlns:p14="http://schemas.microsoft.com/office/powerpoint/2010/main" val="1569607924"/>
+      </p:ext>
+    </p:extLst>
+  </p:cSld>
+  <p:clrMapOvr>
+    <a:masterClrMapping/>
+  </p:clrMapOvr>
+</p:sld>
+</file>
+
+<file path=ppt/slides/slide5.xml><?xml version="1.0" encoding="utf-8"?>
+<p:sld xmlns:a="http://schemas.openxmlformats.org/drawingml/2006/main" xmlns:r="http://schemas.openxmlformats.org/officeDocument/2006/relationships" xmlns:p="http://schemas.openxmlformats.org/presentationml/2006/main">
+  <p:cSld>
+    <p:spTree>
+      <p:nvGrpSpPr>
+        <p:cNvPr id="1" name=""/>
+        <p:cNvGrpSpPr/>
+        <p:nvPr/>
+      </p:nvGrpSpPr>
+      <p:grpSpPr>
+        <a:xfrm>
+          <a:off x="0" y="0"/>
+          <a:ext cx="0" cy="0"/>
+          <a:chOff x="0" y="0"/>
+          <a:chExt cx="0" cy="0"/>
+        </a:xfrm>
+      </p:grpSpPr>
+      <p:sp>
+        <p:nvSpPr>
+          <p:cNvPr id="2" name="Title 1">
+            <a:extLst>
+              <a:ext uri="{FF2B5EF4-FFF2-40B4-BE49-F238E27FC236}">
+                <a16:creationId xmlns:a16="http://schemas.microsoft.com/office/drawing/2014/main" id="{0E7CCAEB-D84E-456D-3B6B-2E9573C73F98}"/>
+              </a:ext>
+            </a:extLst>
+          </p:cNvPr>
+          <p:cNvSpPr>
+            <a:spLocks noGrp="1"/>
+          </p:cNvSpPr>
+          <p:nvPr>
+            <p:ph type="title"/>
+          </p:nvPr>
+        </p:nvSpPr>
+        <p:spPr/>
+        <p:txBody>
+          <a:bodyPr/>
+          <a:lstStyle/>
+          <a:p>
+            <a:r>
+              <a:rPr lang="en-US" dirty="0"/>
+              <a:t>Deception Detection Framework</a:t>
+            </a:r>
+          </a:p>
+        </p:txBody>
+      </p:sp>
+      <p:sp>
+        <p:nvSpPr>
+          <p:cNvPr id="3" name="Content Placeholder 2">
+            <a:extLst>
+              <a:ext uri="{FF2B5EF4-FFF2-40B4-BE49-F238E27FC236}">
+                <a16:creationId xmlns:a16="http://schemas.microsoft.com/office/drawing/2014/main" id="{0A5EC664-EFAD-501E-02EA-4124C835D47B}"/>
+              </a:ext>
+            </a:extLst>
+          </p:cNvPr>
+          <p:cNvSpPr>
+            <a:spLocks noGrp="1"/>
+          </p:cNvSpPr>
+          <p:nvPr>
+            <p:ph idx="1"/>
+          </p:nvPr>
+        </p:nvSpPr>
+        <p:spPr/>
+        <p:txBody>
+          <a:bodyPr/>
+          <a:lstStyle/>
+          <a:p>
+            <a:r>
+              <a:rPr lang="en-US" dirty="0"/>
+              <a:t>1. Present examples of different motives, opportunities, and means in influence operations:</a:t>
+            </a:r>
+          </a:p>
+          <a:p>
+            <a:r>
+              <a:rPr lang="en-US" dirty="0"/>
+              <a:t>    - Example: Political gains from spreading false allegation about rival.</a:t>
+            </a:r>
+          </a:p>
+          <a:p>
+            <a:r>
+              <a:rPr lang="en-US" dirty="0"/>
+              <a:t>    - Example: Using social media channels to disseminate false information.</a:t>
+            </a:r>
+          </a:p>
+          <a:p>
+            <a:r>
+              <a:rPr lang="en-US" dirty="0"/>
+              <a:t>2. Discuss how to assess these components in various scenarios:</a:t>
+            </a:r>
+          </a:p>
+          <a:p>
+            <a:r>
+              <a:rPr lang="en-US" dirty="0"/>
+              <a:t>    - Identify the goals and motives behind the information.</a:t>
+            </a:r>
+          </a:p>
+          <a:p>
+            <a:r>
+              <a:rPr lang="en-US" dirty="0"/>
+              <a:t>    - Evaluate the channels available for spreading misinformation.</a:t>
+            </a:r>
+          </a:p>
+          <a:p>
+            <a:r>
+              <a:rPr lang="en-US" dirty="0"/>
+              <a:t>    - Assess the risks and costs involved in the deception.</a:t>
+            </a:r>
+          </a:p>
+        </p:txBody>
+      </p:sp>
+    </p:spTree>
+    <p:extLst>
+      <p:ext uri="{BB962C8B-B14F-4D97-AF65-F5344CB8AC3E}">
+        <p14:creationId xmlns:p14="http://schemas.microsoft.com/office/powerpoint/2010/main" val="313808639"/>
+      </p:ext>
+    </p:extLst>
+  </p:cSld>
+  <p:clrMapOvr>
+    <a:masterClrMapping/>
+  </p:clrMapOvr>
+</p:sld>
+</file>
+
+<file path=ppt/slides/slide6.xml><?xml version="1.0" encoding="utf-8"?>
+<p:sld xmlns:a="http://schemas.openxmlformats.org/drawingml/2006/main" xmlns:r="http://schemas.openxmlformats.org/officeDocument/2006/relationships" xmlns:p="http://schemas.openxmlformats.org/presentationml/2006/main">
+  <p:cSld>
+    <p:spTree>
+      <p:nvGrpSpPr>
+        <p:cNvPr id="1" name=""/>
+        <p:cNvGrpSpPr/>
+        <p:nvPr/>
+      </p:nvGrpSpPr>
+      <p:grpSpPr>
+        <a:xfrm>
+          <a:off x="0" y="0"/>
+          <a:ext cx="0" cy="0"/>
+          <a:chOff x="0" y="0"/>
+          <a:chExt cx="0" cy="0"/>
+        </a:xfrm>
+      </p:grpSpPr>
+      <p:sp>
+        <p:nvSpPr>
+          <p:cNvPr id="2" name="Title 1">
+            <a:extLst>
+              <a:ext uri="{FF2B5EF4-FFF2-40B4-BE49-F238E27FC236}">
+                <a16:creationId xmlns:a16="http://schemas.microsoft.com/office/drawing/2014/main" id="{0E7CCAEB-D84E-456D-3B6B-2E9573C73F98}"/>
+              </a:ext>
+            </a:extLst>
+          </p:cNvPr>
+          <p:cNvSpPr>
+            <a:spLocks noGrp="1"/>
+          </p:cNvSpPr>
+          <p:nvPr>
+            <p:ph type="title"/>
+          </p:nvPr>
+        </p:nvSpPr>
+        <p:spPr/>
+        <p:txBody>
+          <a:bodyPr/>
+          <a:lstStyle/>
+          <a:p>
+            <a:r>
+              <a:rPr lang="en-US" dirty="0"/>
+              <a:t>Motive, Opportunity, and Means (MOM)</a:t>
+            </a:r>
+          </a:p>
+        </p:txBody>
+      </p:sp>
+      <p:sp>
+        <p:nvSpPr>
+          <p:cNvPr id="3" name="Content Placeholder 2">
+            <a:extLst>
+              <a:ext uri="{FF2B5EF4-FFF2-40B4-BE49-F238E27FC236}">
+                <a16:creationId xmlns:a16="http://schemas.microsoft.com/office/drawing/2014/main" id="{0A5EC664-EFAD-501E-02EA-4124C835D47B}"/>
+              </a:ext>
+            </a:extLst>
+          </p:cNvPr>
+          <p:cNvSpPr>
+            <a:spLocks noGrp="1"/>
+          </p:cNvSpPr>
+          <p:nvPr>
+            <p:ph idx="1"/>
+          </p:nvPr>
+        </p:nvSpPr>
+        <p:spPr/>
+        <p:txBody>
+          <a:bodyPr>
+            <a:normAutofit/>
+          </a:bodyPr>
+          <a:lstStyle/>
+          <a:p>
+            <a:r>
+              <a:rPr lang="en-US" dirty="0"/>
+              <a:t>1. Present examples of different motives, opportunities, and means in influence operations:</a:t>
+            </a:r>
+          </a:p>
+          <a:p>
+            <a:r>
+              <a:rPr lang="en-US" dirty="0"/>
+              <a:t>    - Example: Political gains from spreading false allegation about rival.</a:t>
+            </a:r>
+          </a:p>
+          <a:p>
+            <a:r>
+              <a:rPr lang="en-US" dirty="0"/>
+              <a:t>    - Example: Using social media channels to disseminate false information.</a:t>
+            </a:r>
+          </a:p>
+          <a:p>
+            <a:r>
+              <a:rPr lang="en-US" dirty="0"/>
+              <a:t>2. Discuss how to assess these components in various scenarios:</a:t>
+            </a:r>
+          </a:p>
+          <a:p>
+            <a:r>
+              <a:rPr lang="en-US" dirty="0"/>
+              <a:t>    - Identify the goals and motives behind the information.</a:t>
+            </a:r>
+          </a:p>
+          <a:p>
+            <a:r>
+              <a:rPr lang="en-US" dirty="0"/>
+              <a:t>    - Evaluate the channels available for spreading misinformation.</a:t>
+            </a:r>
+          </a:p>
+          <a:p>
+            <a:r>
+              <a:rPr lang="en-US" dirty="0"/>
+              <a:t>    - Assess the risks and costs involved in the deception.</a:t>
+            </a:r>
+          </a:p>
+        </p:txBody>
+      </p:sp>
+    </p:spTree>
+    <p:extLst>
+      <p:ext uri="{BB962C8B-B14F-4D97-AF65-F5344CB8AC3E}">
+        <p14:creationId xmlns:p14="http://schemas.microsoft.com/office/powerpoint/2010/main" val="4036291633"/>
+      </p:ext>
+    </p:extLst>
+  </p:cSld>
+  <p:clrMapOvr>
+    <a:masterClrMapping/>
+  </p:clrMapOvr>
+</p:sld>
+</file>
+
+<file path=ppt/slides/slide7.xml><?xml version="1.0" encoding="utf-8"?>
+<p:sld xmlns:a="http://schemas.openxmlformats.org/drawingml/2006/main" xmlns:r="http://schemas.openxmlformats.org/officeDocument/2006/relationships" xmlns:p="http://schemas.openxmlformats.org/presentationml/2006/main">
+  <p:cSld>
+    <p:spTree>
+      <p:nvGrpSpPr>
+        <p:cNvPr id="1" name=""/>
+        <p:cNvGrpSpPr/>
+        <p:nvPr/>
+      </p:nvGrpSpPr>
+      <p:grpSpPr>
+        <a:xfrm>
+          <a:off x="0" y="0"/>
+          <a:ext cx="0" cy="0"/>
+          <a:chOff x="0" y="0"/>
+          <a:chExt cx="0" cy="0"/>
+        </a:xfrm>
+      </p:grpSpPr>
+      <p:sp>
+        <p:nvSpPr>
+          <p:cNvPr id="2" name="Title 1">
+            <a:extLst>
+              <a:ext uri="{FF2B5EF4-FFF2-40B4-BE49-F238E27FC236}">
+                <a16:creationId xmlns:a16="http://schemas.microsoft.com/office/drawing/2014/main" id="{0E7CCAEB-D84E-456D-3B6B-2E9573C73F98}"/>
+              </a:ext>
+            </a:extLst>
+          </p:cNvPr>
+          <p:cNvSpPr>
+            <a:spLocks noGrp="1"/>
+          </p:cNvSpPr>
+          <p:nvPr>
+            <p:ph type="title"/>
+          </p:nvPr>
+        </p:nvSpPr>
+        <p:spPr/>
+        <p:txBody>
+          <a:bodyPr/>
+          <a:lstStyle/>
+          <a:p>
+            <a:r>
+              <a:rPr lang="en-US" dirty="0"/>
+              <a:t>Past Opposition Practices (POP)</a:t>
+            </a:r>
+          </a:p>
+        </p:txBody>
+      </p:sp>
+      <p:sp>
+        <p:nvSpPr>
+          <p:cNvPr id="3" name="Content Placeholder 2">
+            <a:extLst>
+              <a:ext uri="{FF2B5EF4-FFF2-40B4-BE49-F238E27FC236}">
+                <a16:creationId xmlns:a16="http://schemas.microsoft.com/office/drawing/2014/main" id="{0A5EC664-EFAD-501E-02EA-4124C835D47B}"/>
+              </a:ext>
+            </a:extLst>
+          </p:cNvPr>
+          <p:cNvSpPr>
+            <a:spLocks noGrp="1"/>
+          </p:cNvSpPr>
+          <p:nvPr>
+            <p:ph idx="1"/>
+          </p:nvPr>
+        </p:nvSpPr>
+        <p:spPr/>
+        <p:txBody>
+          <a:bodyPr/>
+          <a:lstStyle/>
+          <a:p>
+            <a:endParaRPr lang="en-US"/>
+          </a:p>
+        </p:txBody>
+      </p:sp>
+    </p:spTree>
+    <p:extLst>
+      <p:ext uri="{BB962C8B-B14F-4D97-AF65-F5344CB8AC3E}">
+        <p14:creationId xmlns:p14="http://schemas.microsoft.com/office/powerpoint/2010/main" val="1926719575"/>
+      </p:ext>
+    </p:extLst>
+  </p:cSld>
+  <p:clrMapOvr>
+    <a:masterClrMapping/>
+  </p:clrMapOvr>
+</p:sld>
+</file>
+
+<file path=ppt/slides/slide8.xml><?xml version="1.0" encoding="utf-8"?>
+<p:sld xmlns:a="http://schemas.openxmlformats.org/drawingml/2006/main" xmlns:r="http://schemas.openxmlformats.org/officeDocument/2006/relationships" xmlns:p="http://schemas.openxmlformats.org/presentationml/2006/main">
+  <p:cSld>
+    <p:spTree>
+      <p:nvGrpSpPr>
+        <p:cNvPr id="1" name=""/>
+        <p:cNvGrpSpPr/>
+        <p:nvPr/>
+      </p:nvGrpSpPr>
+      <p:grpSpPr>
+        <a:xfrm>
+          <a:off x="0" y="0"/>
+          <a:ext cx="0" cy="0"/>
+          <a:chOff x="0" y="0"/>
+          <a:chExt cx="0" cy="0"/>
+        </a:xfrm>
+      </p:grpSpPr>
+      <p:sp>
+        <p:nvSpPr>
+          <p:cNvPr id="2" name="Title 1">
+            <a:extLst>
+              <a:ext uri="{FF2B5EF4-FFF2-40B4-BE49-F238E27FC236}">
+                <a16:creationId xmlns:a16="http://schemas.microsoft.com/office/drawing/2014/main" id="{0E7CCAEB-D84E-456D-3B6B-2E9573C73F98}"/>
+              </a:ext>
+            </a:extLst>
+          </p:cNvPr>
+          <p:cNvSpPr>
+            <a:spLocks noGrp="1"/>
+          </p:cNvSpPr>
+          <p:nvPr>
+            <p:ph type="title"/>
+          </p:nvPr>
+        </p:nvSpPr>
+        <p:spPr/>
+        <p:txBody>
+          <a:bodyPr/>
+          <a:lstStyle/>
+          <a:p>
+            <a:r>
+              <a:rPr lang="en-US" dirty="0"/>
+              <a:t>Manipulability of Sources (MOSES)</a:t>
+            </a:r>
+          </a:p>
+        </p:txBody>
+      </p:sp>
+      <p:sp>
+        <p:nvSpPr>
+          <p:cNvPr id="3" name="Content Placeholder 2">
+            <a:extLst>
+              <a:ext uri="{FF2B5EF4-FFF2-40B4-BE49-F238E27FC236}">
+                <a16:creationId xmlns:a16="http://schemas.microsoft.com/office/drawing/2014/main" id="{0A5EC664-EFAD-501E-02EA-4124C835D47B}"/>
+              </a:ext>
+            </a:extLst>
+          </p:cNvPr>
+          <p:cNvSpPr>
+            <a:spLocks noGrp="1"/>
+          </p:cNvSpPr>
+          <p:nvPr>
+            <p:ph idx="1"/>
+          </p:nvPr>
+        </p:nvSpPr>
+        <p:spPr/>
+        <p:txBody>
+          <a:bodyPr/>
+          <a:lstStyle/>
+          <a:p>
+            <a:endParaRPr lang="en-US"/>
+          </a:p>
+        </p:txBody>
+      </p:sp>
+    </p:spTree>
+    <p:extLst>
+      <p:ext uri="{BB962C8B-B14F-4D97-AF65-F5344CB8AC3E}">
+        <p14:creationId xmlns:p14="http://schemas.microsoft.com/office/powerpoint/2010/main" val="3769904834"/>
+      </p:ext>
+    </p:extLst>
+  </p:cSld>
+  <p:clrMapOvr>
+    <a:masterClrMapping/>
+  </p:clrMapOvr>
+</p:sld>
+</file>
+
+<file path=ppt/slides/slide9.xml><?xml version="1.0" encoding="utf-8"?>
+<p:sld xmlns:a="http://schemas.openxmlformats.org/drawingml/2006/main" xmlns:r="http://schemas.openxmlformats.org/officeDocument/2006/relationships" xmlns:p="http://schemas.openxmlformats.org/presentationml/2006/main">
+  <p:cSld>
+    <p:spTree>
+      <p:nvGrpSpPr>
+        <p:cNvPr id="1" name=""/>
+        <p:cNvGrpSpPr/>
+        <p:nvPr/>
+      </p:nvGrpSpPr>
+      <p:grpSpPr>
+        <a:xfrm>
+          <a:off x="0" y="0"/>
+          <a:ext cx="0" cy="0"/>
+          <a:chOff x="0" y="0"/>
+          <a:chExt cx="0" cy="0"/>
+        </a:xfrm>
+      </p:grpSpPr>
+      <p:sp>
+        <p:nvSpPr>
+          <p:cNvPr id="2" name="Title 1">
+            <a:extLst>
+              <a:ext uri="{FF2B5EF4-FFF2-40B4-BE49-F238E27FC236}">
+                <a16:creationId xmlns:a16="http://schemas.microsoft.com/office/drawing/2014/main" id="{0E7CCAEB-D84E-456D-3B6B-2E9573C73F98}"/>
+              </a:ext>
+            </a:extLst>
+          </p:cNvPr>
+          <p:cNvSpPr>
+            <a:spLocks noGrp="1"/>
+          </p:cNvSpPr>
+          <p:nvPr>
+            <p:ph type="title"/>
+          </p:nvPr>
+        </p:nvSpPr>
+        <p:spPr/>
+        <p:txBody>
+          <a:bodyPr/>
+          <a:lstStyle/>
+          <a:p>
+            <a:r>
+              <a:rPr lang="en-US" dirty="0"/>
+              <a:t>Evaluation of Evidence (EVE)</a:t>
+            </a:r>
+          </a:p>
+        </p:txBody>
+      </p:sp>
+      <p:sp>
+        <p:nvSpPr>
+          <p:cNvPr id="3" name="Content Placeholder 2">
+            <a:extLst>
+              <a:ext uri="{FF2B5EF4-FFF2-40B4-BE49-F238E27FC236}">
+                <a16:creationId xmlns:a16="http://schemas.microsoft.com/office/drawing/2014/main" id="{0A5EC664-EFAD-501E-02EA-4124C835D47B}"/>
+              </a:ext>
+            </a:extLst>
+          </p:cNvPr>
+          <p:cNvSpPr>
+            <a:spLocks noGrp="1"/>
+          </p:cNvSpPr>
+          <p:nvPr>
+            <p:ph idx="1"/>
+          </p:nvPr>
+        </p:nvSpPr>
+        <p:spPr/>
+        <p:txBody>
+          <a:bodyPr/>
+          <a:lstStyle/>
+          <a:p>
+            <a:endParaRPr lang="en-US"/>
+          </a:p>
+        </p:txBody>
+      </p:sp>
+    </p:spTree>
+    <p:extLst>
+      <p:ext uri="{BB962C8B-B14F-4D97-AF65-F5344CB8AC3E}">
+        <p14:creationId xmlns:p14="http://schemas.microsoft.com/office/powerpoint/2010/main" val="3190735002"/>
+      </p:ext>
+    </p:extLst>
+  </p:cSld>
+  <p:clrMapOvr>
+    <a:masterClrMapping/>
+  </p:clrMapOvr>
 </p:sld>
 </file>
 

</xml_diff>

<commit_message>
added slide layout for the slides
</commit_message>
<xml_diff>
--- a/Counter_Malign_Information/4-Implement-For_Instructors/Lesson_Plans/Lesson_05-Identify_Malign_Information/Audio_Visual-Identify_Misinformation/Instructor-Lesson_Slide-Identify_Misinformation.pptx
+++ b/Counter_Malign_Information/4-Implement-For_Instructors/Lesson_Plans/Lesson_05-Identify_Malign_Information/Audio_Visual-Identify_Misinformation/Instructor-Lesson_Slide-Identify_Misinformation.pptx
@@ -669,6 +669,111 @@
 </p:notes>
 </file>
 
+<file path=ppt/notesSlides/notesSlide10.xml><?xml version="1.0" encoding="utf-8"?>
+<p:notes xmlns:a="http://schemas.openxmlformats.org/drawingml/2006/main" xmlns:r="http://schemas.openxmlformats.org/officeDocument/2006/relationships" xmlns:p="http://schemas.openxmlformats.org/presentationml/2006/main">
+  <p:cSld>
+    <p:spTree>
+      <p:nvGrpSpPr>
+        <p:cNvPr id="1" name=""/>
+        <p:cNvGrpSpPr/>
+        <p:nvPr/>
+      </p:nvGrpSpPr>
+      <p:grpSpPr>
+        <a:xfrm>
+          <a:off x="0" y="0"/>
+          <a:ext cx="0" cy="0"/>
+          <a:chOff x="0" y="0"/>
+          <a:chExt cx="0" cy="0"/>
+        </a:xfrm>
+      </p:grpSpPr>
+      <p:sp>
+        <p:nvSpPr>
+          <p:cNvPr id="2" name="Slide Image Placeholder 1"/>
+          <p:cNvSpPr>
+            <a:spLocks noGrp="1" noRot="1" noChangeAspect="1"/>
+          </p:cNvSpPr>
+          <p:nvPr>
+            <p:ph type="sldImg"/>
+          </p:nvPr>
+        </p:nvSpPr>
+        <p:spPr>
+          <a:xfrm>
+            <a:off x="382588" y="695325"/>
+            <a:ext cx="6092825" cy="3427413"/>
+          </a:xfrm>
+        </p:spPr>
+      </p:sp>
+      <p:sp>
+        <p:nvSpPr>
+          <p:cNvPr id="3" name="Notes Placeholder 2"/>
+          <p:cNvSpPr>
+            <a:spLocks noGrp="1"/>
+          </p:cNvSpPr>
+          <p:nvPr>
+            <p:ph type="body" idx="1"/>
+          </p:nvPr>
+        </p:nvSpPr>
+        <p:spPr/>
+        <p:txBody>
+          <a:bodyPr/>
+          <a:lstStyle/>
+          <a:p>
+            <a:r>
+              <a:rPr lang="en-US" dirty="0"/>
+              <a:t>Spanish version</a:t>
+            </a:r>
+          </a:p>
+        </p:txBody>
+      </p:sp>
+      <p:sp>
+        <p:nvSpPr>
+          <p:cNvPr id="4" name="Slide Number Placeholder 3"/>
+          <p:cNvSpPr>
+            <a:spLocks noGrp="1"/>
+          </p:cNvSpPr>
+          <p:nvPr>
+            <p:ph type="sldNum" idx="8"/>
+          </p:nvPr>
+        </p:nvSpPr>
+        <p:spPr/>
+        <p:txBody>
+          <a:bodyPr/>
+          <a:lstStyle/>
+          <a:p>
+            <a:pPr indent="0" algn="r">
+              <a:buNone/>
+            </a:pPr>
+            <a:fld id="{96D071C0-0F6A-4E5C-B3E5-B824FE66220F}" type="slidenum">
+              <a:rPr lang="en-US" sz="1400" b="0" strike="noStrike" spc="-1" smtClean="0">
+                <a:solidFill>
+                  <a:srgbClr val="000000"/>
+                </a:solidFill>
+                <a:latin typeface="Times New Roman"/>
+              </a:rPr>
+              <a:t>16</a:t>
+            </a:fld>
+            <a:endParaRPr lang="en-US" sz="1400" b="0" strike="noStrike" spc="-1">
+              <a:solidFill>
+                <a:srgbClr val="000000"/>
+              </a:solidFill>
+              <a:latin typeface="Times New Roman"/>
+            </a:endParaRPr>
+          </a:p>
+        </p:txBody>
+      </p:sp>
+    </p:spTree>
+    <p:extLst>
+      <p:ext uri="{BB962C8B-B14F-4D97-AF65-F5344CB8AC3E}">
+        <p14:creationId xmlns:p14="http://schemas.microsoft.com/office/powerpoint/2010/main" val="2410340583"/>
+      </p:ext>
+    </p:extLst>
+  </p:cSld>
+  <p:clrMapOvr>
+    <a:masterClrMapping/>
+  </p:clrMapOvr>
+</p:notes>
+</file>
+
 <file path=ppt/notesSlides/notesSlide2.xml><?xml version="1.0" encoding="utf-8"?>
 <p:notes xmlns:a="http://schemas.openxmlformats.org/drawingml/2006/main" xmlns:r="http://schemas.openxmlformats.org/officeDocument/2006/relationships" xmlns:p="http://schemas.openxmlformats.org/presentationml/2006/main">
   <p:cSld>
@@ -2342,6 +2447,111 @@
     <p:extLst>
       <p:ext uri="{BB962C8B-B14F-4D97-AF65-F5344CB8AC3E}">
         <p14:creationId xmlns:p14="http://schemas.microsoft.com/office/powerpoint/2010/main" val="2751407482"/>
+      </p:ext>
+    </p:extLst>
+  </p:cSld>
+  <p:clrMapOvr>
+    <a:masterClrMapping/>
+  </p:clrMapOvr>
+</p:notes>
+</file>
+
+<file path=ppt/notesSlides/notesSlide9.xml><?xml version="1.0" encoding="utf-8"?>
+<p:notes xmlns:a="http://schemas.openxmlformats.org/drawingml/2006/main" xmlns:r="http://schemas.openxmlformats.org/officeDocument/2006/relationships" xmlns:p="http://schemas.openxmlformats.org/presentationml/2006/main">
+  <p:cSld>
+    <p:spTree>
+      <p:nvGrpSpPr>
+        <p:cNvPr id="1" name=""/>
+        <p:cNvGrpSpPr/>
+        <p:nvPr/>
+      </p:nvGrpSpPr>
+      <p:grpSpPr>
+        <a:xfrm>
+          <a:off x="0" y="0"/>
+          <a:ext cx="0" cy="0"/>
+          <a:chOff x="0" y="0"/>
+          <a:chExt cx="0" cy="0"/>
+        </a:xfrm>
+      </p:grpSpPr>
+      <p:sp>
+        <p:nvSpPr>
+          <p:cNvPr id="2" name="Slide Image Placeholder 1"/>
+          <p:cNvSpPr>
+            <a:spLocks noGrp="1" noRot="1" noChangeAspect="1"/>
+          </p:cNvSpPr>
+          <p:nvPr>
+            <p:ph type="sldImg"/>
+          </p:nvPr>
+        </p:nvSpPr>
+        <p:spPr>
+          <a:xfrm>
+            <a:off x="382588" y="695325"/>
+            <a:ext cx="6092825" cy="3427413"/>
+          </a:xfrm>
+        </p:spPr>
+      </p:sp>
+      <p:sp>
+        <p:nvSpPr>
+          <p:cNvPr id="3" name="Notes Placeholder 2"/>
+          <p:cNvSpPr>
+            <a:spLocks noGrp="1"/>
+          </p:cNvSpPr>
+          <p:nvPr>
+            <p:ph type="body" idx="1"/>
+          </p:nvPr>
+        </p:nvSpPr>
+        <p:spPr/>
+        <p:txBody>
+          <a:bodyPr/>
+          <a:lstStyle/>
+          <a:p>
+            <a:r>
+              <a:rPr lang="en-US" dirty="0"/>
+              <a:t>Spanish version</a:t>
+            </a:r>
+          </a:p>
+        </p:txBody>
+      </p:sp>
+      <p:sp>
+        <p:nvSpPr>
+          <p:cNvPr id="4" name="Slide Number Placeholder 3"/>
+          <p:cNvSpPr>
+            <a:spLocks noGrp="1"/>
+          </p:cNvSpPr>
+          <p:nvPr>
+            <p:ph type="sldNum" idx="8"/>
+          </p:nvPr>
+        </p:nvSpPr>
+        <p:spPr/>
+        <p:txBody>
+          <a:bodyPr/>
+          <a:lstStyle/>
+          <a:p>
+            <a:pPr indent="0" algn="r">
+              <a:buNone/>
+            </a:pPr>
+            <a:fld id="{96D071C0-0F6A-4E5C-B3E5-B824FE66220F}" type="slidenum">
+              <a:rPr lang="en-US" sz="1400" b="0" strike="noStrike" spc="-1" smtClean="0">
+                <a:solidFill>
+                  <a:srgbClr val="000000"/>
+                </a:solidFill>
+                <a:latin typeface="Times New Roman"/>
+              </a:rPr>
+              <a:t>14</a:t>
+            </a:fld>
+            <a:endParaRPr lang="en-US" sz="1400" b="0" strike="noStrike" spc="-1">
+              <a:solidFill>
+                <a:srgbClr val="000000"/>
+              </a:solidFill>
+              <a:latin typeface="Times New Roman"/>
+            </a:endParaRPr>
+          </a:p>
+        </p:txBody>
+      </p:sp>
+    </p:spTree>
+    <p:extLst>
+      <p:ext uri="{BB962C8B-B14F-4D97-AF65-F5344CB8AC3E}">
+        <p14:creationId xmlns:p14="http://schemas.microsoft.com/office/powerpoint/2010/main" val="1662411302"/>
       </p:ext>
     </p:extLst>
   </p:cSld>
@@ -2498,7 +2708,7 @@
           <a:p>
             <a:fld id="{19E3F066-8095-7A47-8BBF-FB45577C0028}" type="datetimeFigureOut">
               <a:rPr lang="en-US" smtClean="0"/>
-              <a:t>6/22/24</a:t>
+              <a:t>6/23/24</a:t>
             </a:fld>
             <a:endParaRPr lang="en-US"/>
           </a:p>
@@ -2696,7 +2906,7 @@
           <a:p>
             <a:fld id="{19E3F066-8095-7A47-8BBF-FB45577C0028}" type="datetimeFigureOut">
               <a:rPr lang="en-US" smtClean="0"/>
-              <a:t>6/22/24</a:t>
+              <a:t>6/23/24</a:t>
             </a:fld>
             <a:endParaRPr lang="en-US"/>
           </a:p>
@@ -2904,7 +3114,7 @@
           <a:p>
             <a:fld id="{19E3F066-8095-7A47-8BBF-FB45577C0028}" type="datetimeFigureOut">
               <a:rPr lang="en-US" smtClean="0"/>
-              <a:t>6/22/24</a:t>
+              <a:t>6/23/24</a:t>
             </a:fld>
             <a:endParaRPr lang="en-US"/>
           </a:p>
@@ -3554,7 +3764,7 @@
           <a:p>
             <a:fld id="{19E3F066-8095-7A47-8BBF-FB45577C0028}" type="datetimeFigureOut">
               <a:rPr lang="en-US" smtClean="0"/>
-              <a:t>6/22/24</a:t>
+              <a:t>6/23/24</a:t>
             </a:fld>
             <a:endParaRPr lang="en-US"/>
           </a:p>
@@ -3829,7 +4039,7 @@
           <a:p>
             <a:fld id="{19E3F066-8095-7A47-8BBF-FB45577C0028}" type="datetimeFigureOut">
               <a:rPr lang="en-US" smtClean="0"/>
-              <a:t>6/22/24</a:t>
+              <a:t>6/23/24</a:t>
             </a:fld>
             <a:endParaRPr lang="en-US"/>
           </a:p>
@@ -4094,7 +4304,7 @@
           <a:p>
             <a:fld id="{19E3F066-8095-7A47-8BBF-FB45577C0028}" type="datetimeFigureOut">
               <a:rPr lang="en-US" smtClean="0"/>
-              <a:t>6/22/24</a:t>
+              <a:t>6/23/24</a:t>
             </a:fld>
             <a:endParaRPr lang="en-US"/>
           </a:p>
@@ -4506,7 +4716,7 @@
           <a:p>
             <a:fld id="{19E3F066-8095-7A47-8BBF-FB45577C0028}" type="datetimeFigureOut">
               <a:rPr lang="en-US" smtClean="0"/>
-              <a:t>6/22/24</a:t>
+              <a:t>6/23/24</a:t>
             </a:fld>
             <a:endParaRPr lang="en-US"/>
           </a:p>
@@ -4647,7 +4857,7 @@
           <a:p>
             <a:fld id="{19E3F066-8095-7A47-8BBF-FB45577C0028}" type="datetimeFigureOut">
               <a:rPr lang="en-US" smtClean="0"/>
-              <a:t>6/22/24</a:t>
+              <a:t>6/23/24</a:t>
             </a:fld>
             <a:endParaRPr lang="en-US"/>
           </a:p>
@@ -4760,7 +4970,7 @@
           <a:p>
             <a:fld id="{19E3F066-8095-7A47-8BBF-FB45577C0028}" type="datetimeFigureOut">
               <a:rPr lang="en-US" smtClean="0"/>
-              <a:t>6/22/24</a:t>
+              <a:t>6/23/24</a:t>
             </a:fld>
             <a:endParaRPr lang="en-US"/>
           </a:p>
@@ -5071,7 +5281,7 @@
           <a:p>
             <a:fld id="{19E3F066-8095-7A47-8BBF-FB45577C0028}" type="datetimeFigureOut">
               <a:rPr lang="en-US" smtClean="0"/>
-              <a:t>6/22/24</a:t>
+              <a:t>6/23/24</a:t>
             </a:fld>
             <a:endParaRPr lang="en-US"/>
           </a:p>
@@ -5359,7 +5569,7 @@
           <a:p>
             <a:fld id="{19E3F066-8095-7A47-8BBF-FB45577C0028}" type="datetimeFigureOut">
               <a:rPr lang="en-US" smtClean="0"/>
-              <a:t>6/22/24</a:t>
+              <a:t>6/23/24</a:t>
             </a:fld>
             <a:endParaRPr lang="en-US"/>
           </a:p>
@@ -5600,7 +5810,7 @@
           <a:p>
             <a:fld id="{19E3F066-8095-7A47-8BBF-FB45577C0028}" type="datetimeFigureOut">
               <a:rPr lang="en-US" smtClean="0"/>
-              <a:t>6/22/24</a:t>
+              <a:t>6/23/24</a:t>
             </a:fld>
             <a:endParaRPr lang="en-US"/>
           </a:p>
@@ -6065,7 +6275,7 @@
           <a:p>
             <a:fld id="{9530ACA4-BD8C-D448-95CA-FC1634E9A82C}" type="datetimeFigureOut">
               <a:rPr lang="en-US" smtClean="0"/>
-              <a:t>6/22/24</a:t>
+              <a:t>6/23/24</a:t>
             </a:fld>
             <a:endParaRPr lang="en-US"/>
           </a:p>
@@ -6592,7 +6802,7 @@
           </a:ln>
           <a:extLst>
             <a:ext uri="{C572A759-6A51-4108-AA02-DFA0A04FC94B}">
-              <ma14:wrappingTextBoxFlag xmlns="" xmlns:m="http://schemas.openxmlformats.org/officeDocument/2006/math" xmlns:a14="http://schemas.microsoft.com/office/drawing/2010/main" xmlns:ma14="http://schemas.microsoft.com/office/mac/drawingml/2011/main" val="1"/>
+              <ma14:wrappingTextBoxFlag xmlns:ma14="http://schemas.microsoft.com/office/mac/drawingml/2011/main" xmlns:a14="http://schemas.microsoft.com/office/drawing/2010/main" xmlns:m="http://schemas.openxmlformats.org/officeDocument/2006/math" xmlns="" val="1"/>
             </a:ext>
           </a:extLst>
         </p:spPr>
@@ -6639,7 +6849,7 @@
           </a:ln>
           <a:extLst>
             <a:ext uri="{C572A759-6A51-4108-AA02-DFA0A04FC94B}">
-              <ma14:wrappingTextBoxFlag xmlns="" xmlns:m="http://schemas.openxmlformats.org/officeDocument/2006/math" xmlns:a14="http://schemas.microsoft.com/office/drawing/2010/main" xmlns:ma14="http://schemas.microsoft.com/office/mac/drawingml/2011/main" val="1"/>
+              <ma14:wrappingTextBoxFlag xmlns:ma14="http://schemas.microsoft.com/office/mac/drawingml/2011/main" xmlns:a14="http://schemas.microsoft.com/office/drawing/2010/main" xmlns:m="http://schemas.openxmlformats.org/officeDocument/2006/math" xmlns="" val="1"/>
             </a:ext>
           </a:extLst>
         </p:spPr>
@@ -6686,7 +6896,7 @@
           </a:ln>
           <a:extLst>
             <a:ext uri="{C572A759-6A51-4108-AA02-DFA0A04FC94B}">
-              <ma14:wrappingTextBoxFlag xmlns="" xmlns:m="http://schemas.openxmlformats.org/officeDocument/2006/math" xmlns:a14="http://schemas.microsoft.com/office/drawing/2010/main" xmlns:ma14="http://schemas.microsoft.com/office/mac/drawingml/2011/main" val="1"/>
+              <ma14:wrappingTextBoxFlag xmlns:ma14="http://schemas.microsoft.com/office/mac/drawingml/2011/main" xmlns:a14="http://schemas.microsoft.com/office/drawing/2010/main" xmlns:m="http://schemas.openxmlformats.org/officeDocument/2006/math" xmlns="" val="1"/>
             </a:ext>
           </a:extLst>
         </p:spPr>
@@ -6733,7 +6943,7 @@
           </a:ln>
           <a:extLst>
             <a:ext uri="{C572A759-6A51-4108-AA02-DFA0A04FC94B}">
-              <ma14:wrappingTextBoxFlag xmlns="" xmlns:m="http://schemas.openxmlformats.org/officeDocument/2006/math" xmlns:a14="http://schemas.microsoft.com/office/drawing/2010/main" xmlns:ma14="http://schemas.microsoft.com/office/mac/drawingml/2011/main" val="1"/>
+              <ma14:wrappingTextBoxFlag xmlns:ma14="http://schemas.microsoft.com/office/mac/drawingml/2011/main" xmlns:a14="http://schemas.microsoft.com/office/drawing/2010/main" xmlns:m="http://schemas.openxmlformats.org/officeDocument/2006/math" xmlns="" val="1"/>
             </a:ext>
           </a:extLst>
         </p:spPr>
@@ -7136,7 +7346,7 @@
           <p:nvPr/>
         </p:nvPicPr>
         <p:blipFill>
-          <a:blip r:embed="rId2"/>
+          <a:blip r:embed="rId3"/>
           <a:stretch>
             <a:fillRect/>
           </a:stretch>
@@ -7199,7 +7409,7 @@
           </a:prstGeom>
           <a:extLst>
             <a:ext uri="{C572A759-6A51-4108-AA02-DFA0A04FC94B}">
-              <ma14:wrappingTextBoxFlag xmlns="" xmlns:m="http://schemas.openxmlformats.org/officeDocument/2006/math" xmlns:a14="http://schemas.microsoft.com/office/drawing/2010/main" xmlns:ma14="http://schemas.microsoft.com/office/mac/drawingml/2011/main" val="1"/>
+              <ma14:wrappingTextBoxFlag xmlns:ma14="http://schemas.microsoft.com/office/mac/drawingml/2011/main" xmlns:a14="http://schemas.microsoft.com/office/drawing/2010/main" xmlns:m="http://schemas.openxmlformats.org/officeDocument/2006/math" xmlns="" val="1"/>
             </a:ext>
           </a:extLst>
         </p:spPr>
@@ -7312,7 +7522,7 @@
           </a:prstGeom>
           <a:extLst>
             <a:ext uri="{C572A759-6A51-4108-AA02-DFA0A04FC94B}">
-              <ma14:wrappingTextBoxFlag xmlns="" xmlns:m="http://schemas.openxmlformats.org/officeDocument/2006/math" xmlns:a14="http://schemas.microsoft.com/office/drawing/2010/main" xmlns:ma14="http://schemas.microsoft.com/office/mac/drawingml/2011/main" val="1"/>
+              <ma14:wrappingTextBoxFlag xmlns:ma14="http://schemas.microsoft.com/office/mac/drawingml/2011/main" xmlns:a14="http://schemas.microsoft.com/office/drawing/2010/main" xmlns:m="http://schemas.openxmlformats.org/officeDocument/2006/math" xmlns="" val="1"/>
             </a:ext>
           </a:extLst>
         </p:spPr>
@@ -7338,7 +7548,7 @@
         <p:push dir="u"/>
       </p:transition>
     </mc:Choice>
-    <mc:Fallback xmlns="" xmlns:m="http://schemas.openxmlformats.org/officeDocument/2006/math" xmlns:a14="http://schemas.microsoft.com/office/drawing/2010/main">
+    <mc:Fallback xmlns:a14="http://schemas.microsoft.com/office/drawing/2010/main" xmlns:m="http://schemas.openxmlformats.org/officeDocument/2006/math" xmlns="">
       <p:transition spd="slow">
         <p:fade/>
       </p:transition>
@@ -7422,7 +7632,7 @@
           <p:nvPr/>
         </p:nvPicPr>
         <p:blipFill>
-          <a:blip r:embed="rId2"/>
+          <a:blip r:embed="rId3"/>
           <a:stretch>
             <a:fillRect/>
           </a:stretch>
@@ -7459,7 +7669,7 @@
           </a:ln>
           <a:extLst>
             <a:ext uri="{C572A759-6A51-4108-AA02-DFA0A04FC94B}">
-              <ma14:wrappingTextBoxFlag xmlns="" xmlns:m="http://schemas.openxmlformats.org/officeDocument/2006/math" xmlns:a14="http://schemas.microsoft.com/office/drawing/2010/main" xmlns:ma14="http://schemas.microsoft.com/office/mac/drawingml/2011/main" val="1"/>
+              <ma14:wrappingTextBoxFlag xmlns:ma14="http://schemas.microsoft.com/office/mac/drawingml/2011/main" xmlns:a14="http://schemas.microsoft.com/office/drawing/2010/main" xmlns:m="http://schemas.openxmlformats.org/officeDocument/2006/math" xmlns="" val="1"/>
             </a:ext>
           </a:extLst>
         </p:spPr>
@@ -7495,7 +7705,7 @@
           </a:prstGeom>
           <a:extLst>
             <a:ext uri="{C572A759-6A51-4108-AA02-DFA0A04FC94B}">
-              <ma14:wrappingTextBoxFlag xmlns="" xmlns:m="http://schemas.openxmlformats.org/officeDocument/2006/math" xmlns:a14="http://schemas.microsoft.com/office/drawing/2010/main" xmlns:ma14="http://schemas.microsoft.com/office/mac/drawingml/2011/main" val="1"/>
+              <ma14:wrappingTextBoxFlag xmlns:ma14="http://schemas.microsoft.com/office/mac/drawingml/2011/main" xmlns:a14="http://schemas.microsoft.com/office/drawing/2010/main" xmlns:m="http://schemas.openxmlformats.org/officeDocument/2006/math" xmlns="" val="1"/>
             </a:ext>
           </a:extLst>
         </p:spPr>
@@ -7522,7 +7732,7 @@
         <p:push dir="u"/>
       </p:transition>
     </mc:Choice>
-    <mc:Fallback xmlns="" xmlns:m="http://schemas.openxmlformats.org/officeDocument/2006/math" xmlns:a14="http://schemas.microsoft.com/office/drawing/2010/main">
+    <mc:Fallback xmlns:a14="http://schemas.microsoft.com/office/drawing/2010/main" xmlns:m="http://schemas.openxmlformats.org/officeDocument/2006/math" xmlns="">
       <p:transition spd="slow">
         <p:fade/>
       </p:transition>
@@ -7635,7 +7845,7 @@
           </a:ln>
           <a:extLst>
             <a:ext uri="{C572A759-6A51-4108-AA02-DFA0A04FC94B}">
-              <ma14:wrappingTextBoxFlag xmlns="" xmlns:m="http://schemas.openxmlformats.org/officeDocument/2006/math" xmlns:a14="http://schemas.microsoft.com/office/drawing/2010/main" xmlns:ma14="http://schemas.microsoft.com/office/mac/drawingml/2011/main" val="1"/>
+              <ma14:wrappingTextBoxFlag xmlns:ma14="http://schemas.microsoft.com/office/mac/drawingml/2011/main" xmlns:a14="http://schemas.microsoft.com/office/drawing/2010/main" xmlns:m="http://schemas.openxmlformats.org/officeDocument/2006/math" xmlns="" val="1"/>
             </a:ext>
           </a:extLst>
         </p:spPr>
@@ -7671,7 +7881,7 @@
           </a:prstGeom>
           <a:extLst>
             <a:ext uri="{C572A759-6A51-4108-AA02-DFA0A04FC94B}">
-              <ma14:wrappingTextBoxFlag xmlns="" xmlns:m="http://schemas.openxmlformats.org/officeDocument/2006/math" xmlns:a14="http://schemas.microsoft.com/office/drawing/2010/main" xmlns:ma14="http://schemas.microsoft.com/office/mac/drawingml/2011/main" val="1"/>
+              <ma14:wrappingTextBoxFlag xmlns:ma14="http://schemas.microsoft.com/office/mac/drawingml/2011/main" xmlns:a14="http://schemas.microsoft.com/office/drawing/2010/main" xmlns:m="http://schemas.openxmlformats.org/officeDocument/2006/math" xmlns="" val="1"/>
             </a:ext>
           </a:extLst>
         </p:spPr>

</xml_diff>

<commit_message>
added handout 1 in english and spanish
</commit_message>
<xml_diff>
--- a/Counter_Malign_Information/4-Implement-For_Instructors/Lesson_Plans/Lesson_05-Identify_Malign_Information/Audio_Visual-Identify_Misinformation/Instructor-Lesson_Slide-Identify_Misinformation.pptx
+++ b/Counter_Malign_Information/4-Implement-For_Instructors/Lesson_Plans/Lesson_05-Identify_Malign_Information/Audio_Visual-Identify_Misinformation/Instructor-Lesson_Slide-Identify_Misinformation.pptx
@@ -6,26 +6,27 @@
     <p:sldMasterId id="2147483675" r:id="rId2"/>
   </p:sldMasterIdLst>
   <p:notesMasterIdLst>
-    <p:notesMasterId r:id="rId20"/>
+    <p:notesMasterId r:id="rId21"/>
   </p:notesMasterIdLst>
   <p:sldIdLst>
     <p:sldId id="620" r:id="rId3"/>
     <p:sldId id="383" r:id="rId4"/>
     <p:sldId id="621" r:id="rId5"/>
     <p:sldId id="622" r:id="rId6"/>
-    <p:sldId id="623" r:id="rId7"/>
-    <p:sldId id="626" r:id="rId8"/>
-    <p:sldId id="625" r:id="rId9"/>
-    <p:sldId id="627" r:id="rId10"/>
-    <p:sldId id="628" r:id="rId11"/>
-    <p:sldId id="630" r:id="rId12"/>
-    <p:sldId id="631" r:id="rId13"/>
-    <p:sldId id="629" r:id="rId14"/>
-    <p:sldId id="624" r:id="rId15"/>
-    <p:sldId id="269" r:id="rId16"/>
-    <p:sldId id="270" r:id="rId17"/>
-    <p:sldId id="271" r:id="rId18"/>
-    <p:sldId id="272" r:id="rId19"/>
+    <p:sldId id="632" r:id="rId7"/>
+    <p:sldId id="623" r:id="rId8"/>
+    <p:sldId id="626" r:id="rId9"/>
+    <p:sldId id="625" r:id="rId10"/>
+    <p:sldId id="627" r:id="rId11"/>
+    <p:sldId id="628" r:id="rId12"/>
+    <p:sldId id="630" r:id="rId13"/>
+    <p:sldId id="631" r:id="rId14"/>
+    <p:sldId id="629" r:id="rId15"/>
+    <p:sldId id="624" r:id="rId16"/>
+    <p:sldId id="269" r:id="rId17"/>
+    <p:sldId id="270" r:id="rId18"/>
+    <p:sldId id="271" r:id="rId19"/>
+    <p:sldId id="272" r:id="rId20"/>
   </p:sldIdLst>
   <p:sldSz cx="12192000" cy="6858000"/>
   <p:notesSz cx="6858000" cy="9144000"/>
@@ -750,7 +751,112 @@
                 </a:solidFill>
                 <a:latin typeface="Times New Roman"/>
               </a:rPr>
-              <a:t>16</a:t>
+              <a:t>15</a:t>
+            </a:fld>
+            <a:endParaRPr lang="en-US" sz="1400" b="0" strike="noStrike" spc="-1">
+              <a:solidFill>
+                <a:srgbClr val="000000"/>
+              </a:solidFill>
+              <a:latin typeface="Times New Roman"/>
+            </a:endParaRPr>
+          </a:p>
+        </p:txBody>
+      </p:sp>
+    </p:spTree>
+    <p:extLst>
+      <p:ext uri="{BB962C8B-B14F-4D97-AF65-F5344CB8AC3E}">
+        <p14:creationId xmlns:p14="http://schemas.microsoft.com/office/powerpoint/2010/main" val="1662411302"/>
+      </p:ext>
+    </p:extLst>
+  </p:cSld>
+  <p:clrMapOvr>
+    <a:masterClrMapping/>
+  </p:clrMapOvr>
+</p:notes>
+</file>
+
+<file path=ppt/notesSlides/notesSlide11.xml><?xml version="1.0" encoding="utf-8"?>
+<p:notes xmlns:a="http://schemas.openxmlformats.org/drawingml/2006/main" xmlns:r="http://schemas.openxmlformats.org/officeDocument/2006/relationships" xmlns:p="http://schemas.openxmlformats.org/presentationml/2006/main">
+  <p:cSld>
+    <p:spTree>
+      <p:nvGrpSpPr>
+        <p:cNvPr id="1" name=""/>
+        <p:cNvGrpSpPr/>
+        <p:nvPr/>
+      </p:nvGrpSpPr>
+      <p:grpSpPr>
+        <a:xfrm>
+          <a:off x="0" y="0"/>
+          <a:ext cx="0" cy="0"/>
+          <a:chOff x="0" y="0"/>
+          <a:chExt cx="0" cy="0"/>
+        </a:xfrm>
+      </p:grpSpPr>
+      <p:sp>
+        <p:nvSpPr>
+          <p:cNvPr id="2" name="Slide Image Placeholder 1"/>
+          <p:cNvSpPr>
+            <a:spLocks noGrp="1" noRot="1" noChangeAspect="1"/>
+          </p:cNvSpPr>
+          <p:nvPr>
+            <p:ph type="sldImg"/>
+          </p:nvPr>
+        </p:nvSpPr>
+        <p:spPr>
+          <a:xfrm>
+            <a:off x="382588" y="695325"/>
+            <a:ext cx="6092825" cy="3427413"/>
+          </a:xfrm>
+        </p:spPr>
+      </p:sp>
+      <p:sp>
+        <p:nvSpPr>
+          <p:cNvPr id="3" name="Notes Placeholder 2"/>
+          <p:cNvSpPr>
+            <a:spLocks noGrp="1"/>
+          </p:cNvSpPr>
+          <p:nvPr>
+            <p:ph type="body" idx="1"/>
+          </p:nvPr>
+        </p:nvSpPr>
+        <p:spPr/>
+        <p:txBody>
+          <a:bodyPr/>
+          <a:lstStyle/>
+          <a:p>
+            <a:r>
+              <a:rPr lang="en-US" dirty="0"/>
+              <a:t>Spanish version</a:t>
+            </a:r>
+          </a:p>
+        </p:txBody>
+      </p:sp>
+      <p:sp>
+        <p:nvSpPr>
+          <p:cNvPr id="4" name="Slide Number Placeholder 3"/>
+          <p:cNvSpPr>
+            <a:spLocks noGrp="1"/>
+          </p:cNvSpPr>
+          <p:nvPr>
+            <p:ph type="sldNum" idx="8"/>
+          </p:nvPr>
+        </p:nvSpPr>
+        <p:spPr/>
+        <p:txBody>
+          <a:bodyPr/>
+          <a:lstStyle/>
+          <a:p>
+            <a:pPr indent="0" algn="r">
+              <a:buNone/>
+            </a:pPr>
+            <a:fld id="{96D071C0-0F6A-4E5C-B3E5-B824FE66220F}" type="slidenum">
+              <a:rPr lang="en-US" sz="1400" b="0" strike="noStrike" spc="-1" smtClean="0">
+                <a:solidFill>
+                  <a:srgbClr val="000000"/>
+                </a:solidFill>
+                <a:latin typeface="Times New Roman"/>
+              </a:rPr>
+              <a:t>17</a:t>
             </a:fld>
             <a:endParaRPr lang="en-US" sz="1400" b="0" strike="noStrike" spc="-1">
               <a:solidFill>
@@ -940,47 +1046,16 @@
           <a:p>
             <a:r>
               <a:rPr lang="en-US" dirty="0"/>
-              <a:t>1. Present examples of different motives, opportunities, and means in influence operations:</a:t>
-            </a:r>
-          </a:p>
-          <a:p>
+              <a:t>8. Factsheet 4: Types of Misinformation and Disinformation - https://</a:t>
+            </a:r>
+            <a:r>
+              <a:rPr lang="en-US" dirty="0" err="1"/>
+              <a:t>www.unhcr.org</a:t>
+            </a:r>
             <a:r>
               <a:rPr lang="en-US" dirty="0"/>
-              <a:t>    - Example: Political gains from spreading false allegation about rival.</a:t>
-            </a:r>
-          </a:p>
-          <a:p>
-            <a:r>
-              <a:rPr lang="en-US" dirty="0"/>
-              <a:t>    - Example: Using social media channels to disseminate false information.</a:t>
-            </a:r>
-          </a:p>
-          <a:p>
-            <a:r>
-              <a:rPr lang="en-US" dirty="0"/>
-              <a:t>2. Discuss how to assess these components in various scenarios:</a:t>
-            </a:r>
-          </a:p>
-          <a:p>
-            <a:r>
-              <a:rPr lang="en-US" dirty="0"/>
-              <a:t>    - Identify the goals and motives behind the information.</a:t>
-            </a:r>
-          </a:p>
-          <a:p>
-            <a:r>
-              <a:rPr lang="en-US" dirty="0"/>
-              <a:t>    - Evaluate the channels available for spreading misinformation.</a:t>
-            </a:r>
-          </a:p>
-          <a:p>
-            <a:r>
-              <a:rPr lang="en-US" dirty="0"/>
-              <a:t>    - Assess the risks and costs involved in the deception.</a:t>
-            </a:r>
-          </a:p>
-          <a:p>
-            <a:endParaRPr lang="en-US" dirty="0"/>
+              <a:t>/innovation/wp-content/uploads/2022/02/Factsheet-4.pdf</a:t>
+            </a:r>
           </a:p>
         </p:txBody>
       </p:sp>
@@ -1023,7 +1098,7 @@
     </p:spTree>
     <p:extLst>
       <p:ext uri="{BB962C8B-B14F-4D97-AF65-F5344CB8AC3E}">
-        <p14:creationId xmlns:p14="http://schemas.microsoft.com/office/powerpoint/2010/main" val="2244748498"/>
+        <p14:creationId xmlns:p14="http://schemas.microsoft.com/office/powerpoint/2010/main" val="2044276446"/>
       </p:ext>
     </p:extLst>
   </p:cSld>
@@ -1084,7 +1159,57 @@
           <a:p>
             <a:r>
               <a:rPr lang="en-US" dirty="0"/>
-              <a:t>1. Present examples of different motives, opportunities, and means in influence operations:</a:t>
+              <a:t>References:</a:t>
+            </a:r>
+            <a:br>
+              <a:rPr lang="en-US" dirty="0"/>
+            </a:br>
+            <a:br>
+              <a:rPr lang="en-US" dirty="0"/>
+            </a:br>
+            <a:r>
+              <a:rPr lang="en-US" dirty="0"/>
+              <a:t>1. Beebe, S. M., &amp; </a:t>
+            </a:r>
+            <a:r>
+              <a:rPr lang="en-US" dirty="0" err="1"/>
+              <a:t>Pherson</a:t>
+            </a:r>
+            <a:r>
+              <a:rPr lang="en-US" dirty="0"/>
+              <a:t>, R. H. (2015). *Cases in Intelligence Analysis: Structured Analytic Techniques in Action*.</a:t>
+            </a:r>
+          </a:p>
+          <a:p>
+            <a:r>
+              <a:rPr lang="en-US" dirty="0"/>
+              <a:t>2. </a:t>
+            </a:r>
+            <a:r>
+              <a:rPr lang="en-US" dirty="0" err="1"/>
+              <a:t>Pherson</a:t>
+            </a:r>
+            <a:r>
+              <a:rPr lang="en-US" dirty="0"/>
+              <a:t>, R. H., &amp; Heuer, R. J. (2021). </a:t>
+            </a:r>
+            <a:r>
+              <a:rPr lang="en-US"/>
+              <a:t>*Structured Analytic Techniques for Intelligence Analysis*.</a:t>
+            </a:r>
+            <a:br>
+              <a:rPr lang="en-US"/>
+            </a:br>
+            <a:br>
+              <a:rPr lang="en-US"/>
+            </a:br>
+            <a:r>
+              <a:rPr lang="en-US"/>
+              <a:t>1</a:t>
+            </a:r>
+            <a:r>
+              <a:rPr lang="en-US" dirty="0"/>
+              <a:t>. Present examples of different motives, opportunities, and means in influence operations:</a:t>
             </a:r>
           </a:p>
           <a:p>
@@ -1167,7 +1292,7 @@
     </p:spTree>
     <p:extLst>
       <p:ext uri="{BB962C8B-B14F-4D97-AF65-F5344CB8AC3E}">
-        <p14:creationId xmlns:p14="http://schemas.microsoft.com/office/powerpoint/2010/main" val="1751720323"/>
+        <p14:creationId xmlns:p14="http://schemas.microsoft.com/office/powerpoint/2010/main" val="2244748498"/>
       </p:ext>
     </p:extLst>
   </p:cSld>
@@ -1227,281 +1352,44 @@
           <a:lstStyle/>
           <a:p>
             <a:r>
-              <a:rPr lang="en-US" b="0" dirty="0">
-                <a:solidFill>
-                  <a:srgbClr val="6A9955"/>
-                </a:solidFill>
-                <a:effectLst/>
-                <a:highlight>
-                  <a:srgbClr val="1F1F1F"/>
-                </a:highlight>
-                <a:latin typeface="Menlo" panose="020B0609030804020204" pitchFamily="49" charset="0"/>
-              </a:rPr>
-              <a:t>&gt;</a:t>
-            </a:r>
-            <a:r>
-              <a:rPr lang="en-US" b="0" dirty="0">
-                <a:solidFill>
-                  <a:srgbClr val="CCCCCC"/>
-                </a:solidFill>
-                <a:effectLst/>
-                <a:highlight>
-                  <a:srgbClr val="1F1F1F"/>
-                </a:highlight>
-                <a:latin typeface="Menlo" panose="020B0609030804020204" pitchFamily="49" charset="0"/>
-              </a:rPr>
-              <a:t> Determine if the adversary has a history of engaging in deception.</a:t>
-            </a:r>
-          </a:p>
-          <a:p>
-            <a:br>
-              <a:rPr lang="en-US" b="0" dirty="0">
-                <a:solidFill>
-                  <a:srgbClr val="CCCCCC"/>
-                </a:solidFill>
-                <a:effectLst/>
-                <a:highlight>
-                  <a:srgbClr val="1F1F1F"/>
-                </a:highlight>
-                <a:latin typeface="Menlo" panose="020B0609030804020204" pitchFamily="49" charset="0"/>
-              </a:rPr>
-            </a:br>
-            <a:r>
-              <a:rPr lang="en-US" b="1" dirty="0">
-                <a:solidFill>
-                  <a:srgbClr val="569CD6"/>
-                </a:solidFill>
-                <a:effectLst/>
-                <a:highlight>
-                  <a:srgbClr val="1F1F1F"/>
-                </a:highlight>
-                <a:latin typeface="Menlo" panose="020B0609030804020204" pitchFamily="49" charset="0"/>
-              </a:rPr>
-              <a:t>**Activity**</a:t>
-            </a:r>
-            <a:endParaRPr lang="en-US" b="0" dirty="0">
-              <a:solidFill>
-                <a:srgbClr val="CCCCCC"/>
-              </a:solidFill>
-              <a:effectLst/>
-              <a:highlight>
-                <a:srgbClr val="1F1F1F"/>
-              </a:highlight>
-              <a:latin typeface="Menlo" panose="020B0609030804020204" pitchFamily="49" charset="0"/>
-            </a:endParaRPr>
-          </a:p>
-          <a:p>
-            <a:br>
-              <a:rPr lang="en-US" b="0" dirty="0">
-                <a:solidFill>
-                  <a:srgbClr val="CCCCCC"/>
-                </a:solidFill>
-                <a:effectLst/>
-                <a:highlight>
-                  <a:srgbClr val="1F1F1F"/>
-                </a:highlight>
-                <a:latin typeface="Menlo" panose="020B0609030804020204" pitchFamily="49" charset="0"/>
-              </a:rPr>
-            </a:br>
-            <a:r>
-              <a:rPr lang="en-US" b="0" dirty="0">
-                <a:solidFill>
-                  <a:srgbClr val="6796E6"/>
-                </a:solidFill>
-                <a:effectLst/>
-                <a:highlight>
-                  <a:srgbClr val="1F1F1F"/>
-                </a:highlight>
-                <a:latin typeface="Menlo" panose="020B0609030804020204" pitchFamily="49" charset="0"/>
-              </a:rPr>
-              <a:t>1.</a:t>
-            </a:r>
-            <a:r>
-              <a:rPr lang="en-US" b="0" dirty="0">
-                <a:solidFill>
-                  <a:srgbClr val="CCCCCC"/>
-                </a:solidFill>
-                <a:effectLst/>
-                <a:highlight>
-                  <a:srgbClr val="1F1F1F"/>
-                </a:highlight>
-                <a:latin typeface="Menlo" panose="020B0609030804020204" pitchFamily="49" charset="0"/>
-              </a:rPr>
-              <a:t> Ask students for examples of historical precedents of deception:</a:t>
-            </a:r>
-          </a:p>
-          <a:p>
-            <a:r>
-              <a:rPr lang="en-US" b="0" dirty="0">
-                <a:solidFill>
-                  <a:srgbClr val="CCCCCC"/>
-                </a:solidFill>
-                <a:effectLst/>
-                <a:highlight>
-                  <a:srgbClr val="1F1F1F"/>
-                </a:highlight>
-                <a:latin typeface="Menlo" panose="020B0609030804020204" pitchFamily="49" charset="0"/>
-              </a:rPr>
-              <a:t>Have examples ready to provide if students are unsure. Specific examples could include:</a:t>
-            </a:r>
-          </a:p>
-          <a:p>
-            <a:r>
-              <a:rPr lang="en-US" b="0" dirty="0">
-                <a:solidFill>
-                  <a:srgbClr val="CCCCCC"/>
-                </a:solidFill>
-                <a:effectLst/>
-                <a:highlight>
-                  <a:srgbClr val="1F1F1F"/>
-                </a:highlight>
-                <a:latin typeface="Menlo" panose="020B0609030804020204" pitchFamily="49" charset="0"/>
-              </a:rPr>
-              <a:t>- Ancient Greek and Roman military tactics.</a:t>
-            </a:r>
-          </a:p>
-          <a:p>
-            <a:r>
-              <a:rPr lang="en-US" b="0" dirty="0">
-                <a:solidFill>
-                  <a:srgbClr val="CCCCCC"/>
-                </a:solidFill>
-                <a:effectLst/>
-                <a:highlight>
-                  <a:srgbClr val="1F1F1F"/>
-                </a:highlight>
-                <a:latin typeface="Menlo" panose="020B0609030804020204" pitchFamily="49" charset="0"/>
-              </a:rPr>
-              <a:t>- Historical use of propaganda during wartime including World War I and World War II.</a:t>
-            </a:r>
-          </a:p>
-          <a:p>
-            <a:r>
-              <a:rPr lang="en-US" b="0" dirty="0">
-                <a:solidFill>
-                  <a:srgbClr val="CCCCCC"/>
-                </a:solidFill>
-                <a:effectLst/>
-                <a:highlight>
-                  <a:srgbClr val="1F1F1F"/>
-                </a:highlight>
-                <a:latin typeface="Menlo" panose="020B0609030804020204" pitchFamily="49" charset="0"/>
-              </a:rPr>
-              <a:t>- Previous instances of misinformation campaigns by rival states. </a:t>
-            </a:r>
-          </a:p>
-          <a:p>
-            <a:r>
-              <a:rPr lang="en-US" b="0" dirty="0">
-                <a:solidFill>
-                  <a:srgbClr val="CCCCCC"/>
-                </a:solidFill>
-                <a:effectLst/>
-                <a:highlight>
-                  <a:srgbClr val="1F1F1F"/>
-                </a:highlight>
-                <a:latin typeface="Menlo" panose="020B0609030804020204" pitchFamily="49" charset="0"/>
-              </a:rPr>
-              <a:t>- Example: Historical use of propaganda during wartime.</a:t>
-            </a:r>
-          </a:p>
-          <a:p>
-            <a:r>
-              <a:rPr lang="en-US" b="0" dirty="0">
-                <a:solidFill>
-                  <a:srgbClr val="CCCCCC"/>
-                </a:solidFill>
-                <a:effectLst/>
-                <a:highlight>
-                  <a:srgbClr val="1F1F1F"/>
-                </a:highlight>
-                <a:latin typeface="Menlo" panose="020B0609030804020204" pitchFamily="49" charset="0"/>
-              </a:rPr>
-              <a:t>- Example: Previous instances of misinformation campaigns by rival states.</a:t>
-            </a:r>
-          </a:p>
-          <a:p>
-            <a:r>
-              <a:rPr lang="en-US" b="0" dirty="0">
-                <a:solidFill>
-                  <a:srgbClr val="6796E6"/>
-                </a:solidFill>
-                <a:effectLst/>
-                <a:highlight>
-                  <a:srgbClr val="1F1F1F"/>
-                </a:highlight>
-                <a:latin typeface="Menlo" panose="020B0609030804020204" pitchFamily="49" charset="0"/>
-              </a:rPr>
-              <a:t>2.</a:t>
-            </a:r>
-            <a:r>
-              <a:rPr lang="en-US" b="0" dirty="0">
-                <a:solidFill>
-                  <a:srgbClr val="CCCCCC"/>
-                </a:solidFill>
-                <a:effectLst/>
-                <a:highlight>
-                  <a:srgbClr val="1F1F1F"/>
-                </a:highlight>
-                <a:latin typeface="Menlo" panose="020B0609030804020204" pitchFamily="49" charset="0"/>
-              </a:rPr>
-              <a:t> Discuss how to identify patterns of past opposition practices in various scenarios:</a:t>
-            </a:r>
-          </a:p>
-          <a:p>
-            <a:r>
-              <a:rPr lang="en-US" b="0" dirty="0">
-                <a:solidFill>
-                  <a:srgbClr val="6796E6"/>
-                </a:solidFill>
-                <a:effectLst/>
-                <a:highlight>
-                  <a:srgbClr val="1F1F1F"/>
-                </a:highlight>
-                <a:latin typeface="Menlo" panose="020B0609030804020204" pitchFamily="49" charset="0"/>
-              </a:rPr>
-              <a:t>-</a:t>
-            </a:r>
-            <a:r>
-              <a:rPr lang="en-US" b="0" dirty="0">
-                <a:solidFill>
-                  <a:srgbClr val="CCCCCC"/>
-                </a:solidFill>
-                <a:effectLst/>
-                <a:highlight>
-                  <a:srgbClr val="1F1F1F"/>
-                </a:highlight>
-                <a:latin typeface="Menlo" panose="020B0609030804020204" pitchFamily="49" charset="0"/>
-              </a:rPr>
-              <a:t> Analyze past behavior and tactics used in deception.</a:t>
-            </a:r>
-          </a:p>
-          <a:p>
-            <a:r>
-              <a:rPr lang="en-US" b="0" dirty="0">
-                <a:solidFill>
-                  <a:srgbClr val="6796E6"/>
-                </a:solidFill>
-                <a:effectLst/>
-                <a:highlight>
-                  <a:srgbClr val="1F1F1F"/>
-                </a:highlight>
-                <a:latin typeface="Menlo" panose="020B0609030804020204" pitchFamily="49" charset="0"/>
-              </a:rPr>
-              <a:t>-</a:t>
-            </a:r>
-            <a:r>
-              <a:rPr lang="en-US" b="0" dirty="0">
-                <a:solidFill>
-                  <a:srgbClr val="CCCCCC"/>
-                </a:solidFill>
-                <a:effectLst/>
-                <a:highlight>
-                  <a:srgbClr val="1F1F1F"/>
-                </a:highlight>
-                <a:latin typeface="Menlo" panose="020B0609030804020204" pitchFamily="49" charset="0"/>
-              </a:rPr>
-              <a:t> Compare current scenarios with historical examples.</a:t>
+              <a:rPr lang="en-US" dirty="0"/>
+              <a:t>1. Present examples of different motives, opportunities, and means in influence operations:</a:t>
+            </a:r>
+          </a:p>
+          <a:p>
+            <a:r>
+              <a:rPr lang="en-US" dirty="0"/>
+              <a:t>    - Example: Political gains from spreading false allegation about rival.</a:t>
+            </a:r>
+          </a:p>
+          <a:p>
+            <a:r>
+              <a:rPr lang="en-US" dirty="0"/>
+              <a:t>    - Example: Using social media channels to disseminate false information.</a:t>
+            </a:r>
+          </a:p>
+          <a:p>
+            <a:r>
+              <a:rPr lang="en-US" dirty="0"/>
+              <a:t>2. Discuss how to assess these components in various scenarios:</a:t>
+            </a:r>
+          </a:p>
+          <a:p>
+            <a:r>
+              <a:rPr lang="en-US" dirty="0"/>
+              <a:t>    - Identify the goals and motives behind the information.</a:t>
+            </a:r>
+          </a:p>
+          <a:p>
+            <a:r>
+              <a:rPr lang="en-US" dirty="0"/>
+              <a:t>    - Evaluate the channels available for spreading misinformation.</a:t>
+            </a:r>
+          </a:p>
+          <a:p>
+            <a:r>
+              <a:rPr lang="en-US" dirty="0"/>
+              <a:t>    - Assess the risks and costs involved in the deception.</a:t>
             </a:r>
           </a:p>
           <a:p>
@@ -1548,7 +1436,7 @@
     </p:spTree>
     <p:extLst>
       <p:ext uri="{BB962C8B-B14F-4D97-AF65-F5344CB8AC3E}">
-        <p14:creationId xmlns:p14="http://schemas.microsoft.com/office/powerpoint/2010/main" val="261642412"/>
+        <p14:creationId xmlns:p14="http://schemas.microsoft.com/office/powerpoint/2010/main" val="1751720323"/>
       </p:ext>
     </p:extLst>
   </p:cSld>
@@ -1631,7 +1519,7 @@
                 </a:highlight>
                 <a:latin typeface="Menlo" panose="020B0609030804020204" pitchFamily="49" charset="0"/>
               </a:rPr>
-              <a:t> Evaluate the vulnerability of the source to manipulation.</a:t>
+              <a:t> Determine if the adversary has a history of engaging in deception.</a:t>
             </a:r>
           </a:p>
           <a:p>
@@ -1708,7 +1596,125 @@
                 </a:highlight>
                 <a:latin typeface="Menlo" panose="020B0609030804020204" pitchFamily="49" charset="0"/>
               </a:rPr>
-              <a:t> Present examples of sources that can be manipulated:</a:t>
+              <a:t> Ask students for examples of historical precedents of deception:</a:t>
+            </a:r>
+          </a:p>
+          <a:p>
+            <a:r>
+              <a:rPr lang="en-US" b="0" dirty="0">
+                <a:solidFill>
+                  <a:srgbClr val="CCCCCC"/>
+                </a:solidFill>
+                <a:effectLst/>
+                <a:highlight>
+                  <a:srgbClr val="1F1F1F"/>
+                </a:highlight>
+                <a:latin typeface="Menlo" panose="020B0609030804020204" pitchFamily="49" charset="0"/>
+              </a:rPr>
+              <a:t>Have examples ready to provide if students are unsure. Specific examples could include:</a:t>
+            </a:r>
+          </a:p>
+          <a:p>
+            <a:r>
+              <a:rPr lang="en-US" b="0" dirty="0">
+                <a:solidFill>
+                  <a:srgbClr val="CCCCCC"/>
+                </a:solidFill>
+                <a:effectLst/>
+                <a:highlight>
+                  <a:srgbClr val="1F1F1F"/>
+                </a:highlight>
+                <a:latin typeface="Menlo" panose="020B0609030804020204" pitchFamily="49" charset="0"/>
+              </a:rPr>
+              <a:t>- Ancient Greek and Roman military tactics.</a:t>
+            </a:r>
+          </a:p>
+          <a:p>
+            <a:r>
+              <a:rPr lang="en-US" b="0" dirty="0">
+                <a:solidFill>
+                  <a:srgbClr val="CCCCCC"/>
+                </a:solidFill>
+                <a:effectLst/>
+                <a:highlight>
+                  <a:srgbClr val="1F1F1F"/>
+                </a:highlight>
+                <a:latin typeface="Menlo" panose="020B0609030804020204" pitchFamily="49" charset="0"/>
+              </a:rPr>
+              <a:t>- Historical use of propaganda during wartime including World War I and World War II.</a:t>
+            </a:r>
+          </a:p>
+          <a:p>
+            <a:r>
+              <a:rPr lang="en-US" b="0" dirty="0">
+                <a:solidFill>
+                  <a:srgbClr val="CCCCCC"/>
+                </a:solidFill>
+                <a:effectLst/>
+                <a:highlight>
+                  <a:srgbClr val="1F1F1F"/>
+                </a:highlight>
+                <a:latin typeface="Menlo" panose="020B0609030804020204" pitchFamily="49" charset="0"/>
+              </a:rPr>
+              <a:t>- Previous instances of misinformation campaigns by rival states. </a:t>
+            </a:r>
+          </a:p>
+          <a:p>
+            <a:r>
+              <a:rPr lang="en-US" b="0" dirty="0">
+                <a:solidFill>
+                  <a:srgbClr val="CCCCCC"/>
+                </a:solidFill>
+                <a:effectLst/>
+                <a:highlight>
+                  <a:srgbClr val="1F1F1F"/>
+                </a:highlight>
+                <a:latin typeface="Menlo" panose="020B0609030804020204" pitchFamily="49" charset="0"/>
+              </a:rPr>
+              <a:t>- Example: Historical use of propaganda during wartime.</a:t>
+            </a:r>
+          </a:p>
+          <a:p>
+            <a:r>
+              <a:rPr lang="en-US" b="0" dirty="0">
+                <a:solidFill>
+                  <a:srgbClr val="CCCCCC"/>
+                </a:solidFill>
+                <a:effectLst/>
+                <a:highlight>
+                  <a:srgbClr val="1F1F1F"/>
+                </a:highlight>
+                <a:latin typeface="Menlo" panose="020B0609030804020204" pitchFamily="49" charset="0"/>
+              </a:rPr>
+              <a:t>- Example: Previous instances of misinformation campaigns by rival states.</a:t>
+            </a:r>
+          </a:p>
+          <a:p>
+            <a:r>
+              <a:rPr lang="en-US" b="0" dirty="0">
+                <a:solidFill>
+                  <a:srgbClr val="6796E6"/>
+                </a:solidFill>
+                <a:effectLst/>
+                <a:highlight>
+                  <a:srgbClr val="1F1F1F"/>
+                </a:highlight>
+                <a:latin typeface="Menlo" panose="020B0609030804020204" pitchFamily="49" charset="0"/>
+              </a:rPr>
+              <a:t>2.</a:t>
+            </a:r>
+            <a:r>
+              <a:rPr lang="en-US" b="0" dirty="0">
+                <a:solidFill>
+                  <a:srgbClr val="CCCCCC"/>
+                </a:solidFill>
+                <a:effectLst/>
+                <a:highlight>
+                  <a:srgbClr val="1F1F1F"/>
+                </a:highlight>
+                <a:latin typeface="Menlo" panose="020B0609030804020204" pitchFamily="49" charset="0"/>
+              </a:rPr>
+              <a:t> Discuss how to identify patterns of past opposition practices in various scenarios:</a:t>
             </a:r>
           </a:p>
           <a:p>
@@ -1736,7 +1742,7 @@
                 </a:highlight>
                 <a:latin typeface="Menlo" panose="020B0609030804020204" pitchFamily="49" charset="0"/>
               </a:rPr>
-              <a:t> Example: Social media influencers with questionable affiliations.</a:t>
+              <a:t> Analyze past behavior and tactics used in deception.</a:t>
             </a:r>
           </a:p>
           <a:p>
@@ -1764,92 +1770,11 @@
                 </a:highlight>
                 <a:latin typeface="Menlo" panose="020B0609030804020204" pitchFamily="49" charset="0"/>
               </a:rPr>
-              <a:t> Example: Anonymous sources with unverifiable information.</a:t>
-            </a:r>
-          </a:p>
-          <a:p>
-            <a:r>
-              <a:rPr lang="en-US" b="0" dirty="0">
-                <a:solidFill>
-                  <a:srgbClr val="6796E6"/>
-                </a:solidFill>
-                <a:effectLst/>
-                <a:highlight>
-                  <a:srgbClr val="1F1F1F"/>
-                </a:highlight>
-                <a:latin typeface="Menlo" panose="020B0609030804020204" pitchFamily="49" charset="0"/>
-              </a:rPr>
-              <a:t>2.</a:t>
-            </a:r>
-            <a:r>
-              <a:rPr lang="en-US" b="0" dirty="0">
-                <a:solidFill>
-                  <a:srgbClr val="CCCCCC"/>
-                </a:solidFill>
-                <a:effectLst/>
-                <a:highlight>
-                  <a:srgbClr val="1F1F1F"/>
-                </a:highlight>
-                <a:latin typeface="Menlo" panose="020B0609030804020204" pitchFamily="49" charset="0"/>
-              </a:rPr>
-              <a:t> Discuss how to assess the manipulability of sources in various scenarios:</a:t>
-            </a:r>
-          </a:p>
-          <a:p>
-            <a:r>
-              <a:rPr lang="en-US" b="0" dirty="0">
-                <a:solidFill>
-                  <a:srgbClr val="6796E6"/>
-                </a:solidFill>
-                <a:effectLst/>
-                <a:highlight>
-                  <a:srgbClr val="1F1F1F"/>
-                </a:highlight>
-                <a:latin typeface="Menlo" panose="020B0609030804020204" pitchFamily="49" charset="0"/>
-              </a:rPr>
-              <a:t>-</a:t>
-            </a:r>
-            <a:r>
-              <a:rPr lang="en-US" b="0" dirty="0">
-                <a:solidFill>
-                  <a:srgbClr val="CCCCCC"/>
-                </a:solidFill>
-                <a:effectLst/>
-                <a:highlight>
-                  <a:srgbClr val="1F1F1F"/>
-                </a:highlight>
-                <a:latin typeface="Menlo" panose="020B0609030804020204" pitchFamily="49" charset="0"/>
-              </a:rPr>
-              <a:t> Determine the reliability and credibility of the source.</a:t>
-            </a:r>
-          </a:p>
-          <a:p>
-            <a:r>
-              <a:rPr lang="en-US" b="0" dirty="0">
-                <a:solidFill>
-                  <a:srgbClr val="6796E6"/>
-                </a:solidFill>
-                <a:effectLst/>
-                <a:highlight>
-                  <a:srgbClr val="1F1F1F"/>
-                </a:highlight>
-                <a:latin typeface="Menlo" panose="020B0609030804020204" pitchFamily="49" charset="0"/>
-              </a:rPr>
-              <a:t>-</a:t>
-            </a:r>
-            <a:r>
-              <a:rPr lang="en-US" b="0" dirty="0">
-                <a:solidFill>
-                  <a:srgbClr val="CCCCCC"/>
-                </a:solidFill>
-                <a:effectLst/>
-                <a:highlight>
-                  <a:srgbClr val="1F1F1F"/>
-                </a:highlight>
-                <a:latin typeface="Menlo" panose="020B0609030804020204" pitchFamily="49" charset="0"/>
-              </a:rPr>
-              <a:t> Analyze the source's access to information and track record.</a:t>
-            </a:r>
+              <a:t> Compare current scenarios with historical examples.</a:t>
+            </a:r>
+          </a:p>
+          <a:p>
+            <a:endParaRPr lang="en-US" dirty="0"/>
           </a:p>
         </p:txBody>
       </p:sp>
@@ -1892,7 +1817,7 @@
     </p:spTree>
     <p:extLst>
       <p:ext uri="{BB962C8B-B14F-4D97-AF65-F5344CB8AC3E}">
-        <p14:creationId xmlns:p14="http://schemas.microsoft.com/office/powerpoint/2010/main" val="1939998934"/>
+        <p14:creationId xmlns:p14="http://schemas.microsoft.com/office/powerpoint/2010/main" val="261642412"/>
       </p:ext>
     </p:extLst>
   </p:cSld>
@@ -1975,7 +1900,7 @@
                 </a:highlight>
                 <a:latin typeface="Menlo" panose="020B0609030804020204" pitchFamily="49" charset="0"/>
               </a:rPr>
-              <a:t> Assess the accuracy and consistency of the evidence.</a:t>
+              <a:t> Evaluate the vulnerability of the source to manipulation.</a:t>
             </a:r>
           </a:p>
           <a:p>
@@ -2052,7 +1977,7 @@
                 </a:highlight>
                 <a:latin typeface="Menlo" panose="020B0609030804020204" pitchFamily="49" charset="0"/>
               </a:rPr>
-              <a:t> Present examples of evaluating evidence in influence operations:</a:t>
+              <a:t> Present examples of sources that can be manipulated:</a:t>
             </a:r>
           </a:p>
           <a:p>
@@ -2080,7 +2005,7 @@
                 </a:highlight>
                 <a:latin typeface="Menlo" panose="020B0609030804020204" pitchFamily="49" charset="0"/>
               </a:rPr>
-              <a:t> Example: Cross-referencing information from multiple sources.</a:t>
+              <a:t> Example: Social media influencers with questionable affiliations.</a:t>
             </a:r>
           </a:p>
           <a:p>
@@ -2108,7 +2033,7 @@
                 </a:highlight>
                 <a:latin typeface="Menlo" panose="020B0609030804020204" pitchFamily="49" charset="0"/>
               </a:rPr>
-              <a:t> Example: Checking for consistency in reports from different channels.</a:t>
+              <a:t> Example: Anonymous sources with unverifiable information.</a:t>
             </a:r>
           </a:p>
           <a:p>
@@ -2136,7 +2061,7 @@
                 </a:highlight>
                 <a:latin typeface="Menlo" panose="020B0609030804020204" pitchFamily="49" charset="0"/>
               </a:rPr>
-              <a:t> Discuss how to evaluate evidence in various scenarios:</a:t>
+              <a:t> Discuss how to assess the manipulability of sources in various scenarios:</a:t>
             </a:r>
           </a:p>
           <a:p>
@@ -2164,7 +2089,7 @@
                 </a:highlight>
                 <a:latin typeface="Menlo" panose="020B0609030804020204" pitchFamily="49" charset="0"/>
               </a:rPr>
-              <a:t> Verify the accuracy of the information provided.</a:t>
+              <a:t> Determine the reliability and credibility of the source.</a:t>
             </a:r>
           </a:p>
           <a:p>
@@ -2192,7 +2117,7 @@
                 </a:highlight>
                 <a:latin typeface="Menlo" panose="020B0609030804020204" pitchFamily="49" charset="0"/>
               </a:rPr>
-              <a:t> Identify inconsistencies and corroborate evidence from multiple sources.</a:t>
+              <a:t> Analyze the source's access to information and track record.</a:t>
             </a:r>
           </a:p>
         </p:txBody>
@@ -2236,7 +2161,7 @@
     </p:spTree>
     <p:extLst>
       <p:ext uri="{BB962C8B-B14F-4D97-AF65-F5344CB8AC3E}">
-        <p14:creationId xmlns:p14="http://schemas.microsoft.com/office/powerpoint/2010/main" val="3941403886"/>
+        <p14:creationId xmlns:p14="http://schemas.microsoft.com/office/powerpoint/2010/main" val="1939998934"/>
       </p:ext>
     </p:extLst>
   </p:cSld>
@@ -2298,7 +2223,7 @@
             <a:r>
               <a:rPr lang="en-US" b="0" dirty="0">
                 <a:solidFill>
-                  <a:srgbClr val="6796E6"/>
+                  <a:srgbClr val="6A9955"/>
                 </a:solidFill>
                 <a:effectLst/>
                 <a:highlight>
@@ -2306,7 +2231,7 @@
                 </a:highlight>
                 <a:latin typeface="Menlo" panose="020B0609030804020204" pitchFamily="49" charset="0"/>
               </a:rPr>
-              <a:t>1.</a:t>
+              <a:t>&gt;</a:t>
             </a:r>
             <a:r>
               <a:rPr lang="en-US" b="0" dirty="0">
@@ -2319,63 +2244,7 @@
                 </a:highlight>
                 <a:latin typeface="Menlo" panose="020B0609030804020204" pitchFamily="49" charset="0"/>
               </a:rPr>
-              <a:t> Divide students into groups and provide each group with a scenario to analyze using the Deception Detection framework. (10 minutes)</a:t>
-            </a:r>
-          </a:p>
-          <a:p>
-            <a:r>
-              <a:rPr lang="en-US" b="0" dirty="0">
-                <a:solidFill>
-                  <a:srgbClr val="6796E6"/>
-                </a:solidFill>
-                <a:effectLst/>
-                <a:highlight>
-                  <a:srgbClr val="1F1F1F"/>
-                </a:highlight>
-                <a:latin typeface="Menlo" panose="020B0609030804020204" pitchFamily="49" charset="0"/>
-              </a:rPr>
-              <a:t>2.</a:t>
-            </a:r>
-            <a:r>
-              <a:rPr lang="en-US" b="0" dirty="0">
-                <a:solidFill>
-                  <a:srgbClr val="CCCCCC"/>
-                </a:solidFill>
-                <a:effectLst/>
-                <a:highlight>
-                  <a:srgbClr val="1F1F1F"/>
-                </a:highlight>
-                <a:latin typeface="Menlo" panose="020B0609030804020204" pitchFamily="49" charset="0"/>
-              </a:rPr>
-              <a:t> Have each group present their findings to the class. (10 minutes)</a:t>
-            </a:r>
-          </a:p>
-          <a:p>
-            <a:r>
-              <a:rPr lang="en-US" b="0" dirty="0">
-                <a:solidFill>
-                  <a:srgbClr val="6796E6"/>
-                </a:solidFill>
-                <a:effectLst/>
-                <a:highlight>
-                  <a:srgbClr val="1F1F1F"/>
-                </a:highlight>
-                <a:latin typeface="Menlo" panose="020B0609030804020204" pitchFamily="49" charset="0"/>
-              </a:rPr>
-              <a:t>3.</a:t>
-            </a:r>
-            <a:r>
-              <a:rPr lang="en-US" b="0" dirty="0">
-                <a:solidFill>
-                  <a:srgbClr val="CCCCCC"/>
-                </a:solidFill>
-                <a:effectLst/>
-                <a:highlight>
-                  <a:srgbClr val="1F1F1F"/>
-                </a:highlight>
-                <a:latin typeface="Menlo" panose="020B0609030804020204" pitchFamily="49" charset="0"/>
-              </a:rPr>
-              <a:t> Provide feedback and discuss the effectiveness of their analysis. (10 minutes)</a:t>
+              <a:t> Assess the accuracy and consistency of the evidence.</a:t>
             </a:r>
           </a:p>
           <a:p>
@@ -2391,6 +2260,19 @@
                 <a:latin typeface="Menlo" panose="020B0609030804020204" pitchFamily="49" charset="0"/>
               </a:rPr>
             </a:br>
+            <a:r>
+              <a:rPr lang="en-US" b="1" dirty="0">
+                <a:solidFill>
+                  <a:srgbClr val="569CD6"/>
+                </a:solidFill>
+                <a:effectLst/>
+                <a:highlight>
+                  <a:srgbClr val="1F1F1F"/>
+                </a:highlight>
+                <a:latin typeface="Menlo" panose="020B0609030804020204" pitchFamily="49" charset="0"/>
+              </a:rPr>
+              <a:t>**Activity**</a:t>
+            </a:r>
             <a:endParaRPr lang="en-US" b="0" dirty="0">
               <a:solidFill>
                 <a:srgbClr val="CCCCCC"/>
@@ -2403,7 +2285,184 @@
             </a:endParaRPr>
           </a:p>
           <a:p>
-            <a:endParaRPr lang="en-US" dirty="0"/>
+            <a:br>
+              <a:rPr lang="en-US" b="0" dirty="0">
+                <a:solidFill>
+                  <a:srgbClr val="CCCCCC"/>
+                </a:solidFill>
+                <a:effectLst/>
+                <a:highlight>
+                  <a:srgbClr val="1F1F1F"/>
+                </a:highlight>
+                <a:latin typeface="Menlo" panose="020B0609030804020204" pitchFamily="49" charset="0"/>
+              </a:rPr>
+            </a:br>
+            <a:r>
+              <a:rPr lang="en-US" b="0" dirty="0">
+                <a:solidFill>
+                  <a:srgbClr val="6796E6"/>
+                </a:solidFill>
+                <a:effectLst/>
+                <a:highlight>
+                  <a:srgbClr val="1F1F1F"/>
+                </a:highlight>
+                <a:latin typeface="Menlo" panose="020B0609030804020204" pitchFamily="49" charset="0"/>
+              </a:rPr>
+              <a:t>1.</a:t>
+            </a:r>
+            <a:r>
+              <a:rPr lang="en-US" b="0" dirty="0">
+                <a:solidFill>
+                  <a:srgbClr val="CCCCCC"/>
+                </a:solidFill>
+                <a:effectLst/>
+                <a:highlight>
+                  <a:srgbClr val="1F1F1F"/>
+                </a:highlight>
+                <a:latin typeface="Menlo" panose="020B0609030804020204" pitchFamily="49" charset="0"/>
+              </a:rPr>
+              <a:t> Present examples of evaluating evidence in influence operations:</a:t>
+            </a:r>
+          </a:p>
+          <a:p>
+            <a:r>
+              <a:rPr lang="en-US" b="0" dirty="0">
+                <a:solidFill>
+                  <a:srgbClr val="6796E6"/>
+                </a:solidFill>
+                <a:effectLst/>
+                <a:highlight>
+                  <a:srgbClr val="1F1F1F"/>
+                </a:highlight>
+                <a:latin typeface="Menlo" panose="020B0609030804020204" pitchFamily="49" charset="0"/>
+              </a:rPr>
+              <a:t>-</a:t>
+            </a:r>
+            <a:r>
+              <a:rPr lang="en-US" b="0" dirty="0">
+                <a:solidFill>
+                  <a:srgbClr val="CCCCCC"/>
+                </a:solidFill>
+                <a:effectLst/>
+                <a:highlight>
+                  <a:srgbClr val="1F1F1F"/>
+                </a:highlight>
+                <a:latin typeface="Menlo" panose="020B0609030804020204" pitchFamily="49" charset="0"/>
+              </a:rPr>
+              <a:t> Example: Cross-referencing information from multiple sources.</a:t>
+            </a:r>
+          </a:p>
+          <a:p>
+            <a:r>
+              <a:rPr lang="en-US" b="0" dirty="0">
+                <a:solidFill>
+                  <a:srgbClr val="6796E6"/>
+                </a:solidFill>
+                <a:effectLst/>
+                <a:highlight>
+                  <a:srgbClr val="1F1F1F"/>
+                </a:highlight>
+                <a:latin typeface="Menlo" panose="020B0609030804020204" pitchFamily="49" charset="0"/>
+              </a:rPr>
+              <a:t>-</a:t>
+            </a:r>
+            <a:r>
+              <a:rPr lang="en-US" b="0" dirty="0">
+                <a:solidFill>
+                  <a:srgbClr val="CCCCCC"/>
+                </a:solidFill>
+                <a:effectLst/>
+                <a:highlight>
+                  <a:srgbClr val="1F1F1F"/>
+                </a:highlight>
+                <a:latin typeface="Menlo" panose="020B0609030804020204" pitchFamily="49" charset="0"/>
+              </a:rPr>
+              <a:t> Example: Checking for consistency in reports from different channels.</a:t>
+            </a:r>
+          </a:p>
+          <a:p>
+            <a:r>
+              <a:rPr lang="en-US" b="0" dirty="0">
+                <a:solidFill>
+                  <a:srgbClr val="6796E6"/>
+                </a:solidFill>
+                <a:effectLst/>
+                <a:highlight>
+                  <a:srgbClr val="1F1F1F"/>
+                </a:highlight>
+                <a:latin typeface="Menlo" panose="020B0609030804020204" pitchFamily="49" charset="0"/>
+              </a:rPr>
+              <a:t>2.</a:t>
+            </a:r>
+            <a:r>
+              <a:rPr lang="en-US" b="0" dirty="0">
+                <a:solidFill>
+                  <a:srgbClr val="CCCCCC"/>
+                </a:solidFill>
+                <a:effectLst/>
+                <a:highlight>
+                  <a:srgbClr val="1F1F1F"/>
+                </a:highlight>
+                <a:latin typeface="Menlo" panose="020B0609030804020204" pitchFamily="49" charset="0"/>
+              </a:rPr>
+              <a:t> Discuss how to evaluate evidence in various scenarios:</a:t>
+            </a:r>
+          </a:p>
+          <a:p>
+            <a:r>
+              <a:rPr lang="en-US" b="0" dirty="0">
+                <a:solidFill>
+                  <a:srgbClr val="6796E6"/>
+                </a:solidFill>
+                <a:effectLst/>
+                <a:highlight>
+                  <a:srgbClr val="1F1F1F"/>
+                </a:highlight>
+                <a:latin typeface="Menlo" panose="020B0609030804020204" pitchFamily="49" charset="0"/>
+              </a:rPr>
+              <a:t>-</a:t>
+            </a:r>
+            <a:r>
+              <a:rPr lang="en-US" b="0" dirty="0">
+                <a:solidFill>
+                  <a:srgbClr val="CCCCCC"/>
+                </a:solidFill>
+                <a:effectLst/>
+                <a:highlight>
+                  <a:srgbClr val="1F1F1F"/>
+                </a:highlight>
+                <a:latin typeface="Menlo" panose="020B0609030804020204" pitchFamily="49" charset="0"/>
+              </a:rPr>
+              <a:t> Verify the accuracy of the information provided.</a:t>
+            </a:r>
+          </a:p>
+          <a:p>
+            <a:r>
+              <a:rPr lang="en-US" b="0" dirty="0">
+                <a:solidFill>
+                  <a:srgbClr val="6796E6"/>
+                </a:solidFill>
+                <a:effectLst/>
+                <a:highlight>
+                  <a:srgbClr val="1F1F1F"/>
+                </a:highlight>
+                <a:latin typeface="Menlo" panose="020B0609030804020204" pitchFamily="49" charset="0"/>
+              </a:rPr>
+              <a:t>-</a:t>
+            </a:r>
+            <a:r>
+              <a:rPr lang="en-US" b="0" dirty="0">
+                <a:solidFill>
+                  <a:srgbClr val="CCCCCC"/>
+                </a:solidFill>
+                <a:effectLst/>
+                <a:highlight>
+                  <a:srgbClr val="1F1F1F"/>
+                </a:highlight>
+                <a:latin typeface="Menlo" panose="020B0609030804020204" pitchFamily="49" charset="0"/>
+              </a:rPr>
+              <a:t> Identify inconsistencies and corroborate evidence from multiple sources.</a:t>
+            </a:r>
           </a:p>
         </p:txBody>
       </p:sp>
@@ -2432,7 +2491,7 @@
                 </a:solidFill>
                 <a:latin typeface="Times New Roman"/>
               </a:rPr>
-              <a:t>12</a:t>
+              <a:t>10</a:t>
             </a:fld>
             <a:endParaRPr lang="en-US" sz="1400" b="0" strike="noStrike" spc="-1">
               <a:solidFill>
@@ -2446,7 +2505,7 @@
     </p:spTree>
     <p:extLst>
       <p:ext uri="{BB962C8B-B14F-4D97-AF65-F5344CB8AC3E}">
-        <p14:creationId xmlns:p14="http://schemas.microsoft.com/office/powerpoint/2010/main" val="2751407482"/>
+        <p14:creationId xmlns:p14="http://schemas.microsoft.com/office/powerpoint/2010/main" val="3941403886"/>
       </p:ext>
     </p:extLst>
   </p:cSld>
@@ -2506,9 +2565,114 @@
           <a:lstStyle/>
           <a:p>
             <a:r>
-              <a:rPr lang="en-US" dirty="0"/>
-              <a:t>Spanish version</a:t>
-            </a:r>
+              <a:rPr lang="en-US" b="0" dirty="0">
+                <a:solidFill>
+                  <a:srgbClr val="6796E6"/>
+                </a:solidFill>
+                <a:effectLst/>
+                <a:highlight>
+                  <a:srgbClr val="1F1F1F"/>
+                </a:highlight>
+                <a:latin typeface="Menlo" panose="020B0609030804020204" pitchFamily="49" charset="0"/>
+              </a:rPr>
+              <a:t>1.</a:t>
+            </a:r>
+            <a:r>
+              <a:rPr lang="en-US" b="0" dirty="0">
+                <a:solidFill>
+                  <a:srgbClr val="CCCCCC"/>
+                </a:solidFill>
+                <a:effectLst/>
+                <a:highlight>
+                  <a:srgbClr val="1F1F1F"/>
+                </a:highlight>
+                <a:latin typeface="Menlo" panose="020B0609030804020204" pitchFamily="49" charset="0"/>
+              </a:rPr>
+              <a:t> Divide students into groups and provide each group with a scenario to analyze using the Deception Detection framework. (10 minutes)</a:t>
+            </a:r>
+          </a:p>
+          <a:p>
+            <a:r>
+              <a:rPr lang="en-US" b="0" dirty="0">
+                <a:solidFill>
+                  <a:srgbClr val="6796E6"/>
+                </a:solidFill>
+                <a:effectLst/>
+                <a:highlight>
+                  <a:srgbClr val="1F1F1F"/>
+                </a:highlight>
+                <a:latin typeface="Menlo" panose="020B0609030804020204" pitchFamily="49" charset="0"/>
+              </a:rPr>
+              <a:t>2.</a:t>
+            </a:r>
+            <a:r>
+              <a:rPr lang="en-US" b="0" dirty="0">
+                <a:solidFill>
+                  <a:srgbClr val="CCCCCC"/>
+                </a:solidFill>
+                <a:effectLst/>
+                <a:highlight>
+                  <a:srgbClr val="1F1F1F"/>
+                </a:highlight>
+                <a:latin typeface="Menlo" panose="020B0609030804020204" pitchFamily="49" charset="0"/>
+              </a:rPr>
+              <a:t> Have each group present their findings to the class. (10 minutes)</a:t>
+            </a:r>
+          </a:p>
+          <a:p>
+            <a:r>
+              <a:rPr lang="en-US" b="0" dirty="0">
+                <a:solidFill>
+                  <a:srgbClr val="6796E6"/>
+                </a:solidFill>
+                <a:effectLst/>
+                <a:highlight>
+                  <a:srgbClr val="1F1F1F"/>
+                </a:highlight>
+                <a:latin typeface="Menlo" panose="020B0609030804020204" pitchFamily="49" charset="0"/>
+              </a:rPr>
+              <a:t>3.</a:t>
+            </a:r>
+            <a:r>
+              <a:rPr lang="en-US" b="0" dirty="0">
+                <a:solidFill>
+                  <a:srgbClr val="CCCCCC"/>
+                </a:solidFill>
+                <a:effectLst/>
+                <a:highlight>
+                  <a:srgbClr val="1F1F1F"/>
+                </a:highlight>
+                <a:latin typeface="Menlo" panose="020B0609030804020204" pitchFamily="49" charset="0"/>
+              </a:rPr>
+              <a:t> Provide feedback and discuss the effectiveness of their analysis. (10 minutes)</a:t>
+            </a:r>
+          </a:p>
+          <a:p>
+            <a:br>
+              <a:rPr lang="en-US" b="0" dirty="0">
+                <a:solidFill>
+                  <a:srgbClr val="CCCCCC"/>
+                </a:solidFill>
+                <a:effectLst/>
+                <a:highlight>
+                  <a:srgbClr val="1F1F1F"/>
+                </a:highlight>
+                <a:latin typeface="Menlo" panose="020B0609030804020204" pitchFamily="49" charset="0"/>
+              </a:rPr>
+            </a:br>
+            <a:endParaRPr lang="en-US" b="0" dirty="0">
+              <a:solidFill>
+                <a:srgbClr val="CCCCCC"/>
+              </a:solidFill>
+              <a:effectLst/>
+              <a:highlight>
+                <a:srgbClr val="1F1F1F"/>
+              </a:highlight>
+              <a:latin typeface="Menlo" panose="020B0609030804020204" pitchFamily="49" charset="0"/>
+            </a:endParaRPr>
+          </a:p>
+          <a:p>
+            <a:endParaRPr lang="en-US" dirty="0"/>
           </a:p>
         </p:txBody>
       </p:sp>
@@ -2537,7 +2701,7 @@
                 </a:solidFill>
                 <a:latin typeface="Times New Roman"/>
               </a:rPr>
-              <a:t>14</a:t>
+              <a:t>13</a:t>
             </a:fld>
             <a:endParaRPr lang="en-US" sz="1400" b="0" strike="noStrike" spc="-1">
               <a:solidFill>
@@ -2551,7 +2715,7 @@
     </p:spTree>
     <p:extLst>
       <p:ext uri="{BB962C8B-B14F-4D97-AF65-F5344CB8AC3E}">
-        <p14:creationId xmlns:p14="http://schemas.microsoft.com/office/powerpoint/2010/main" val="1662411302"/>
+        <p14:creationId xmlns:p14="http://schemas.microsoft.com/office/powerpoint/2010/main" val="2751407482"/>
       </p:ext>
     </p:extLst>
   </p:cSld>
@@ -6802,7 +6966,7 @@
           </a:ln>
           <a:extLst>
             <a:ext uri="{C572A759-6A51-4108-AA02-DFA0A04FC94B}">
-              <ma14:wrappingTextBoxFlag xmlns:ma14="http://schemas.microsoft.com/office/mac/drawingml/2011/main" xmlns:a14="http://schemas.microsoft.com/office/drawing/2010/main" xmlns:m="http://schemas.openxmlformats.org/officeDocument/2006/math" xmlns="" val="1"/>
+              <ma14:wrappingTextBoxFlag xmlns="" xmlns:m="http://schemas.openxmlformats.org/officeDocument/2006/math" xmlns:a14="http://schemas.microsoft.com/office/drawing/2010/main" xmlns:ma14="http://schemas.microsoft.com/office/mac/drawingml/2011/main" val="1"/>
             </a:ext>
           </a:extLst>
         </p:spPr>
@@ -6849,7 +7013,7 @@
           </a:ln>
           <a:extLst>
             <a:ext uri="{C572A759-6A51-4108-AA02-DFA0A04FC94B}">
-              <ma14:wrappingTextBoxFlag xmlns:ma14="http://schemas.microsoft.com/office/mac/drawingml/2011/main" xmlns:a14="http://schemas.microsoft.com/office/drawing/2010/main" xmlns:m="http://schemas.openxmlformats.org/officeDocument/2006/math" xmlns="" val="1"/>
+              <ma14:wrappingTextBoxFlag xmlns="" xmlns:m="http://schemas.openxmlformats.org/officeDocument/2006/math" xmlns:a14="http://schemas.microsoft.com/office/drawing/2010/main" xmlns:ma14="http://schemas.microsoft.com/office/mac/drawingml/2011/main" val="1"/>
             </a:ext>
           </a:extLst>
         </p:spPr>
@@ -6896,7 +7060,7 @@
           </a:ln>
           <a:extLst>
             <a:ext uri="{C572A759-6A51-4108-AA02-DFA0A04FC94B}">
-              <ma14:wrappingTextBoxFlag xmlns:ma14="http://schemas.microsoft.com/office/mac/drawingml/2011/main" xmlns:a14="http://schemas.microsoft.com/office/drawing/2010/main" xmlns:m="http://schemas.openxmlformats.org/officeDocument/2006/math" xmlns="" val="1"/>
+              <ma14:wrappingTextBoxFlag xmlns="" xmlns:m="http://schemas.openxmlformats.org/officeDocument/2006/math" xmlns:a14="http://schemas.microsoft.com/office/drawing/2010/main" xmlns:ma14="http://schemas.microsoft.com/office/mac/drawingml/2011/main" val="1"/>
             </a:ext>
           </a:extLst>
         </p:spPr>
@@ -6943,7 +7107,7 @@
           </a:ln>
           <a:extLst>
             <a:ext uri="{C572A759-6A51-4108-AA02-DFA0A04FC94B}">
-              <ma14:wrappingTextBoxFlag xmlns:ma14="http://schemas.microsoft.com/office/mac/drawingml/2011/main" xmlns:a14="http://schemas.microsoft.com/office/drawing/2010/main" xmlns:m="http://schemas.openxmlformats.org/officeDocument/2006/math" xmlns="" val="1"/>
+              <ma14:wrappingTextBoxFlag xmlns="" xmlns:m="http://schemas.openxmlformats.org/officeDocument/2006/math" xmlns:a14="http://schemas.microsoft.com/office/drawing/2010/main" xmlns:ma14="http://schemas.microsoft.com/office/mac/drawingml/2011/main" val="1"/>
             </a:ext>
           </a:extLst>
         </p:spPr>
@@ -6996,7 +7160,7 @@
           <p:cNvPr id="2" name="Title 1">
             <a:extLst>
               <a:ext uri="{FF2B5EF4-FFF2-40B4-BE49-F238E27FC236}">
-                <a16:creationId xmlns:a16="http://schemas.microsoft.com/office/drawing/2014/main" id="{6B937A14-F099-A9E5-AE60-86131F123055}"/>
+                <a16:creationId xmlns:a16="http://schemas.microsoft.com/office/drawing/2014/main" id="{0E7CCAEB-D84E-456D-3B6B-2E9573C73F98}"/>
               </a:ext>
             </a:extLst>
           </p:cNvPr>
@@ -7014,7 +7178,7 @@
           <a:p>
             <a:r>
               <a:rPr lang="en-US" dirty="0"/>
-              <a:t>Deception Detection Check On Learning</a:t>
+              <a:t>Evaluation of Evidence (EVE)</a:t>
             </a:r>
           </a:p>
         </p:txBody>
@@ -7024,7 +7188,7 @@
           <p:cNvPr id="3" name="Content Placeholder 2">
             <a:extLst>
               <a:ext uri="{FF2B5EF4-FFF2-40B4-BE49-F238E27FC236}">
-                <a16:creationId xmlns:a16="http://schemas.microsoft.com/office/drawing/2014/main" id="{C2AE1516-AD30-1968-D700-CEA2179263C0}"/>
+                <a16:creationId xmlns:a16="http://schemas.microsoft.com/office/drawing/2014/main" id="{0A5EC664-EFAD-501E-02EA-4124C835D47B}"/>
               </a:ext>
             </a:extLst>
           </p:cNvPr>
@@ -7040,14 +7204,14 @@
           <a:bodyPr/>
           <a:lstStyle/>
           <a:p>
-            <a:endParaRPr lang="en-US" dirty="0"/>
+            <a:endParaRPr lang="en-US"/>
           </a:p>
         </p:txBody>
       </p:sp>
     </p:spTree>
     <p:extLst>
       <p:ext uri="{BB962C8B-B14F-4D97-AF65-F5344CB8AC3E}">
-        <p14:creationId xmlns:p14="http://schemas.microsoft.com/office/powerpoint/2010/main" val="1577004903"/>
+        <p14:creationId xmlns:p14="http://schemas.microsoft.com/office/powerpoint/2010/main" val="3190735002"/>
       </p:ext>
     </p:extLst>
   </p:cSld>
@@ -7123,12 +7287,6 @@
           <a:bodyPr/>
           <a:lstStyle/>
           <a:p>
-            <a:r>
-              <a:rPr lang="en-US" dirty="0"/>
-              <a:t>What framework would you use for:</a:t>
-            </a:r>
-          </a:p>
-          <a:p>
             <a:endParaRPr lang="en-US" dirty="0"/>
           </a:p>
         </p:txBody>
@@ -7136,7 +7294,7 @@
     </p:spTree>
     <p:extLst>
       <p:ext uri="{BB962C8B-B14F-4D97-AF65-F5344CB8AC3E}">
-        <p14:creationId xmlns:p14="http://schemas.microsoft.com/office/powerpoint/2010/main" val="2296125235"/>
+        <p14:creationId xmlns:p14="http://schemas.microsoft.com/office/powerpoint/2010/main" val="1577004903"/>
       </p:ext>
     </p:extLst>
   </p:cSld>
@@ -7168,7 +7326,7 @@
           <p:cNvPr id="2" name="Title 1">
             <a:extLst>
               <a:ext uri="{FF2B5EF4-FFF2-40B4-BE49-F238E27FC236}">
-                <a16:creationId xmlns:a16="http://schemas.microsoft.com/office/drawing/2014/main" id="{D1C68DAF-912D-4872-669E-01FDE476A5E6}"/>
+                <a16:creationId xmlns:a16="http://schemas.microsoft.com/office/drawing/2014/main" id="{6B937A14-F099-A9E5-AE60-86131F123055}"/>
               </a:ext>
             </a:extLst>
           </p:cNvPr>
@@ -7186,7 +7344,7 @@
           <a:p>
             <a:r>
               <a:rPr lang="en-US" dirty="0"/>
-              <a:t>Practical Application of Deception Detection Framework</a:t>
+              <a:t>Deception Detection Check On Learning</a:t>
             </a:r>
           </a:p>
         </p:txBody>
@@ -7196,7 +7354,7 @@
           <p:cNvPr id="3" name="Content Placeholder 2">
             <a:extLst>
               <a:ext uri="{FF2B5EF4-FFF2-40B4-BE49-F238E27FC236}">
-                <a16:creationId xmlns:a16="http://schemas.microsoft.com/office/drawing/2014/main" id="{ACBE4B2E-A404-1205-5D03-74E17CF90DDA}"/>
+                <a16:creationId xmlns:a16="http://schemas.microsoft.com/office/drawing/2014/main" id="{C2AE1516-AD30-1968-D700-CEA2179263C0}"/>
               </a:ext>
             </a:extLst>
           </p:cNvPr>
@@ -7212,14 +7370,20 @@
           <a:bodyPr/>
           <a:lstStyle/>
           <a:p>
-            <a:endParaRPr lang="en-US"/>
+            <a:r>
+              <a:rPr lang="en-US" dirty="0"/>
+              <a:t>What framework would you use for:</a:t>
+            </a:r>
+          </a:p>
+          <a:p>
+            <a:endParaRPr lang="en-US" dirty="0"/>
           </a:p>
         </p:txBody>
       </p:sp>
     </p:spTree>
     <p:extLst>
       <p:ext uri="{BB962C8B-B14F-4D97-AF65-F5344CB8AC3E}">
-        <p14:creationId xmlns:p14="http://schemas.microsoft.com/office/powerpoint/2010/main" val="1581320203"/>
+        <p14:creationId xmlns:p14="http://schemas.microsoft.com/office/powerpoint/2010/main" val="2296125235"/>
       </p:ext>
     </p:extLst>
   </p:cSld>
@@ -7251,6 +7415,89 @@
           <p:cNvPr id="2" name="Title 1">
             <a:extLst>
               <a:ext uri="{FF2B5EF4-FFF2-40B4-BE49-F238E27FC236}">
+                <a16:creationId xmlns:a16="http://schemas.microsoft.com/office/drawing/2014/main" id="{D1C68DAF-912D-4872-669E-01FDE476A5E6}"/>
+              </a:ext>
+            </a:extLst>
+          </p:cNvPr>
+          <p:cNvSpPr>
+            <a:spLocks noGrp="1"/>
+          </p:cNvSpPr>
+          <p:nvPr>
+            <p:ph type="title"/>
+          </p:nvPr>
+        </p:nvSpPr>
+        <p:spPr/>
+        <p:txBody>
+          <a:bodyPr/>
+          <a:lstStyle/>
+          <a:p>
+            <a:r>
+              <a:rPr lang="en-US" dirty="0"/>
+              <a:t>Practical Application of Deception Detection Framework</a:t>
+            </a:r>
+          </a:p>
+        </p:txBody>
+      </p:sp>
+      <p:sp>
+        <p:nvSpPr>
+          <p:cNvPr id="3" name="Content Placeholder 2">
+            <a:extLst>
+              <a:ext uri="{FF2B5EF4-FFF2-40B4-BE49-F238E27FC236}">
+                <a16:creationId xmlns:a16="http://schemas.microsoft.com/office/drawing/2014/main" id="{ACBE4B2E-A404-1205-5D03-74E17CF90DDA}"/>
+              </a:ext>
+            </a:extLst>
+          </p:cNvPr>
+          <p:cNvSpPr>
+            <a:spLocks noGrp="1"/>
+          </p:cNvSpPr>
+          <p:nvPr>
+            <p:ph idx="1"/>
+          </p:nvPr>
+        </p:nvSpPr>
+        <p:spPr/>
+        <p:txBody>
+          <a:bodyPr/>
+          <a:lstStyle/>
+          <a:p>
+            <a:endParaRPr lang="en-US"/>
+          </a:p>
+        </p:txBody>
+      </p:sp>
+    </p:spTree>
+    <p:extLst>
+      <p:ext uri="{BB962C8B-B14F-4D97-AF65-F5344CB8AC3E}">
+        <p14:creationId xmlns:p14="http://schemas.microsoft.com/office/powerpoint/2010/main" val="1581320203"/>
+      </p:ext>
+    </p:extLst>
+  </p:cSld>
+  <p:clrMapOvr>
+    <a:masterClrMapping/>
+  </p:clrMapOvr>
+</p:sld>
+</file>
+
+<file path=ppt/slides/slide14.xml><?xml version="1.0" encoding="utf-8"?>
+<p:sld xmlns:a="http://schemas.openxmlformats.org/drawingml/2006/main" xmlns:r="http://schemas.openxmlformats.org/officeDocument/2006/relationships" xmlns:p="http://schemas.openxmlformats.org/presentationml/2006/main">
+  <p:cSld>
+    <p:spTree>
+      <p:nvGrpSpPr>
+        <p:cNvPr id="1" name=""/>
+        <p:cNvGrpSpPr/>
+        <p:nvPr/>
+      </p:nvGrpSpPr>
+      <p:grpSpPr>
+        <a:xfrm>
+          <a:off x="0" y="0"/>
+          <a:ext cx="0" cy="0"/>
+          <a:chOff x="0" y="0"/>
+          <a:chExt cx="0" cy="0"/>
+        </a:xfrm>
+      </p:grpSpPr>
+      <p:sp>
+        <p:nvSpPr>
+          <p:cNvPr id="2" name="Title 1">
+            <a:extLst>
+              <a:ext uri="{FF2B5EF4-FFF2-40B4-BE49-F238E27FC236}">
                 <a16:creationId xmlns:a16="http://schemas.microsoft.com/office/drawing/2014/main" id="{0E7CCAEB-D84E-456D-3B6B-2E9573C73F98}"/>
               </a:ext>
             </a:extLst>
@@ -7312,7 +7559,7 @@
 </p:sld>
 </file>
 
-<file path=ppt/slides/slide14.xml><?xml version="1.0" encoding="utf-8"?>
+<file path=ppt/slides/slide15.xml><?xml version="1.0" encoding="utf-8"?>
 <p:sld xmlns:a="http://schemas.openxmlformats.org/drawingml/2006/main" xmlns:r="http://schemas.openxmlformats.org/officeDocument/2006/relationships" xmlns:p="http://schemas.openxmlformats.org/presentationml/2006/main">
   <p:cSld>
     <p:bg>
@@ -7409,7 +7656,7 @@
           </a:prstGeom>
           <a:extLst>
             <a:ext uri="{C572A759-6A51-4108-AA02-DFA0A04FC94B}">
-              <ma14:wrappingTextBoxFlag xmlns:ma14="http://schemas.microsoft.com/office/mac/drawingml/2011/main" xmlns:a14="http://schemas.microsoft.com/office/drawing/2010/main" xmlns:m="http://schemas.openxmlformats.org/officeDocument/2006/math" xmlns="" val="1"/>
+              <ma14:wrappingTextBoxFlag xmlns="" xmlns:m="http://schemas.openxmlformats.org/officeDocument/2006/math" xmlns:a14="http://schemas.microsoft.com/office/drawing/2010/main" xmlns:ma14="http://schemas.microsoft.com/office/mac/drawingml/2011/main" val="1"/>
             </a:ext>
           </a:extLst>
         </p:spPr>
@@ -7418,7 +7665,7 @@
           <a:lstStyle/>
           <a:p>
             <a:fld id="{86CB4B4D-7CA3-9044-876B-883B54F8677D}" type="slidenum">
-              <a:t>14</a:t>
+              <a:t>15</a:t>
             </a:fld>
             <a:endParaRPr/>
           </a:p>
@@ -7433,7 +7680,7 @@
 </p:sld>
 </file>
 
-<file path=ppt/slides/slide15.xml><?xml version="1.0" encoding="utf-8"?>
+<file path=ppt/slides/slide16.xml><?xml version="1.0" encoding="utf-8"?>
 <p:sld xmlns:a="http://schemas.openxmlformats.org/drawingml/2006/main" xmlns:r="http://schemas.openxmlformats.org/officeDocument/2006/relationships" xmlns:p="http://schemas.openxmlformats.org/presentationml/2006/main">
   <p:cSld>
     <p:spTree>
@@ -7522,7 +7769,7 @@
           </a:prstGeom>
           <a:extLst>
             <a:ext uri="{C572A759-6A51-4108-AA02-DFA0A04FC94B}">
-              <ma14:wrappingTextBoxFlag xmlns:ma14="http://schemas.microsoft.com/office/mac/drawingml/2011/main" xmlns:a14="http://schemas.microsoft.com/office/drawing/2010/main" xmlns:m="http://schemas.openxmlformats.org/officeDocument/2006/math" xmlns="" val="1"/>
+              <ma14:wrappingTextBoxFlag xmlns="" xmlns:m="http://schemas.openxmlformats.org/officeDocument/2006/math" xmlns:a14="http://schemas.microsoft.com/office/drawing/2010/main" xmlns:ma14="http://schemas.microsoft.com/office/mac/drawingml/2011/main" val="1"/>
             </a:ext>
           </a:extLst>
         </p:spPr>
@@ -7531,7 +7778,7 @@
           <a:lstStyle/>
           <a:p>
             <a:fld id="{86CB4B4D-7CA3-9044-876B-883B54F8677D}" type="slidenum">
-              <a:t>15</a:t>
+              <a:t>16</a:t>
             </a:fld>
             <a:endParaRPr/>
           </a:p>
@@ -7548,7 +7795,7 @@
         <p:push dir="u"/>
       </p:transition>
     </mc:Choice>
-    <mc:Fallback xmlns:a14="http://schemas.microsoft.com/office/drawing/2010/main" xmlns:m="http://schemas.openxmlformats.org/officeDocument/2006/math" xmlns="">
+    <mc:Fallback xmlns="" xmlns:m="http://schemas.openxmlformats.org/officeDocument/2006/math" xmlns:a14="http://schemas.microsoft.com/office/drawing/2010/main">
       <p:transition spd="slow">
         <p:fade/>
       </p:transition>
@@ -7557,7 +7804,7 @@
 </p:sld>
 </file>
 
-<file path=ppt/slides/slide16.xml><?xml version="1.0" encoding="utf-8"?>
+<file path=ppt/slides/slide17.xml><?xml version="1.0" encoding="utf-8"?>
 <p:sld xmlns:a="http://schemas.openxmlformats.org/drawingml/2006/main" xmlns:r="http://schemas.openxmlformats.org/officeDocument/2006/relationships" xmlns:p="http://schemas.openxmlformats.org/presentationml/2006/main">
   <p:cSld>
     <p:bg>
@@ -7669,7 +7916,7 @@
           </a:ln>
           <a:extLst>
             <a:ext uri="{C572A759-6A51-4108-AA02-DFA0A04FC94B}">
-              <ma14:wrappingTextBoxFlag xmlns:ma14="http://schemas.microsoft.com/office/mac/drawingml/2011/main" xmlns:a14="http://schemas.microsoft.com/office/drawing/2010/main" xmlns:m="http://schemas.openxmlformats.org/officeDocument/2006/math" xmlns="" val="1"/>
+              <ma14:wrappingTextBoxFlag xmlns="" xmlns:m="http://schemas.openxmlformats.org/officeDocument/2006/math" xmlns:a14="http://schemas.microsoft.com/office/drawing/2010/main" xmlns:ma14="http://schemas.microsoft.com/office/mac/drawingml/2011/main" val="1"/>
             </a:ext>
           </a:extLst>
         </p:spPr>
@@ -7705,7 +7952,7 @@
           </a:prstGeom>
           <a:extLst>
             <a:ext uri="{C572A759-6A51-4108-AA02-DFA0A04FC94B}">
-              <ma14:wrappingTextBoxFlag xmlns:ma14="http://schemas.microsoft.com/office/mac/drawingml/2011/main" xmlns:a14="http://schemas.microsoft.com/office/drawing/2010/main" xmlns:m="http://schemas.openxmlformats.org/officeDocument/2006/math" xmlns="" val="1"/>
+              <ma14:wrappingTextBoxFlag xmlns="" xmlns:m="http://schemas.openxmlformats.org/officeDocument/2006/math" xmlns:a14="http://schemas.microsoft.com/office/drawing/2010/main" xmlns:ma14="http://schemas.microsoft.com/office/mac/drawingml/2011/main" val="1"/>
             </a:ext>
           </a:extLst>
         </p:spPr>
@@ -7715,7 +7962,7 @@
           <a:p>
             <a:fld id="{86CB4B4D-7CA3-9044-876B-883B54F8677D}" type="slidenum">
               <a:rPr/>
-              <a:t>16</a:t>
+              <a:t>17</a:t>
             </a:fld>
             <a:endParaRPr/>
           </a:p>
@@ -7732,7 +7979,7 @@
         <p:push dir="u"/>
       </p:transition>
     </mc:Choice>
-    <mc:Fallback xmlns:a14="http://schemas.microsoft.com/office/drawing/2010/main" xmlns:m="http://schemas.openxmlformats.org/officeDocument/2006/math" xmlns="">
+    <mc:Fallback xmlns="" xmlns:m="http://schemas.openxmlformats.org/officeDocument/2006/math" xmlns:a14="http://schemas.microsoft.com/office/drawing/2010/main">
       <p:transition spd="slow">
         <p:fade/>
       </p:transition>
@@ -7741,7 +7988,7 @@
 </p:sld>
 </file>
 
-<file path=ppt/slides/slide17.xml><?xml version="1.0" encoding="utf-8"?>
+<file path=ppt/slides/slide18.xml><?xml version="1.0" encoding="utf-8"?>
 <p:sld xmlns:a="http://schemas.openxmlformats.org/drawingml/2006/main" xmlns:r="http://schemas.openxmlformats.org/officeDocument/2006/relationships" xmlns:p="http://schemas.openxmlformats.org/presentationml/2006/main">
   <p:cSld>
     <p:spTree>
@@ -7845,7 +8092,7 @@
           </a:ln>
           <a:extLst>
             <a:ext uri="{C572A759-6A51-4108-AA02-DFA0A04FC94B}">
-              <ma14:wrappingTextBoxFlag xmlns:ma14="http://schemas.microsoft.com/office/mac/drawingml/2011/main" xmlns:a14="http://schemas.microsoft.com/office/drawing/2010/main" xmlns:m="http://schemas.openxmlformats.org/officeDocument/2006/math" xmlns="" val="1"/>
+              <ma14:wrappingTextBoxFlag xmlns="" xmlns:m="http://schemas.openxmlformats.org/officeDocument/2006/math" xmlns:a14="http://schemas.microsoft.com/office/drawing/2010/main" xmlns:ma14="http://schemas.microsoft.com/office/mac/drawingml/2011/main" val="1"/>
             </a:ext>
           </a:extLst>
         </p:spPr>
@@ -7881,7 +8128,7 @@
           </a:prstGeom>
           <a:extLst>
             <a:ext uri="{C572A759-6A51-4108-AA02-DFA0A04FC94B}">
-              <ma14:wrappingTextBoxFlag xmlns:ma14="http://schemas.microsoft.com/office/mac/drawingml/2011/main" xmlns:a14="http://schemas.microsoft.com/office/drawing/2010/main" xmlns:m="http://schemas.openxmlformats.org/officeDocument/2006/math" xmlns="" val="1"/>
+              <ma14:wrappingTextBoxFlag xmlns="" xmlns:m="http://schemas.openxmlformats.org/officeDocument/2006/math" xmlns:a14="http://schemas.microsoft.com/office/drawing/2010/main" xmlns:ma14="http://schemas.microsoft.com/office/mac/drawingml/2011/main" val="1"/>
             </a:ext>
           </a:extLst>
         </p:spPr>
@@ -7890,7 +8137,7 @@
           <a:lstStyle/>
           <a:p>
             <a:fld id="{86CB4B4D-7CA3-9044-876B-883B54F8677D}" type="slidenum">
-              <a:t>17</a:t>
+              <a:t>18</a:t>
             </a:fld>
             <a:endParaRPr/>
           </a:p>
@@ -8179,7 +8426,19 @@
           <a:bodyPr/>
           <a:lstStyle/>
           <a:p>
-            <a:endParaRPr lang="en-US"/>
+            <a:r>
+              <a:rPr lang="en-US" dirty="0"/>
+              <a:t>Identify misinformation and disinformation effectively using the Deception Detection Framework and Structured Analytic Techniques (SATs).</a:t>
+            </a:r>
+          </a:p>
+          <a:p>
+            <a:endParaRPr lang="en-US" dirty="0"/>
+          </a:p>
+          <a:p>
+            <a:r>
+              <a:rPr lang="en-US" dirty="0"/>
+              <a:t>During this 130-minute block of instruction, the students will learn to identify misinformation and disinformation using the skills and frameworks previously covered.</a:t>
+            </a:r>
           </a:p>
         </p:txBody>
       </p:sp>
@@ -8236,7 +8495,7 @@
           <a:p>
             <a:r>
               <a:rPr lang="en-US" dirty="0"/>
-              <a:t>Deception Detection Framework</a:t>
+              <a:t>Terms</a:t>
             </a:r>
           </a:p>
         </p:txBody>
@@ -8259,48 +8518,29 @@
         </p:nvSpPr>
         <p:spPr/>
         <p:txBody>
-          <a:bodyPr/>
-          <a:lstStyle/>
-          <a:p>
+          <a:bodyPr>
+            <a:normAutofit/>
+          </a:bodyPr>
+          <a:lstStyle/>
+          <a:p>
+            <a:pPr marL="0" indent="0">
+              <a:buNone/>
+            </a:pPr>
             <a:r>
               <a:rPr lang="en-US" dirty="0"/>
-              <a:t>1. Present examples of different motives, opportunities, and means in influence operations:</a:t>
+              <a:t>Terms</a:t>
             </a:r>
           </a:p>
           <a:p>
             <a:r>
               <a:rPr lang="en-US" dirty="0"/>
-              <a:t>    - Example: Political gains from spreading false allegation about rival.</a:t>
+              <a:t>Misinformation: is false or inaccurate information. Examples include rumors, insults and pranks.</a:t>
             </a:r>
           </a:p>
           <a:p>
             <a:r>
               <a:rPr lang="en-US" dirty="0"/>
-              <a:t>    - Example: Using social media channels to disseminate false information.</a:t>
-            </a:r>
-          </a:p>
-          <a:p>
-            <a:r>
-              <a:rPr lang="en-US" dirty="0"/>
-              <a:t>2. Discuss how to assess these components in various scenarios:</a:t>
-            </a:r>
-          </a:p>
-          <a:p>
-            <a:r>
-              <a:rPr lang="en-US" dirty="0"/>
-              <a:t>    - Identify the goals and motives behind the information.</a:t>
-            </a:r>
-          </a:p>
-          <a:p>
-            <a:r>
-              <a:rPr lang="en-US" dirty="0"/>
-              <a:t>    - Evaluate the channels available for spreading misinformation.</a:t>
-            </a:r>
-          </a:p>
-          <a:p>
-            <a:r>
-              <a:rPr lang="en-US" dirty="0"/>
-              <a:t>    - Assess the risks and costs involved in the deception.</a:t>
+              <a:t>Disinformation: is deliberate and includes malicious content such as hoaxes, spear phishing and propaganda.</a:t>
             </a:r>
           </a:p>
         </p:txBody>
@@ -8308,7 +8548,7 @@
     </p:spTree>
     <p:extLst>
       <p:ext uri="{BB962C8B-B14F-4D97-AF65-F5344CB8AC3E}">
-        <p14:creationId xmlns:p14="http://schemas.microsoft.com/office/powerpoint/2010/main" val="313808639"/>
+        <p14:creationId xmlns:p14="http://schemas.microsoft.com/office/powerpoint/2010/main" val="598053482"/>
       </p:ext>
     </p:extLst>
   </p:cSld>
@@ -8358,7 +8598,7 @@
           <a:p>
             <a:r>
               <a:rPr lang="en-US" dirty="0"/>
-              <a:t>Motive, Opportunity, and Means (MOM)</a:t>
+              <a:t>Deception Detection Framework</a:t>
             </a:r>
           </a:p>
         </p:txBody>
@@ -8386,45 +8626,36 @@
           </a:bodyPr>
           <a:lstStyle/>
           <a:p>
+            <a:pPr marL="0" indent="0">
+              <a:buNone/>
+            </a:pPr>
+            <a:r>
+              <a:rPr lang="en-US" b="1" dirty="0"/>
+              <a:t>Deception Detection Frameworks</a:t>
+            </a:r>
+          </a:p>
+          <a:p>
             <a:r>
               <a:rPr lang="en-US" dirty="0"/>
-              <a:t>1. Present examples of different motives, opportunities, and means in influence operations:</a:t>
+              <a:t>MOM Framework: Motive, Opportunity, and Means </a:t>
             </a:r>
           </a:p>
           <a:p>
             <a:r>
               <a:rPr lang="en-US" dirty="0"/>
-              <a:t>    - Example: Political gains from spreading false allegation about rival.</a:t>
+              <a:t>POP Framework: Past Opposition Practices </a:t>
             </a:r>
           </a:p>
           <a:p>
             <a:r>
               <a:rPr lang="en-US" dirty="0"/>
-              <a:t>    - Example: Using social media channels to disseminate false information.</a:t>
+              <a:t>MOSES Framework: Manipulability of Sources </a:t>
             </a:r>
           </a:p>
           <a:p>
             <a:r>
               <a:rPr lang="en-US" dirty="0"/>
-              <a:t>2. Discuss how to assess these components in various scenarios:</a:t>
-            </a:r>
-          </a:p>
-          <a:p>
-            <a:r>
-              <a:rPr lang="en-US" dirty="0"/>
-              <a:t>    - Identify the goals and motives behind the information.</a:t>
-            </a:r>
-          </a:p>
-          <a:p>
-            <a:r>
-              <a:rPr lang="en-US" dirty="0"/>
-              <a:t>    - Evaluate the channels available for spreading misinformation.</a:t>
-            </a:r>
-          </a:p>
-          <a:p>
-            <a:r>
-              <a:rPr lang="en-US" dirty="0"/>
-              <a:t>    - Assess the risks and costs involved in the deception.</a:t>
+              <a:t>EVE Framework: Evaluation of Evidence</a:t>
             </a:r>
           </a:p>
         </p:txBody>
@@ -8432,7 +8663,7 @@
     </p:spTree>
     <p:extLst>
       <p:ext uri="{BB962C8B-B14F-4D97-AF65-F5344CB8AC3E}">
-        <p14:creationId xmlns:p14="http://schemas.microsoft.com/office/powerpoint/2010/main" val="4036291633"/>
+        <p14:creationId xmlns:p14="http://schemas.microsoft.com/office/powerpoint/2010/main" val="313808639"/>
       </p:ext>
     </p:extLst>
   </p:cSld>
@@ -8482,7 +8713,7 @@
           <a:p>
             <a:r>
               <a:rPr lang="en-US" dirty="0"/>
-              <a:t>Past Opposition Practices (POP)</a:t>
+              <a:t>Motive, Opportunity, and Means (MOM)</a:t>
             </a:r>
           </a:p>
         </p:txBody>
@@ -8505,17 +8736,58 @@
         </p:nvSpPr>
         <p:spPr/>
         <p:txBody>
-          <a:bodyPr/>
-          <a:lstStyle/>
-          <a:p>
-            <a:endParaRPr lang="en-US"/>
+          <a:bodyPr>
+            <a:normAutofit/>
+          </a:bodyPr>
+          <a:lstStyle/>
+          <a:p>
+            <a:r>
+              <a:rPr lang="en-US" dirty="0"/>
+              <a:t>1. Present examples of different motives, opportunities, and means in influence operations:</a:t>
+            </a:r>
+          </a:p>
+          <a:p>
+            <a:r>
+              <a:rPr lang="en-US" dirty="0"/>
+              <a:t>    - Example: Political gains from spreading false allegation about rival.</a:t>
+            </a:r>
+          </a:p>
+          <a:p>
+            <a:r>
+              <a:rPr lang="en-US" dirty="0"/>
+              <a:t>    - Example: Using social media channels to disseminate false information.</a:t>
+            </a:r>
+          </a:p>
+          <a:p>
+            <a:r>
+              <a:rPr lang="en-US" dirty="0"/>
+              <a:t>2. Discuss how to assess these components in various scenarios:</a:t>
+            </a:r>
+          </a:p>
+          <a:p>
+            <a:r>
+              <a:rPr lang="en-US" dirty="0"/>
+              <a:t>    - Identify the goals and motives behind the information.</a:t>
+            </a:r>
+          </a:p>
+          <a:p>
+            <a:r>
+              <a:rPr lang="en-US" dirty="0"/>
+              <a:t>    - Evaluate the channels available for spreading misinformation.</a:t>
+            </a:r>
+          </a:p>
+          <a:p>
+            <a:r>
+              <a:rPr lang="en-US" dirty="0"/>
+              <a:t>    - Assess the risks and costs involved in the deception.</a:t>
+            </a:r>
           </a:p>
         </p:txBody>
       </p:sp>
     </p:spTree>
     <p:extLst>
       <p:ext uri="{BB962C8B-B14F-4D97-AF65-F5344CB8AC3E}">
-        <p14:creationId xmlns:p14="http://schemas.microsoft.com/office/powerpoint/2010/main" val="1926719575"/>
+        <p14:creationId xmlns:p14="http://schemas.microsoft.com/office/powerpoint/2010/main" val="4036291633"/>
       </p:ext>
     </p:extLst>
   </p:cSld>
@@ -8565,7 +8837,7 @@
           <a:p>
             <a:r>
               <a:rPr lang="en-US" dirty="0"/>
-              <a:t>Manipulability of Sources (MOSES)</a:t>
+              <a:t>Past Opposition Practices (POP)</a:t>
             </a:r>
           </a:p>
         </p:txBody>
@@ -8598,7 +8870,7 @@
     </p:spTree>
     <p:extLst>
       <p:ext uri="{BB962C8B-B14F-4D97-AF65-F5344CB8AC3E}">
-        <p14:creationId xmlns:p14="http://schemas.microsoft.com/office/powerpoint/2010/main" val="3769904834"/>
+        <p14:creationId xmlns:p14="http://schemas.microsoft.com/office/powerpoint/2010/main" val="1926719575"/>
       </p:ext>
     </p:extLst>
   </p:cSld>
@@ -8648,7 +8920,7 @@
           <a:p>
             <a:r>
               <a:rPr lang="en-US" dirty="0"/>
-              <a:t>Evaluation of Evidence (EVE)</a:t>
+              <a:t>Manipulability of Sources (MOSES)</a:t>
             </a:r>
           </a:p>
         </p:txBody>
@@ -8681,7 +8953,7 @@
     </p:spTree>
     <p:extLst>
       <p:ext uri="{BB962C8B-B14F-4D97-AF65-F5344CB8AC3E}">
-        <p14:creationId xmlns:p14="http://schemas.microsoft.com/office/powerpoint/2010/main" val="3190735002"/>
+        <p14:creationId xmlns:p14="http://schemas.microsoft.com/office/powerpoint/2010/main" val="3769904834"/>
       </p:ext>
     </p:extLst>
   </p:cSld>

</xml_diff>

<commit_message>
more depth for the instructor fromt he structured analytic technique handbook
</commit_message>
<xml_diff>
--- a/Counter_Malign_Information/4-Implement-For_Instructors/Lesson_Plans/Lesson_05-Identify_Malign_Information/Audio_Visual-Identify_Misinformation/Instructor-Lesson_Slide-Identify_Misinformation.pptx
+++ b/Counter_Malign_Information/4-Implement-For_Instructors/Lesson_Plans/Lesson_05-Identify_Malign_Information/Audio_Visual-Identify_Misinformation/Instructor-Lesson_Slide-Identify_Misinformation.pptx
@@ -6,7 +6,7 @@
     <p:sldMasterId id="2147483675" r:id="rId2"/>
   </p:sldMasterIdLst>
   <p:notesMasterIdLst>
-    <p:notesMasterId r:id="rId21"/>
+    <p:notesMasterId r:id="rId26"/>
   </p:notesMasterIdLst>
   <p:sldIdLst>
     <p:sldId id="620" r:id="rId3"/>
@@ -20,13 +20,18 @@
     <p:sldId id="627" r:id="rId11"/>
     <p:sldId id="628" r:id="rId12"/>
     <p:sldId id="630" r:id="rId13"/>
-    <p:sldId id="631" r:id="rId14"/>
-    <p:sldId id="629" r:id="rId15"/>
-    <p:sldId id="624" r:id="rId16"/>
-    <p:sldId id="269" r:id="rId17"/>
-    <p:sldId id="270" r:id="rId18"/>
-    <p:sldId id="271" r:id="rId19"/>
-    <p:sldId id="272" r:id="rId20"/>
+    <p:sldId id="633" r:id="rId14"/>
+    <p:sldId id="631" r:id="rId15"/>
+    <p:sldId id="629" r:id="rId16"/>
+    <p:sldId id="634" r:id="rId17"/>
+    <p:sldId id="635" r:id="rId18"/>
+    <p:sldId id="636" r:id="rId19"/>
+    <p:sldId id="637" r:id="rId20"/>
+    <p:sldId id="624" r:id="rId21"/>
+    <p:sldId id="269" r:id="rId22"/>
+    <p:sldId id="270" r:id="rId23"/>
+    <p:sldId id="271" r:id="rId24"/>
+    <p:sldId id="272" r:id="rId25"/>
   </p:sldIdLst>
   <p:sldSz cx="12192000" cy="6858000"/>
   <p:notesSz cx="6858000" cy="9144000"/>
@@ -721,8 +726,47 @@
           <a:p>
             <a:r>
               <a:rPr lang="en-US" dirty="0"/>
-              <a:t>Spanish version</a:t>
-            </a:r>
+              <a:t>1. Present examples of different motives, opportunities, and means in influence operations:</a:t>
+            </a:r>
+          </a:p>
+          <a:p>
+            <a:r>
+              <a:rPr lang="en-US" dirty="0"/>
+              <a:t>    - Example: Political gains from spreading false allegation about rival.</a:t>
+            </a:r>
+          </a:p>
+          <a:p>
+            <a:r>
+              <a:rPr lang="en-US" dirty="0"/>
+              <a:t>    - Example: Using social media channels to disseminate false information.</a:t>
+            </a:r>
+          </a:p>
+          <a:p>
+            <a:r>
+              <a:rPr lang="en-US" dirty="0"/>
+              <a:t>2. Discuss how to assess these components in various scenarios:</a:t>
+            </a:r>
+          </a:p>
+          <a:p>
+            <a:r>
+              <a:rPr lang="en-US" dirty="0"/>
+              <a:t>    - Identify the goals and motives behind the information.</a:t>
+            </a:r>
+          </a:p>
+          <a:p>
+            <a:r>
+              <a:rPr lang="en-US" dirty="0"/>
+              <a:t>    - Evaluate the channels available for spreading misinformation.</a:t>
+            </a:r>
+          </a:p>
+          <a:p>
+            <a:r>
+              <a:rPr lang="en-US" dirty="0"/>
+              <a:t>    - Assess the risks and costs involved in the deception.</a:t>
+            </a:r>
+          </a:p>
+          <a:p>
+            <a:endParaRPr lang="en-US" dirty="0"/>
           </a:p>
         </p:txBody>
       </p:sp>
@@ -765,7 +809,7 @@
     </p:spTree>
     <p:extLst>
       <p:ext uri="{BB962C8B-B14F-4D97-AF65-F5344CB8AC3E}">
-        <p14:creationId xmlns:p14="http://schemas.microsoft.com/office/powerpoint/2010/main" val="1662411302"/>
+        <p14:creationId xmlns:p14="http://schemas.microsoft.com/office/powerpoint/2010/main" val="1975441887"/>
       </p:ext>
     </p:extLst>
   </p:cSld>
@@ -825,9 +869,167 @@
           <a:lstStyle/>
           <a:p>
             <a:r>
-              <a:rPr lang="en-US" dirty="0"/>
-              <a:t>Spanish version</a:t>
-            </a:r>
+              <a:rPr lang="en-US" b="0" dirty="0">
+                <a:solidFill>
+                  <a:srgbClr val="6A9955"/>
+                </a:solidFill>
+                <a:effectLst/>
+                <a:highlight>
+                  <a:srgbClr val="1F1F1F"/>
+                </a:highlight>
+                <a:latin typeface="Menlo" panose="020B0609030804020204" pitchFamily="49" charset="0"/>
+              </a:rPr>
+              <a:t>&gt;</a:t>
+            </a:r>
+            <a:r>
+              <a:rPr lang="en-US" b="0" dirty="0">
+                <a:solidFill>
+                  <a:srgbClr val="CCCCCC"/>
+                </a:solidFill>
+                <a:effectLst/>
+                <a:highlight>
+                  <a:srgbClr val="1F1F1F"/>
+                </a:highlight>
+                <a:latin typeface="Menlo" panose="020B0609030804020204" pitchFamily="49" charset="0"/>
+              </a:rPr>
+              <a:t> Determine if the adversary has a history of engaging in deception.</a:t>
+            </a:r>
+            <a:br>
+              <a:rPr lang="en-US" b="0" dirty="0">
+                <a:solidFill>
+                  <a:srgbClr val="CCCCCC"/>
+                </a:solidFill>
+                <a:effectLst/>
+                <a:highlight>
+                  <a:srgbClr val="1F1F1F"/>
+                </a:highlight>
+                <a:latin typeface="Menlo" panose="020B0609030804020204" pitchFamily="49" charset="0"/>
+              </a:rPr>
+            </a:br>
+            <a:endParaRPr lang="en-US" b="0" dirty="0">
+              <a:solidFill>
+                <a:srgbClr val="CCCCCC"/>
+              </a:solidFill>
+              <a:effectLst/>
+              <a:highlight>
+                <a:srgbClr val="1F1F1F"/>
+              </a:highlight>
+              <a:latin typeface="Menlo" panose="020B0609030804020204" pitchFamily="49" charset="0"/>
+            </a:endParaRPr>
+          </a:p>
+          <a:p>
+            <a:r>
+              <a:rPr lang="en-US" b="0" dirty="0">
+                <a:solidFill>
+                  <a:srgbClr val="CCCCCC"/>
+                </a:solidFill>
+                <a:effectLst/>
+                <a:highlight>
+                  <a:srgbClr val="1F1F1F"/>
+                </a:highlight>
+                <a:latin typeface="Menlo" panose="020B0609030804020204" pitchFamily="49" charset="0"/>
+              </a:rPr>
+              <a:t>Text: "Tiananmen Square protests, Hong Kong protests, the Cultural Revolution."</a:t>
+            </a:r>
+          </a:p>
+          <a:p>
+            <a:r>
+              <a:rPr lang="en-US" b="0" dirty="0">
+                <a:solidFill>
+                  <a:srgbClr val="CCCCCC"/>
+                </a:solidFill>
+                <a:effectLst/>
+                <a:highlight>
+                  <a:srgbClr val="1F1F1F"/>
+                </a:highlight>
+                <a:latin typeface="Menlo" panose="020B0609030804020204" pitchFamily="49" charset="0"/>
+              </a:rPr>
+              <a:t>Have students find other examples of past opposition practices and analyze them using the POP framework to determine potential future misinformation strategies from this actor. </a:t>
+            </a:r>
+          </a:p>
+          <a:p>
+            <a:endParaRPr lang="en-US" b="0" dirty="0">
+              <a:solidFill>
+                <a:srgbClr val="CCCCCC"/>
+              </a:solidFill>
+              <a:effectLst/>
+              <a:highlight>
+                <a:srgbClr val="1F1F1F"/>
+              </a:highlight>
+              <a:latin typeface="Menlo" panose="020B0609030804020204" pitchFamily="49" charset="0"/>
+            </a:endParaRPr>
+          </a:p>
+          <a:p>
+            <a:r>
+              <a:rPr lang="en-US" b="0" dirty="0">
+                <a:solidFill>
+                  <a:srgbClr val="CCCCCC"/>
+                </a:solidFill>
+                <a:effectLst/>
+                <a:highlight>
+                  <a:srgbClr val="1F1F1F"/>
+                </a:highlight>
+                <a:latin typeface="Menlo" panose="020B0609030804020204" pitchFamily="49" charset="0"/>
+              </a:rPr>
+              <a:t>References:</a:t>
+            </a:r>
+          </a:p>
+          <a:p>
+            <a:r>
+              <a:rPr lang="en-US" b="0" dirty="0">
+                <a:solidFill>
+                  <a:srgbClr val="CCCCCC"/>
+                </a:solidFill>
+                <a:effectLst/>
+                <a:highlight>
+                  <a:srgbClr val="1F1F1F"/>
+                </a:highlight>
+                <a:latin typeface="Menlo" panose="020B0609030804020204" pitchFamily="49" charset="0"/>
+              </a:rPr>
+              <a:t>A disinformation and propaganda campaign “that denies and downplays the severity of the incident is growing,” </a:t>
+            </a:r>
+          </a:p>
+          <a:p>
+            <a:r>
+              <a:rPr lang="en-US" b="0" dirty="0">
+                <a:solidFill>
+                  <a:srgbClr val="CCCCCC"/>
+                </a:solidFill>
+                <a:effectLst/>
+                <a:highlight>
+                  <a:srgbClr val="1F1F1F"/>
+                </a:highlight>
+                <a:latin typeface="Menlo" panose="020B0609030804020204" pitchFamily="49" charset="0"/>
+              </a:rPr>
+              <a:t>- https://</a:t>
+            </a:r>
+            <a:r>
+              <a:rPr lang="en-US" b="0" dirty="0" err="1">
+                <a:solidFill>
+                  <a:srgbClr val="CCCCCC"/>
+                </a:solidFill>
+                <a:effectLst/>
+                <a:highlight>
+                  <a:srgbClr val="1F1F1F"/>
+                </a:highlight>
+                <a:latin typeface="Menlo" panose="020B0609030804020204" pitchFamily="49" charset="0"/>
+              </a:rPr>
+              <a:t>hongkongfp.com</a:t>
+            </a:r>
+            <a:r>
+              <a:rPr lang="en-US" b="0" dirty="0">
+                <a:solidFill>
+                  <a:srgbClr val="CCCCCC"/>
+                </a:solidFill>
+                <a:effectLst/>
+                <a:highlight>
+                  <a:srgbClr val="1F1F1F"/>
+                </a:highlight>
+                <a:latin typeface="Menlo" panose="020B0609030804020204" pitchFamily="49" charset="0"/>
+              </a:rPr>
+              <a:t>/2021/06/04/taiwan-group-launches-website-to-counter-tiananmen-massacre-trolls-and-denialism/</a:t>
+            </a:r>
+            <a:endParaRPr lang="en-US" dirty="0"/>
           </a:p>
         </p:txBody>
       </p:sp>
@@ -856,7 +1058,944 @@
                 </a:solidFill>
                 <a:latin typeface="Times New Roman"/>
               </a:rPr>
+              <a:t>16</a:t>
+            </a:fld>
+            <a:endParaRPr lang="en-US" sz="1400" b="0" strike="noStrike" spc="-1">
+              <a:solidFill>
+                <a:srgbClr val="000000"/>
+              </a:solidFill>
+              <a:latin typeface="Times New Roman"/>
+            </a:endParaRPr>
+          </a:p>
+        </p:txBody>
+      </p:sp>
+    </p:spTree>
+    <p:extLst>
+      <p:ext uri="{BB962C8B-B14F-4D97-AF65-F5344CB8AC3E}">
+        <p14:creationId xmlns:p14="http://schemas.microsoft.com/office/powerpoint/2010/main" val="928112774"/>
+      </p:ext>
+    </p:extLst>
+  </p:cSld>
+  <p:clrMapOvr>
+    <a:masterClrMapping/>
+  </p:clrMapOvr>
+</p:notes>
+</file>
+
+<file path=ppt/notesSlides/notesSlide12.xml><?xml version="1.0" encoding="utf-8"?>
+<p:notes xmlns:a="http://schemas.openxmlformats.org/drawingml/2006/main" xmlns:r="http://schemas.openxmlformats.org/officeDocument/2006/relationships" xmlns:p="http://schemas.openxmlformats.org/presentationml/2006/main">
+  <p:cSld>
+    <p:spTree>
+      <p:nvGrpSpPr>
+        <p:cNvPr id="1" name=""/>
+        <p:cNvGrpSpPr/>
+        <p:nvPr/>
+      </p:nvGrpSpPr>
+      <p:grpSpPr>
+        <a:xfrm>
+          <a:off x="0" y="0"/>
+          <a:ext cx="0" cy="0"/>
+          <a:chOff x="0" y="0"/>
+          <a:chExt cx="0" cy="0"/>
+        </a:xfrm>
+      </p:grpSpPr>
+      <p:sp>
+        <p:nvSpPr>
+          <p:cNvPr id="2" name="Slide Image Placeholder 1"/>
+          <p:cNvSpPr>
+            <a:spLocks noGrp="1" noRot="1" noChangeAspect="1"/>
+          </p:cNvSpPr>
+          <p:nvPr>
+            <p:ph type="sldImg"/>
+          </p:nvPr>
+        </p:nvSpPr>
+        <p:spPr>
+          <a:xfrm>
+            <a:off x="382588" y="695325"/>
+            <a:ext cx="6092825" cy="3427413"/>
+          </a:xfrm>
+        </p:spPr>
+      </p:sp>
+      <p:sp>
+        <p:nvSpPr>
+          <p:cNvPr id="3" name="Notes Placeholder 2"/>
+          <p:cNvSpPr>
+            <a:spLocks noGrp="1"/>
+          </p:cNvSpPr>
+          <p:nvPr>
+            <p:ph type="body" idx="1"/>
+          </p:nvPr>
+        </p:nvSpPr>
+        <p:spPr/>
+        <p:txBody>
+          <a:bodyPr/>
+          <a:lstStyle/>
+          <a:p>
+            <a:r>
+              <a:rPr lang="en-US" b="0" dirty="0">
+                <a:solidFill>
+                  <a:srgbClr val="6A9955"/>
+                </a:solidFill>
+                <a:effectLst/>
+                <a:highlight>
+                  <a:srgbClr val="1F1F1F"/>
+                </a:highlight>
+                <a:latin typeface="Menlo" panose="020B0609030804020204" pitchFamily="49" charset="0"/>
+              </a:rPr>
+              <a:t>&gt;</a:t>
+            </a:r>
+            <a:r>
+              <a:rPr lang="en-US" b="0" dirty="0">
+                <a:solidFill>
+                  <a:srgbClr val="CCCCCC"/>
+                </a:solidFill>
+                <a:effectLst/>
+                <a:highlight>
+                  <a:srgbClr val="1F1F1F"/>
+                </a:highlight>
+                <a:latin typeface="Menlo" panose="020B0609030804020204" pitchFamily="49" charset="0"/>
+              </a:rPr>
+              <a:t> Evaluate the vulnerability of the source to manipulation.</a:t>
+            </a:r>
+          </a:p>
+          <a:p>
+            <a:r>
+              <a:rPr lang="en-US" b="0" dirty="0">
+                <a:solidFill>
+                  <a:srgbClr val="CCCCCC"/>
+                </a:solidFill>
+                <a:effectLst/>
+                <a:highlight>
+                  <a:srgbClr val="1F1F1F"/>
+                </a:highlight>
+                <a:latin typeface="Menlo" panose="020B0609030804020204" pitchFamily="49" charset="0"/>
+              </a:rPr>
+              <a:t>examples of sources that can be manipulated:</a:t>
+            </a:r>
+          </a:p>
+          <a:p>
+            <a:r>
+              <a:rPr lang="en-US" b="0" dirty="0">
+                <a:solidFill>
+                  <a:srgbClr val="6796E6"/>
+                </a:solidFill>
+                <a:effectLst/>
+                <a:highlight>
+                  <a:srgbClr val="1F1F1F"/>
+                </a:highlight>
+                <a:latin typeface="Menlo" panose="020B0609030804020204" pitchFamily="49" charset="0"/>
+              </a:rPr>
+              <a:t>-</a:t>
+            </a:r>
+            <a:r>
+              <a:rPr lang="en-US" b="0" dirty="0">
+                <a:solidFill>
+                  <a:srgbClr val="CCCCCC"/>
+                </a:solidFill>
+                <a:effectLst/>
+                <a:highlight>
+                  <a:srgbClr val="1F1F1F"/>
+                </a:highlight>
+                <a:latin typeface="Menlo" panose="020B0609030804020204" pitchFamily="49" charset="0"/>
+              </a:rPr>
+              <a:t> Exam</a:t>
+            </a:r>
+            <a:br>
+              <a:rPr lang="en-US" b="0" dirty="0">
+                <a:solidFill>
+                  <a:srgbClr val="CCCCCC"/>
+                </a:solidFill>
+                <a:effectLst/>
+                <a:highlight>
+                  <a:srgbClr val="1F1F1F"/>
+                </a:highlight>
+                <a:latin typeface="Menlo" panose="020B0609030804020204" pitchFamily="49" charset="0"/>
+              </a:rPr>
+            </a:br>
+            <a:r>
+              <a:rPr lang="en-US" b="1" dirty="0">
+                <a:solidFill>
+                  <a:srgbClr val="569CD6"/>
+                </a:solidFill>
+                <a:effectLst/>
+                <a:highlight>
+                  <a:srgbClr val="1F1F1F"/>
+                </a:highlight>
+                <a:latin typeface="Menlo" panose="020B0609030804020204" pitchFamily="49" charset="0"/>
+              </a:rPr>
+              <a:t>**Activity**</a:t>
+            </a:r>
+            <a:endParaRPr lang="en-US" b="0" dirty="0">
+              <a:solidFill>
+                <a:srgbClr val="CCCCCC"/>
+              </a:solidFill>
+              <a:effectLst/>
+              <a:highlight>
+                <a:srgbClr val="1F1F1F"/>
+              </a:highlight>
+              <a:latin typeface="Menlo" panose="020B0609030804020204" pitchFamily="49" charset="0"/>
+            </a:endParaRPr>
+          </a:p>
+          <a:p>
+            <a:br>
+              <a:rPr lang="en-US" b="0" dirty="0">
+                <a:solidFill>
+                  <a:srgbClr val="CCCCCC"/>
+                </a:solidFill>
+                <a:effectLst/>
+                <a:highlight>
+                  <a:srgbClr val="1F1F1F"/>
+                </a:highlight>
+                <a:latin typeface="Menlo" panose="020B0609030804020204" pitchFamily="49" charset="0"/>
+              </a:rPr>
+            </a:br>
+            <a:r>
+              <a:rPr lang="en-US" b="0" dirty="0">
+                <a:solidFill>
+                  <a:srgbClr val="6796E6"/>
+                </a:solidFill>
+                <a:effectLst/>
+                <a:highlight>
+                  <a:srgbClr val="1F1F1F"/>
+                </a:highlight>
+                <a:latin typeface="Menlo" panose="020B0609030804020204" pitchFamily="49" charset="0"/>
+              </a:rPr>
+              <a:t>1.</a:t>
+            </a:r>
+            <a:r>
+              <a:rPr lang="en-US" b="0" dirty="0">
+                <a:solidFill>
+                  <a:srgbClr val="CCCCCC"/>
+                </a:solidFill>
+                <a:effectLst/>
+                <a:highlight>
+                  <a:srgbClr val="1F1F1F"/>
+                </a:highlight>
+                <a:latin typeface="Menlo" panose="020B0609030804020204" pitchFamily="49" charset="0"/>
+              </a:rPr>
+              <a:t> Present </a:t>
+            </a:r>
+            <a:r>
+              <a:rPr lang="en-US" b="0" dirty="0" err="1">
+                <a:solidFill>
+                  <a:srgbClr val="CCCCCC"/>
+                </a:solidFill>
+                <a:effectLst/>
+                <a:highlight>
+                  <a:srgbClr val="1F1F1F"/>
+                </a:highlight>
+                <a:latin typeface="Menlo" panose="020B0609030804020204" pitchFamily="49" charset="0"/>
+              </a:rPr>
+              <a:t>ple</a:t>
+            </a:r>
+            <a:r>
+              <a:rPr lang="en-US" b="0" dirty="0">
+                <a:solidFill>
+                  <a:srgbClr val="CCCCCC"/>
+                </a:solidFill>
+                <a:effectLst/>
+                <a:highlight>
+                  <a:srgbClr val="1F1F1F"/>
+                </a:highlight>
+                <a:latin typeface="Menlo" panose="020B0609030804020204" pitchFamily="49" charset="0"/>
+              </a:rPr>
+              <a:t>: Social media influencers with questionable affiliations.</a:t>
+            </a:r>
+          </a:p>
+          <a:p>
+            <a:r>
+              <a:rPr lang="en-US" b="0" dirty="0">
+                <a:solidFill>
+                  <a:srgbClr val="6796E6"/>
+                </a:solidFill>
+                <a:effectLst/>
+                <a:highlight>
+                  <a:srgbClr val="1F1F1F"/>
+                </a:highlight>
+                <a:latin typeface="Menlo" panose="020B0609030804020204" pitchFamily="49" charset="0"/>
+              </a:rPr>
+              <a:t>-</a:t>
+            </a:r>
+            <a:r>
+              <a:rPr lang="en-US" b="0" dirty="0">
+                <a:solidFill>
+                  <a:srgbClr val="CCCCCC"/>
+                </a:solidFill>
+                <a:effectLst/>
+                <a:highlight>
+                  <a:srgbClr val="1F1F1F"/>
+                </a:highlight>
+                <a:latin typeface="Menlo" panose="020B0609030804020204" pitchFamily="49" charset="0"/>
+              </a:rPr>
+              <a:t> Example: Anonymous sources with unverifiable information.</a:t>
+            </a:r>
+          </a:p>
+          <a:p>
+            <a:r>
+              <a:rPr lang="en-US" b="0" dirty="0">
+                <a:solidFill>
+                  <a:srgbClr val="6796E6"/>
+                </a:solidFill>
+                <a:effectLst/>
+                <a:highlight>
+                  <a:srgbClr val="1F1F1F"/>
+                </a:highlight>
+                <a:latin typeface="Menlo" panose="020B0609030804020204" pitchFamily="49" charset="0"/>
+              </a:rPr>
+              <a:t>2.</a:t>
+            </a:r>
+            <a:r>
+              <a:rPr lang="en-US" b="0" dirty="0">
+                <a:solidFill>
+                  <a:srgbClr val="CCCCCC"/>
+                </a:solidFill>
+                <a:effectLst/>
+                <a:highlight>
+                  <a:srgbClr val="1F1F1F"/>
+                </a:highlight>
+                <a:latin typeface="Menlo" panose="020B0609030804020204" pitchFamily="49" charset="0"/>
+              </a:rPr>
+              <a:t> Discuss how to assess the manipulability of sources in various scenarios:</a:t>
+            </a:r>
+          </a:p>
+          <a:p>
+            <a:r>
+              <a:rPr lang="en-US" b="0" dirty="0">
+                <a:solidFill>
+                  <a:srgbClr val="6796E6"/>
+                </a:solidFill>
+                <a:effectLst/>
+                <a:highlight>
+                  <a:srgbClr val="1F1F1F"/>
+                </a:highlight>
+                <a:latin typeface="Menlo" panose="020B0609030804020204" pitchFamily="49" charset="0"/>
+              </a:rPr>
+              <a:t>-</a:t>
+            </a:r>
+            <a:r>
+              <a:rPr lang="en-US" b="0" dirty="0">
+                <a:solidFill>
+                  <a:srgbClr val="CCCCCC"/>
+                </a:solidFill>
+                <a:effectLst/>
+                <a:highlight>
+                  <a:srgbClr val="1F1F1F"/>
+                </a:highlight>
+                <a:latin typeface="Menlo" panose="020B0609030804020204" pitchFamily="49" charset="0"/>
+              </a:rPr>
+              <a:t> Determine the reliability and credibility of the source.</a:t>
+            </a:r>
+          </a:p>
+          <a:p>
+            <a:r>
+              <a:rPr lang="en-US" b="0" dirty="0">
+                <a:solidFill>
+                  <a:srgbClr val="6796E6"/>
+                </a:solidFill>
+                <a:effectLst/>
+                <a:highlight>
+                  <a:srgbClr val="1F1F1F"/>
+                </a:highlight>
+                <a:latin typeface="Menlo" panose="020B0609030804020204" pitchFamily="49" charset="0"/>
+              </a:rPr>
+              <a:t>-</a:t>
+            </a:r>
+            <a:r>
+              <a:rPr lang="en-US" b="0" dirty="0">
+                <a:solidFill>
+                  <a:srgbClr val="CCCCCC"/>
+                </a:solidFill>
+                <a:effectLst/>
+                <a:highlight>
+                  <a:srgbClr val="1F1F1F"/>
+                </a:highlight>
+                <a:latin typeface="Menlo" panose="020B0609030804020204" pitchFamily="49" charset="0"/>
+              </a:rPr>
+              <a:t> Analyze the source's access to information and track record.</a:t>
+            </a:r>
+          </a:p>
+        </p:txBody>
+      </p:sp>
+      <p:sp>
+        <p:nvSpPr>
+          <p:cNvPr id="4" name="Slide Number Placeholder 3"/>
+          <p:cNvSpPr>
+            <a:spLocks noGrp="1"/>
+          </p:cNvSpPr>
+          <p:nvPr>
+            <p:ph type="sldNum" idx="8"/>
+          </p:nvPr>
+        </p:nvSpPr>
+        <p:spPr/>
+        <p:txBody>
+          <a:bodyPr/>
+          <a:lstStyle/>
+          <a:p>
+            <a:pPr indent="0" algn="r">
+              <a:buNone/>
+            </a:pPr>
+            <a:fld id="{96D071C0-0F6A-4E5C-B3E5-B824FE66220F}" type="slidenum">
+              <a:rPr lang="en-US" sz="1400" b="0" strike="noStrike" spc="-1" smtClean="0">
+                <a:solidFill>
+                  <a:srgbClr val="000000"/>
+                </a:solidFill>
+                <a:latin typeface="Times New Roman"/>
+              </a:rPr>
               <a:t>17</a:t>
+            </a:fld>
+            <a:endParaRPr lang="en-US" sz="1400" b="0" strike="noStrike" spc="-1">
+              <a:solidFill>
+                <a:srgbClr val="000000"/>
+              </a:solidFill>
+              <a:latin typeface="Times New Roman"/>
+            </a:endParaRPr>
+          </a:p>
+        </p:txBody>
+      </p:sp>
+    </p:spTree>
+    <p:extLst>
+      <p:ext uri="{BB962C8B-B14F-4D97-AF65-F5344CB8AC3E}">
+        <p14:creationId xmlns:p14="http://schemas.microsoft.com/office/powerpoint/2010/main" val="3275751928"/>
+      </p:ext>
+    </p:extLst>
+  </p:cSld>
+  <p:clrMapOvr>
+    <a:masterClrMapping/>
+  </p:clrMapOvr>
+</p:notes>
+</file>
+
+<file path=ppt/notesSlides/notesSlide13.xml><?xml version="1.0" encoding="utf-8"?>
+<p:notes xmlns:a="http://schemas.openxmlformats.org/drawingml/2006/main" xmlns:r="http://schemas.openxmlformats.org/officeDocument/2006/relationships" xmlns:p="http://schemas.openxmlformats.org/presentationml/2006/main">
+  <p:cSld>
+    <p:spTree>
+      <p:nvGrpSpPr>
+        <p:cNvPr id="1" name=""/>
+        <p:cNvGrpSpPr/>
+        <p:nvPr/>
+      </p:nvGrpSpPr>
+      <p:grpSpPr>
+        <a:xfrm>
+          <a:off x="0" y="0"/>
+          <a:ext cx="0" cy="0"/>
+          <a:chOff x="0" y="0"/>
+          <a:chExt cx="0" cy="0"/>
+        </a:xfrm>
+      </p:grpSpPr>
+      <p:sp>
+        <p:nvSpPr>
+          <p:cNvPr id="2" name="Slide Image Placeholder 1"/>
+          <p:cNvSpPr>
+            <a:spLocks noGrp="1" noRot="1" noChangeAspect="1"/>
+          </p:cNvSpPr>
+          <p:nvPr>
+            <p:ph type="sldImg"/>
+          </p:nvPr>
+        </p:nvSpPr>
+        <p:spPr>
+          <a:xfrm>
+            <a:off x="382588" y="695325"/>
+            <a:ext cx="6092825" cy="3427413"/>
+          </a:xfrm>
+        </p:spPr>
+      </p:sp>
+      <p:sp>
+        <p:nvSpPr>
+          <p:cNvPr id="3" name="Notes Placeholder 2"/>
+          <p:cNvSpPr>
+            <a:spLocks noGrp="1"/>
+          </p:cNvSpPr>
+          <p:nvPr>
+            <p:ph type="body" idx="1"/>
+          </p:nvPr>
+        </p:nvSpPr>
+        <p:spPr/>
+        <p:txBody>
+          <a:bodyPr/>
+          <a:lstStyle/>
+          <a:p>
+            <a:r>
+              <a:rPr lang="en-US" b="0" dirty="0">
+                <a:solidFill>
+                  <a:srgbClr val="6A9955"/>
+                </a:solidFill>
+                <a:effectLst/>
+                <a:highlight>
+                  <a:srgbClr val="1F1F1F"/>
+                </a:highlight>
+                <a:latin typeface="Menlo" panose="020B0609030804020204" pitchFamily="49" charset="0"/>
+              </a:rPr>
+              <a:t>&gt;</a:t>
+            </a:r>
+            <a:r>
+              <a:rPr lang="en-US" b="0" dirty="0">
+                <a:solidFill>
+                  <a:srgbClr val="CCCCCC"/>
+                </a:solidFill>
+                <a:effectLst/>
+                <a:highlight>
+                  <a:srgbClr val="1F1F1F"/>
+                </a:highlight>
+                <a:latin typeface="Menlo" panose="020B0609030804020204" pitchFamily="49" charset="0"/>
+              </a:rPr>
+              <a:t> Assess the accuracy and consistency of the evidence.</a:t>
+            </a:r>
+          </a:p>
+          <a:p>
+            <a:br>
+              <a:rPr lang="en-US" b="0" dirty="0">
+                <a:solidFill>
+                  <a:srgbClr val="CCCCCC"/>
+                </a:solidFill>
+                <a:effectLst/>
+                <a:highlight>
+                  <a:srgbClr val="1F1F1F"/>
+                </a:highlight>
+                <a:latin typeface="Menlo" panose="020B0609030804020204" pitchFamily="49" charset="0"/>
+              </a:rPr>
+            </a:br>
+            <a:r>
+              <a:rPr lang="en-US" b="1" dirty="0">
+                <a:solidFill>
+                  <a:srgbClr val="569CD6"/>
+                </a:solidFill>
+                <a:effectLst/>
+                <a:highlight>
+                  <a:srgbClr val="1F1F1F"/>
+                </a:highlight>
+                <a:latin typeface="Menlo" panose="020B0609030804020204" pitchFamily="49" charset="0"/>
+              </a:rPr>
+              <a:t>**Activity**</a:t>
+            </a:r>
+            <a:endParaRPr lang="en-US" b="0" dirty="0">
+              <a:solidFill>
+                <a:srgbClr val="CCCCCC"/>
+              </a:solidFill>
+              <a:effectLst/>
+              <a:highlight>
+                <a:srgbClr val="1F1F1F"/>
+              </a:highlight>
+              <a:latin typeface="Menlo" panose="020B0609030804020204" pitchFamily="49" charset="0"/>
+            </a:endParaRPr>
+          </a:p>
+          <a:p>
+            <a:br>
+              <a:rPr lang="en-US" b="0" dirty="0">
+                <a:solidFill>
+                  <a:srgbClr val="CCCCCC"/>
+                </a:solidFill>
+                <a:effectLst/>
+                <a:highlight>
+                  <a:srgbClr val="1F1F1F"/>
+                </a:highlight>
+                <a:latin typeface="Menlo" panose="020B0609030804020204" pitchFamily="49" charset="0"/>
+              </a:rPr>
+            </a:br>
+            <a:r>
+              <a:rPr lang="en-US" b="0" dirty="0">
+                <a:solidFill>
+                  <a:srgbClr val="6796E6"/>
+                </a:solidFill>
+                <a:effectLst/>
+                <a:highlight>
+                  <a:srgbClr val="1F1F1F"/>
+                </a:highlight>
+                <a:latin typeface="Menlo" panose="020B0609030804020204" pitchFamily="49" charset="0"/>
+              </a:rPr>
+              <a:t>1.</a:t>
+            </a:r>
+            <a:r>
+              <a:rPr lang="en-US" b="0" dirty="0">
+                <a:solidFill>
+                  <a:srgbClr val="CCCCCC"/>
+                </a:solidFill>
+                <a:effectLst/>
+                <a:highlight>
+                  <a:srgbClr val="1F1F1F"/>
+                </a:highlight>
+                <a:latin typeface="Menlo" panose="020B0609030804020204" pitchFamily="49" charset="0"/>
+              </a:rPr>
+              <a:t> Present examples of evaluating evidence in influence operations:</a:t>
+            </a:r>
+          </a:p>
+          <a:p>
+            <a:r>
+              <a:rPr lang="en-US" b="0" dirty="0">
+                <a:solidFill>
+                  <a:srgbClr val="6796E6"/>
+                </a:solidFill>
+                <a:effectLst/>
+                <a:highlight>
+                  <a:srgbClr val="1F1F1F"/>
+                </a:highlight>
+                <a:latin typeface="Menlo" panose="020B0609030804020204" pitchFamily="49" charset="0"/>
+              </a:rPr>
+              <a:t>-</a:t>
+            </a:r>
+            <a:r>
+              <a:rPr lang="en-US" b="0" dirty="0">
+                <a:solidFill>
+                  <a:srgbClr val="CCCCCC"/>
+                </a:solidFill>
+                <a:effectLst/>
+                <a:highlight>
+                  <a:srgbClr val="1F1F1F"/>
+                </a:highlight>
+                <a:latin typeface="Menlo" panose="020B0609030804020204" pitchFamily="49" charset="0"/>
+              </a:rPr>
+              <a:t> Example: Cross-referencing information from multiple sources.</a:t>
+            </a:r>
+          </a:p>
+          <a:p>
+            <a:r>
+              <a:rPr lang="en-US" b="0" dirty="0">
+                <a:solidFill>
+                  <a:srgbClr val="6796E6"/>
+                </a:solidFill>
+                <a:effectLst/>
+                <a:highlight>
+                  <a:srgbClr val="1F1F1F"/>
+                </a:highlight>
+                <a:latin typeface="Menlo" panose="020B0609030804020204" pitchFamily="49" charset="0"/>
+              </a:rPr>
+              <a:t>-</a:t>
+            </a:r>
+            <a:r>
+              <a:rPr lang="en-US" b="0" dirty="0">
+                <a:solidFill>
+                  <a:srgbClr val="CCCCCC"/>
+                </a:solidFill>
+                <a:effectLst/>
+                <a:highlight>
+                  <a:srgbClr val="1F1F1F"/>
+                </a:highlight>
+                <a:latin typeface="Menlo" panose="020B0609030804020204" pitchFamily="49" charset="0"/>
+              </a:rPr>
+              <a:t> Example: Checking for consistency in reports from different channels.</a:t>
+            </a:r>
+          </a:p>
+          <a:p>
+            <a:r>
+              <a:rPr lang="en-US" b="0" dirty="0">
+                <a:solidFill>
+                  <a:srgbClr val="6796E6"/>
+                </a:solidFill>
+                <a:effectLst/>
+                <a:highlight>
+                  <a:srgbClr val="1F1F1F"/>
+                </a:highlight>
+                <a:latin typeface="Menlo" panose="020B0609030804020204" pitchFamily="49" charset="0"/>
+              </a:rPr>
+              <a:t>2.</a:t>
+            </a:r>
+            <a:r>
+              <a:rPr lang="en-US" b="0" dirty="0">
+                <a:solidFill>
+                  <a:srgbClr val="CCCCCC"/>
+                </a:solidFill>
+                <a:effectLst/>
+                <a:highlight>
+                  <a:srgbClr val="1F1F1F"/>
+                </a:highlight>
+                <a:latin typeface="Menlo" panose="020B0609030804020204" pitchFamily="49" charset="0"/>
+              </a:rPr>
+              <a:t> Discuss how to evaluate evidence in various scenarios:</a:t>
+            </a:r>
+          </a:p>
+          <a:p>
+            <a:r>
+              <a:rPr lang="en-US" b="0" dirty="0">
+                <a:solidFill>
+                  <a:srgbClr val="6796E6"/>
+                </a:solidFill>
+                <a:effectLst/>
+                <a:highlight>
+                  <a:srgbClr val="1F1F1F"/>
+                </a:highlight>
+                <a:latin typeface="Menlo" panose="020B0609030804020204" pitchFamily="49" charset="0"/>
+              </a:rPr>
+              <a:t>-</a:t>
+            </a:r>
+            <a:r>
+              <a:rPr lang="en-US" b="0" dirty="0">
+                <a:solidFill>
+                  <a:srgbClr val="CCCCCC"/>
+                </a:solidFill>
+                <a:effectLst/>
+                <a:highlight>
+                  <a:srgbClr val="1F1F1F"/>
+                </a:highlight>
+                <a:latin typeface="Menlo" panose="020B0609030804020204" pitchFamily="49" charset="0"/>
+              </a:rPr>
+              <a:t> Verify the accuracy of the information provided.</a:t>
+            </a:r>
+          </a:p>
+          <a:p>
+            <a:r>
+              <a:rPr lang="en-US" b="0" dirty="0">
+                <a:solidFill>
+                  <a:srgbClr val="6796E6"/>
+                </a:solidFill>
+                <a:effectLst/>
+                <a:highlight>
+                  <a:srgbClr val="1F1F1F"/>
+                </a:highlight>
+                <a:latin typeface="Menlo" panose="020B0609030804020204" pitchFamily="49" charset="0"/>
+              </a:rPr>
+              <a:t>-</a:t>
+            </a:r>
+            <a:r>
+              <a:rPr lang="en-US" b="0" dirty="0">
+                <a:solidFill>
+                  <a:srgbClr val="CCCCCC"/>
+                </a:solidFill>
+                <a:effectLst/>
+                <a:highlight>
+                  <a:srgbClr val="1F1F1F"/>
+                </a:highlight>
+                <a:latin typeface="Menlo" panose="020B0609030804020204" pitchFamily="49" charset="0"/>
+              </a:rPr>
+              <a:t> Identify inconsistencies and corroborate evidence from multiple sources.</a:t>
+            </a:r>
+          </a:p>
+        </p:txBody>
+      </p:sp>
+      <p:sp>
+        <p:nvSpPr>
+          <p:cNvPr id="4" name="Slide Number Placeholder 3"/>
+          <p:cNvSpPr>
+            <a:spLocks noGrp="1"/>
+          </p:cNvSpPr>
+          <p:nvPr>
+            <p:ph type="sldNum" idx="8"/>
+          </p:nvPr>
+        </p:nvSpPr>
+        <p:spPr/>
+        <p:txBody>
+          <a:bodyPr/>
+          <a:lstStyle/>
+          <a:p>
+            <a:pPr indent="0" algn="r">
+              <a:buNone/>
+            </a:pPr>
+            <a:fld id="{96D071C0-0F6A-4E5C-B3E5-B824FE66220F}" type="slidenum">
+              <a:rPr lang="en-US" sz="1400" b="0" strike="noStrike" spc="-1" smtClean="0">
+                <a:solidFill>
+                  <a:srgbClr val="000000"/>
+                </a:solidFill>
+                <a:latin typeface="Times New Roman"/>
+              </a:rPr>
+              <a:t>18</a:t>
+            </a:fld>
+            <a:endParaRPr lang="en-US" sz="1400" b="0" strike="noStrike" spc="-1">
+              <a:solidFill>
+                <a:srgbClr val="000000"/>
+              </a:solidFill>
+              <a:latin typeface="Times New Roman"/>
+            </a:endParaRPr>
+          </a:p>
+        </p:txBody>
+      </p:sp>
+    </p:spTree>
+    <p:extLst>
+      <p:ext uri="{BB962C8B-B14F-4D97-AF65-F5344CB8AC3E}">
+        <p14:creationId xmlns:p14="http://schemas.microsoft.com/office/powerpoint/2010/main" val="3393864339"/>
+      </p:ext>
+    </p:extLst>
+  </p:cSld>
+  <p:clrMapOvr>
+    <a:masterClrMapping/>
+  </p:clrMapOvr>
+</p:notes>
+</file>
+
+<file path=ppt/notesSlides/notesSlide14.xml><?xml version="1.0" encoding="utf-8"?>
+<p:notes xmlns:a="http://schemas.openxmlformats.org/drawingml/2006/main" xmlns:r="http://schemas.openxmlformats.org/officeDocument/2006/relationships" xmlns:p="http://schemas.openxmlformats.org/presentationml/2006/main">
+  <p:cSld>
+    <p:spTree>
+      <p:nvGrpSpPr>
+        <p:cNvPr id="1" name=""/>
+        <p:cNvGrpSpPr/>
+        <p:nvPr/>
+      </p:nvGrpSpPr>
+      <p:grpSpPr>
+        <a:xfrm>
+          <a:off x="0" y="0"/>
+          <a:ext cx="0" cy="0"/>
+          <a:chOff x="0" y="0"/>
+          <a:chExt cx="0" cy="0"/>
+        </a:xfrm>
+      </p:grpSpPr>
+      <p:sp>
+        <p:nvSpPr>
+          <p:cNvPr id="2" name="Slide Image Placeholder 1"/>
+          <p:cNvSpPr>
+            <a:spLocks noGrp="1" noRot="1" noChangeAspect="1"/>
+          </p:cNvSpPr>
+          <p:nvPr>
+            <p:ph type="sldImg"/>
+          </p:nvPr>
+        </p:nvSpPr>
+        <p:spPr>
+          <a:xfrm>
+            <a:off x="382588" y="695325"/>
+            <a:ext cx="6092825" cy="3427413"/>
+          </a:xfrm>
+        </p:spPr>
+      </p:sp>
+      <p:sp>
+        <p:nvSpPr>
+          <p:cNvPr id="3" name="Notes Placeholder 2"/>
+          <p:cNvSpPr>
+            <a:spLocks noGrp="1"/>
+          </p:cNvSpPr>
+          <p:nvPr>
+            <p:ph type="body" idx="1"/>
+          </p:nvPr>
+        </p:nvSpPr>
+        <p:spPr/>
+        <p:txBody>
+          <a:bodyPr/>
+          <a:lstStyle/>
+          <a:p>
+            <a:r>
+              <a:rPr lang="en-US" dirty="0"/>
+              <a:t>Spanish version</a:t>
+            </a:r>
+          </a:p>
+        </p:txBody>
+      </p:sp>
+      <p:sp>
+        <p:nvSpPr>
+          <p:cNvPr id="4" name="Slide Number Placeholder 3"/>
+          <p:cNvSpPr>
+            <a:spLocks noGrp="1"/>
+          </p:cNvSpPr>
+          <p:nvPr>
+            <p:ph type="sldNum" idx="8"/>
+          </p:nvPr>
+        </p:nvSpPr>
+        <p:spPr/>
+        <p:txBody>
+          <a:bodyPr/>
+          <a:lstStyle/>
+          <a:p>
+            <a:pPr indent="0" algn="r">
+              <a:buNone/>
+            </a:pPr>
+            <a:fld id="{96D071C0-0F6A-4E5C-B3E5-B824FE66220F}" type="slidenum">
+              <a:rPr lang="en-US" sz="1400" b="0" strike="noStrike" spc="-1" smtClean="0">
+                <a:solidFill>
+                  <a:srgbClr val="000000"/>
+                </a:solidFill>
+                <a:latin typeface="Times New Roman"/>
+              </a:rPr>
+              <a:t>20</a:t>
+            </a:fld>
+            <a:endParaRPr lang="en-US" sz="1400" b="0" strike="noStrike" spc="-1">
+              <a:solidFill>
+                <a:srgbClr val="000000"/>
+              </a:solidFill>
+              <a:latin typeface="Times New Roman"/>
+            </a:endParaRPr>
+          </a:p>
+        </p:txBody>
+      </p:sp>
+    </p:spTree>
+    <p:extLst>
+      <p:ext uri="{BB962C8B-B14F-4D97-AF65-F5344CB8AC3E}">
+        <p14:creationId xmlns:p14="http://schemas.microsoft.com/office/powerpoint/2010/main" val="1662411302"/>
+      </p:ext>
+    </p:extLst>
+  </p:cSld>
+  <p:clrMapOvr>
+    <a:masterClrMapping/>
+  </p:clrMapOvr>
+</p:notes>
+</file>
+
+<file path=ppt/notesSlides/notesSlide15.xml><?xml version="1.0" encoding="utf-8"?>
+<p:notes xmlns:a="http://schemas.openxmlformats.org/drawingml/2006/main" xmlns:r="http://schemas.openxmlformats.org/officeDocument/2006/relationships" xmlns:p="http://schemas.openxmlformats.org/presentationml/2006/main">
+  <p:cSld>
+    <p:spTree>
+      <p:nvGrpSpPr>
+        <p:cNvPr id="1" name=""/>
+        <p:cNvGrpSpPr/>
+        <p:nvPr/>
+      </p:nvGrpSpPr>
+      <p:grpSpPr>
+        <a:xfrm>
+          <a:off x="0" y="0"/>
+          <a:ext cx="0" cy="0"/>
+          <a:chOff x="0" y="0"/>
+          <a:chExt cx="0" cy="0"/>
+        </a:xfrm>
+      </p:grpSpPr>
+      <p:sp>
+        <p:nvSpPr>
+          <p:cNvPr id="2" name="Slide Image Placeholder 1"/>
+          <p:cNvSpPr>
+            <a:spLocks noGrp="1" noRot="1" noChangeAspect="1"/>
+          </p:cNvSpPr>
+          <p:nvPr>
+            <p:ph type="sldImg"/>
+          </p:nvPr>
+        </p:nvSpPr>
+        <p:spPr>
+          <a:xfrm>
+            <a:off x="382588" y="695325"/>
+            <a:ext cx="6092825" cy="3427413"/>
+          </a:xfrm>
+        </p:spPr>
+      </p:sp>
+      <p:sp>
+        <p:nvSpPr>
+          <p:cNvPr id="3" name="Notes Placeholder 2"/>
+          <p:cNvSpPr>
+            <a:spLocks noGrp="1"/>
+          </p:cNvSpPr>
+          <p:nvPr>
+            <p:ph type="body" idx="1"/>
+          </p:nvPr>
+        </p:nvSpPr>
+        <p:spPr/>
+        <p:txBody>
+          <a:bodyPr/>
+          <a:lstStyle/>
+          <a:p>
+            <a:r>
+              <a:rPr lang="en-US" dirty="0"/>
+              <a:t>Spanish version</a:t>
+            </a:r>
+          </a:p>
+        </p:txBody>
+      </p:sp>
+      <p:sp>
+        <p:nvSpPr>
+          <p:cNvPr id="4" name="Slide Number Placeholder 3"/>
+          <p:cNvSpPr>
+            <a:spLocks noGrp="1"/>
+          </p:cNvSpPr>
+          <p:nvPr>
+            <p:ph type="sldNum" idx="8"/>
+          </p:nvPr>
+        </p:nvSpPr>
+        <p:spPr/>
+        <p:txBody>
+          <a:bodyPr/>
+          <a:lstStyle/>
+          <a:p>
+            <a:pPr indent="0" algn="r">
+              <a:buNone/>
+            </a:pPr>
+            <a:fld id="{96D071C0-0F6A-4E5C-B3E5-B824FE66220F}" type="slidenum">
+              <a:rPr lang="en-US" sz="1400" b="0" strike="noStrike" spc="-1" smtClean="0">
+                <a:solidFill>
+                  <a:srgbClr val="000000"/>
+                </a:solidFill>
+                <a:latin typeface="Times New Roman"/>
+              </a:rPr>
+              <a:t>22</a:t>
             </a:fld>
             <a:endParaRPr lang="en-US" sz="1400" b="0" strike="noStrike" spc="-1">
               <a:solidFill>
@@ -1191,25 +2330,17 @@
             </a:r>
             <a:r>
               <a:rPr lang="en-US" dirty="0"/>
-              <a:t>, R. H., &amp; Heuer, R. J. (2021). </a:t>
-            </a:r>
-            <a:r>
-              <a:rPr lang="en-US"/>
-              <a:t>*Structured Analytic Techniques for Intelligence Analysis*.</a:t>
+              <a:t>, R. H., &amp; Heuer, R. J. (2021). *Structured Analytic Techniques for Intelligence Analysis*.</a:t>
             </a:r>
             <a:br>
-              <a:rPr lang="en-US"/>
+              <a:rPr lang="en-US" dirty="0"/>
             </a:br>
             <a:br>
-              <a:rPr lang="en-US"/>
+              <a:rPr lang="en-US" dirty="0"/>
             </a:br>
             <a:r>
-              <a:rPr lang="en-US"/>
-              <a:t>1</a:t>
-            </a:r>
-            <a:r>
-              <a:rPr lang="en-US" dirty="0"/>
-              <a:t>. Present examples of different motives, opportunities, and means in influence operations:</a:t>
+              <a:rPr lang="en-US" dirty="0"/>
+              <a:t>1. Present examples of different motives, opportunities, and means in influence operations:</a:t>
             </a:r>
           </a:p>
           <a:p>
@@ -2701,7 +3832,7 @@
                 </a:solidFill>
                 <a:latin typeface="Times New Roman"/>
               </a:rPr>
-              <a:t>13</a:t>
+              <a:t>14</a:t>
             </a:fld>
             <a:endParaRPr lang="en-US" sz="1400" b="0" strike="noStrike" spc="-1">
               <a:solidFill>
@@ -7204,7 +8335,22 @@
           <a:bodyPr/>
           <a:lstStyle/>
           <a:p>
-            <a:endParaRPr lang="en-US"/>
+            <a:r>
+              <a:rPr lang="en-US" dirty="0"/>
+              <a:t>When to use it: Use when analyzing the validity and reliability of evidence presented.</a:t>
+            </a:r>
+          </a:p>
+          <a:p>
+            <a:r>
+              <a:rPr lang="en-US" dirty="0"/>
+              <a:t>Where to use it: Applicable in any analytical context requiring evidence validation.</a:t>
+            </a:r>
+          </a:p>
+          <a:p>
+            <a:r>
+              <a:rPr lang="en-US" dirty="0"/>
+              <a:t>Why to use it: Ensures the integrity and accuracy of the conclusions drawn from the evidence.</a:t>
+            </a:r>
           </a:p>
         </p:txBody>
       </p:sp>
@@ -7287,7 +8433,72 @@
           <a:bodyPr/>
           <a:lstStyle/>
           <a:p>
-            <a:endParaRPr lang="en-US" dirty="0"/>
+            <a:r>
+              <a:rPr lang="en-US" dirty="0"/>
+              <a:t>MOM Framework</a:t>
+            </a:r>
+          </a:p>
+          <a:p>
+            <a:pPr lvl="1"/>
+            <a:r>
+              <a:rPr lang="en-US" dirty="0">
+                <a:highlight>
+                  <a:srgbClr val="000000"/>
+                </a:highlight>
+              </a:rPr>
+              <a:t>Motive, Opportunity, and Means</a:t>
+            </a:r>
+          </a:p>
+          <a:p>
+            <a:r>
+              <a:rPr lang="en-US" dirty="0"/>
+              <a:t>POP Framework</a:t>
+            </a:r>
+          </a:p>
+          <a:p>
+            <a:pPr lvl="1"/>
+            <a:r>
+              <a:rPr lang="en-US" dirty="0">
+                <a:highlight>
+                  <a:srgbClr val="000000"/>
+                </a:highlight>
+              </a:rPr>
+              <a:t>Past Opposition Practices</a:t>
+            </a:r>
+          </a:p>
+          <a:p>
+            <a:r>
+              <a:rPr lang="en-US" dirty="0"/>
+              <a:t>MOSES Framework </a:t>
+            </a:r>
+          </a:p>
+          <a:p>
+            <a:pPr lvl="1"/>
+            <a:r>
+              <a:rPr lang="en-US" dirty="0">
+                <a:highlight>
+                  <a:srgbClr val="000000"/>
+                </a:highlight>
+              </a:rPr>
+              <a:t>Manipulability of Sources</a:t>
+            </a:r>
+          </a:p>
+          <a:p>
+            <a:r>
+              <a:rPr lang="en-US" dirty="0"/>
+              <a:t>EVE Framework</a:t>
+            </a:r>
+          </a:p>
+          <a:p>
+            <a:pPr lvl="1"/>
+            <a:r>
+              <a:rPr lang="en-US" dirty="0">
+                <a:highlight>
+                  <a:srgbClr val="000000"/>
+                </a:highlight>
+              </a:rPr>
+              <a:t>Evaluation of Evidence</a:t>
+            </a:r>
           </a:p>
         </p:txBody>
       </p:sp>
@@ -7372,18 +8583,61 @@
           <a:p>
             <a:r>
               <a:rPr lang="en-US" dirty="0"/>
-              <a:t>What framework would you use for:</a:t>
-            </a:r>
-          </a:p>
-          <a:p>
-            <a:endParaRPr lang="en-US" dirty="0"/>
+              <a:t>MOM Framework</a:t>
+            </a:r>
+          </a:p>
+          <a:p>
+            <a:pPr lvl="1"/>
+            <a:r>
+              <a:rPr lang="en-US" dirty="0"/>
+              <a:t>Motive, Opportunity, and Means</a:t>
+            </a:r>
+          </a:p>
+          <a:p>
+            <a:r>
+              <a:rPr lang="en-US" dirty="0"/>
+              <a:t>POP Framework</a:t>
+            </a:r>
+          </a:p>
+          <a:p>
+            <a:pPr lvl="1"/>
+            <a:r>
+              <a:rPr lang="en-US" dirty="0"/>
+              <a:t>Past Opposition Practices</a:t>
+            </a:r>
+          </a:p>
+          <a:p>
+            <a:r>
+              <a:rPr lang="en-US" dirty="0"/>
+              <a:t>MOSES Framework </a:t>
+            </a:r>
+          </a:p>
+          <a:p>
+            <a:pPr lvl="1"/>
+            <a:r>
+              <a:rPr lang="en-US" dirty="0"/>
+              <a:t>Manipulability of Sources</a:t>
+            </a:r>
+          </a:p>
+          <a:p>
+            <a:r>
+              <a:rPr lang="en-US" dirty="0"/>
+              <a:t>EVE Framework</a:t>
+            </a:r>
+          </a:p>
+          <a:p>
+            <a:pPr lvl="1"/>
+            <a:r>
+              <a:rPr lang="en-US" dirty="0"/>
+              <a:t>Evaluation of Evidence</a:t>
+            </a:r>
           </a:p>
         </p:txBody>
       </p:sp>
     </p:spTree>
     <p:extLst>
       <p:ext uri="{BB962C8B-B14F-4D97-AF65-F5344CB8AC3E}">
-        <p14:creationId xmlns:p14="http://schemas.microsoft.com/office/powerpoint/2010/main" val="2296125235"/>
+        <p14:creationId xmlns:p14="http://schemas.microsoft.com/office/powerpoint/2010/main" val="4228316062"/>
       </p:ext>
     </p:extLst>
   </p:cSld>
@@ -7415,7 +8669,7 @@
           <p:cNvPr id="2" name="Title 1">
             <a:extLst>
               <a:ext uri="{FF2B5EF4-FFF2-40B4-BE49-F238E27FC236}">
-                <a16:creationId xmlns:a16="http://schemas.microsoft.com/office/drawing/2014/main" id="{D1C68DAF-912D-4872-669E-01FDE476A5E6}"/>
+                <a16:creationId xmlns:a16="http://schemas.microsoft.com/office/drawing/2014/main" id="{6B937A14-F099-A9E5-AE60-86131F123055}"/>
               </a:ext>
             </a:extLst>
           </p:cNvPr>
@@ -7433,7 +8687,7 @@
           <a:p>
             <a:r>
               <a:rPr lang="en-US" dirty="0"/>
-              <a:t>Practical Application of Deception Detection Framework</a:t>
+              <a:t>Deception Detection Check On Learning</a:t>
             </a:r>
           </a:p>
         </p:txBody>
@@ -7443,7 +8697,7 @@
           <p:cNvPr id="3" name="Content Placeholder 2">
             <a:extLst>
               <a:ext uri="{FF2B5EF4-FFF2-40B4-BE49-F238E27FC236}">
-                <a16:creationId xmlns:a16="http://schemas.microsoft.com/office/drawing/2014/main" id="{ACBE4B2E-A404-1205-5D03-74E17CF90DDA}"/>
+                <a16:creationId xmlns:a16="http://schemas.microsoft.com/office/drawing/2014/main" id="{C2AE1516-AD30-1968-D700-CEA2179263C0}"/>
               </a:ext>
             </a:extLst>
           </p:cNvPr>
@@ -7459,14 +8713,34 @@
           <a:bodyPr/>
           <a:lstStyle/>
           <a:p>
-            <a:endParaRPr lang="en-US"/>
+            <a:r>
+              <a:rPr lang="en-US" dirty="0"/>
+              <a:t>What framework would you use for:</a:t>
+            </a:r>
+          </a:p>
+          <a:p>
+            <a:pPr lvl="1"/>
+            <a:r>
+              <a:rPr lang="en-US" dirty="0"/>
+              <a:t>Evaluating the data you have so far</a:t>
+            </a:r>
+          </a:p>
+          <a:p>
+            <a:pPr lvl="1"/>
+            <a:r>
+              <a:rPr lang="en-US" dirty="0"/>
+              <a:t>Evaluating the source of data</a:t>
+            </a:r>
+          </a:p>
+          <a:p>
+            <a:endParaRPr lang="en-US" dirty="0"/>
           </a:p>
         </p:txBody>
       </p:sp>
     </p:spTree>
     <p:extLst>
       <p:ext uri="{BB962C8B-B14F-4D97-AF65-F5344CB8AC3E}">
-        <p14:creationId xmlns:p14="http://schemas.microsoft.com/office/powerpoint/2010/main" val="1581320203"/>
+        <p14:creationId xmlns:p14="http://schemas.microsoft.com/office/powerpoint/2010/main" val="2296125235"/>
       </p:ext>
     </p:extLst>
   </p:cSld>
@@ -7498,6 +8772,95 @@
           <p:cNvPr id="2" name="Title 1">
             <a:extLst>
               <a:ext uri="{FF2B5EF4-FFF2-40B4-BE49-F238E27FC236}">
+                <a16:creationId xmlns:a16="http://schemas.microsoft.com/office/drawing/2014/main" id="{D1C68DAF-912D-4872-669E-01FDE476A5E6}"/>
+              </a:ext>
+            </a:extLst>
+          </p:cNvPr>
+          <p:cNvSpPr>
+            <a:spLocks noGrp="1"/>
+          </p:cNvSpPr>
+          <p:nvPr>
+            <p:ph type="title"/>
+          </p:nvPr>
+        </p:nvSpPr>
+        <p:spPr/>
+        <p:txBody>
+          <a:bodyPr/>
+          <a:lstStyle/>
+          <a:p>
+            <a:r>
+              <a:rPr lang="en-US" dirty="0"/>
+              <a:t>Practical Application of Deception Detection Framework</a:t>
+            </a:r>
+          </a:p>
+        </p:txBody>
+      </p:sp>
+      <p:sp>
+        <p:nvSpPr>
+          <p:cNvPr id="3" name="Content Placeholder 2">
+            <a:extLst>
+              <a:ext uri="{FF2B5EF4-FFF2-40B4-BE49-F238E27FC236}">
+                <a16:creationId xmlns:a16="http://schemas.microsoft.com/office/drawing/2014/main" id="{ACBE4B2E-A404-1205-5D03-74E17CF90DDA}"/>
+              </a:ext>
+            </a:extLst>
+          </p:cNvPr>
+          <p:cNvSpPr>
+            <a:spLocks noGrp="1"/>
+          </p:cNvSpPr>
+          <p:nvPr>
+            <p:ph idx="1"/>
+          </p:nvPr>
+        </p:nvSpPr>
+        <p:spPr/>
+        <p:txBody>
+          <a:bodyPr/>
+          <a:lstStyle/>
+          <a:p>
+            <a:r>
+              <a:rPr lang="en-US" dirty="0"/>
+              <a:t>See Handout 1</a:t>
+            </a:r>
+          </a:p>
+          <a:p>
+            <a:endParaRPr lang="en-US" dirty="0"/>
+          </a:p>
+        </p:txBody>
+      </p:sp>
+    </p:spTree>
+    <p:extLst>
+      <p:ext uri="{BB962C8B-B14F-4D97-AF65-F5344CB8AC3E}">
+        <p14:creationId xmlns:p14="http://schemas.microsoft.com/office/powerpoint/2010/main" val="1581320203"/>
+      </p:ext>
+    </p:extLst>
+  </p:cSld>
+  <p:clrMapOvr>
+    <a:masterClrMapping/>
+  </p:clrMapOvr>
+</p:sld>
+</file>
+
+<file path=ppt/slides/slide15.xml><?xml version="1.0" encoding="utf-8"?>
+<p:sld xmlns:a="http://schemas.openxmlformats.org/drawingml/2006/main" xmlns:r="http://schemas.openxmlformats.org/officeDocument/2006/relationships" xmlns:p="http://schemas.openxmlformats.org/presentationml/2006/main">
+  <p:cSld>
+    <p:spTree>
+      <p:nvGrpSpPr>
+        <p:cNvPr id="1" name=""/>
+        <p:cNvGrpSpPr/>
+        <p:nvPr/>
+      </p:nvGrpSpPr>
+      <p:grpSpPr>
+        <a:xfrm>
+          <a:off x="0" y="0"/>
+          <a:ext cx="0" cy="0"/>
+          <a:chOff x="0" y="0"/>
+          <a:chExt cx="0" cy="0"/>
+        </a:xfrm>
+      </p:grpSpPr>
+      <p:sp>
+        <p:nvSpPr>
+          <p:cNvPr id="2" name="Title 1">
+            <a:extLst>
+              <a:ext uri="{FF2B5EF4-FFF2-40B4-BE49-F238E27FC236}">
                 <a16:creationId xmlns:a16="http://schemas.microsoft.com/office/drawing/2014/main" id="{0E7CCAEB-D84E-456D-3B6B-2E9573C73F98}"/>
               </a:ext>
             </a:extLst>
@@ -7516,7 +8879,7 @@
           <a:p>
             <a:r>
               <a:rPr lang="en-US" dirty="0"/>
-              <a:t>Apply</a:t>
+              <a:t>Motive, Opportunity, and Means (MOM)</a:t>
             </a:r>
           </a:p>
         </p:txBody>
@@ -7539,10 +8902,407 @@
         </p:nvSpPr>
         <p:spPr/>
         <p:txBody>
-          <a:bodyPr/>
-          <a:lstStyle/>
-          <a:p>
-            <a:endParaRPr lang="en-US"/>
+          <a:bodyPr>
+            <a:normAutofit/>
+          </a:bodyPr>
+          <a:lstStyle/>
+          <a:p>
+            <a:r>
+              <a:rPr lang="en-US" dirty="0"/>
+              <a:t>Present examples of different motives, opportunities, and means in influence operations</a:t>
+            </a:r>
+          </a:p>
+          <a:p>
+            <a:r>
+              <a:rPr lang="en-US" dirty="0"/>
+              <a:t>Identify the goals and motives behind the information.</a:t>
+            </a:r>
+          </a:p>
+          <a:p>
+            <a:r>
+              <a:rPr lang="en-US" dirty="0"/>
+              <a:t>Evaluate the channels available for spreading misinformation.</a:t>
+            </a:r>
+          </a:p>
+          <a:p>
+            <a:r>
+              <a:rPr lang="en-US" dirty="0"/>
+              <a:t>Assess the risks and costs involved in the possible deception</a:t>
+            </a:r>
+          </a:p>
+        </p:txBody>
+      </p:sp>
+    </p:spTree>
+    <p:extLst>
+      <p:ext uri="{BB962C8B-B14F-4D97-AF65-F5344CB8AC3E}">
+        <p14:creationId xmlns:p14="http://schemas.microsoft.com/office/powerpoint/2010/main" val="3506010842"/>
+      </p:ext>
+    </p:extLst>
+  </p:cSld>
+  <p:clrMapOvr>
+    <a:masterClrMapping/>
+  </p:clrMapOvr>
+</p:sld>
+</file>
+
+<file path=ppt/slides/slide16.xml><?xml version="1.0" encoding="utf-8"?>
+<p:sld xmlns:a="http://schemas.openxmlformats.org/drawingml/2006/main" xmlns:r="http://schemas.openxmlformats.org/officeDocument/2006/relationships" xmlns:p="http://schemas.openxmlformats.org/presentationml/2006/main">
+  <p:cSld>
+    <p:spTree>
+      <p:nvGrpSpPr>
+        <p:cNvPr id="1" name=""/>
+        <p:cNvGrpSpPr/>
+        <p:nvPr/>
+      </p:nvGrpSpPr>
+      <p:grpSpPr>
+        <a:xfrm>
+          <a:off x="0" y="0"/>
+          <a:ext cx="0" cy="0"/>
+          <a:chOff x="0" y="0"/>
+          <a:chExt cx="0" cy="0"/>
+        </a:xfrm>
+      </p:grpSpPr>
+      <p:sp>
+        <p:nvSpPr>
+          <p:cNvPr id="2" name="Title 1">
+            <a:extLst>
+              <a:ext uri="{FF2B5EF4-FFF2-40B4-BE49-F238E27FC236}">
+                <a16:creationId xmlns:a16="http://schemas.microsoft.com/office/drawing/2014/main" id="{0E7CCAEB-D84E-456D-3B6B-2E9573C73F98}"/>
+              </a:ext>
+            </a:extLst>
+          </p:cNvPr>
+          <p:cNvSpPr>
+            <a:spLocks noGrp="1"/>
+          </p:cNvSpPr>
+          <p:nvPr>
+            <p:ph type="title"/>
+          </p:nvPr>
+        </p:nvSpPr>
+        <p:spPr/>
+        <p:txBody>
+          <a:bodyPr>
+            <a:normAutofit/>
+          </a:bodyPr>
+          <a:lstStyle/>
+          <a:p>
+            <a:r>
+              <a:rPr lang="en-US" dirty="0"/>
+              <a:t>Past Opposition Practices (POP):</a:t>
+            </a:r>
+            <a:br>
+              <a:rPr lang="en-US" dirty="0"/>
+            </a:br>
+            <a:endParaRPr lang="en-US" dirty="0"/>
+          </a:p>
+        </p:txBody>
+      </p:sp>
+      <p:sp>
+        <p:nvSpPr>
+          <p:cNvPr id="3" name="Content Placeholder 2">
+            <a:extLst>
+              <a:ext uri="{FF2B5EF4-FFF2-40B4-BE49-F238E27FC236}">
+                <a16:creationId xmlns:a16="http://schemas.microsoft.com/office/drawing/2014/main" id="{0A5EC664-EFAD-501E-02EA-4124C835D47B}"/>
+              </a:ext>
+            </a:extLst>
+          </p:cNvPr>
+          <p:cNvSpPr>
+            <a:spLocks noGrp="1"/>
+          </p:cNvSpPr>
+          <p:nvPr>
+            <p:ph idx="1"/>
+          </p:nvPr>
+        </p:nvSpPr>
+        <p:spPr/>
+        <p:txBody>
+          <a:bodyPr/>
+          <a:lstStyle/>
+          <a:p>
+            <a:r>
+              <a:rPr lang="en-US" dirty="0"/>
+              <a:t>Find other examples, such as the Tiananmen Square protests, of past opposition practices and analyze them using the POP framework </a:t>
+            </a:r>
+          </a:p>
+        </p:txBody>
+      </p:sp>
+    </p:spTree>
+    <p:extLst>
+      <p:ext uri="{BB962C8B-B14F-4D97-AF65-F5344CB8AC3E}">
+        <p14:creationId xmlns:p14="http://schemas.microsoft.com/office/powerpoint/2010/main" val="2742933312"/>
+      </p:ext>
+    </p:extLst>
+  </p:cSld>
+  <p:clrMapOvr>
+    <a:masterClrMapping/>
+  </p:clrMapOvr>
+</p:sld>
+</file>
+
+<file path=ppt/slides/slide17.xml><?xml version="1.0" encoding="utf-8"?>
+<p:sld xmlns:a="http://schemas.openxmlformats.org/drawingml/2006/main" xmlns:r="http://schemas.openxmlformats.org/officeDocument/2006/relationships" xmlns:p="http://schemas.openxmlformats.org/presentationml/2006/main">
+  <p:cSld>
+    <p:spTree>
+      <p:nvGrpSpPr>
+        <p:cNvPr id="1" name=""/>
+        <p:cNvGrpSpPr/>
+        <p:nvPr/>
+      </p:nvGrpSpPr>
+      <p:grpSpPr>
+        <a:xfrm>
+          <a:off x="0" y="0"/>
+          <a:ext cx="0" cy="0"/>
+          <a:chOff x="0" y="0"/>
+          <a:chExt cx="0" cy="0"/>
+        </a:xfrm>
+      </p:grpSpPr>
+      <p:sp>
+        <p:nvSpPr>
+          <p:cNvPr id="2" name="Title 1">
+            <a:extLst>
+              <a:ext uri="{FF2B5EF4-FFF2-40B4-BE49-F238E27FC236}">
+                <a16:creationId xmlns:a16="http://schemas.microsoft.com/office/drawing/2014/main" id="{0E7CCAEB-D84E-456D-3B6B-2E9573C73F98}"/>
+              </a:ext>
+            </a:extLst>
+          </p:cNvPr>
+          <p:cNvSpPr>
+            <a:spLocks noGrp="1"/>
+          </p:cNvSpPr>
+          <p:nvPr>
+            <p:ph type="title"/>
+          </p:nvPr>
+        </p:nvSpPr>
+        <p:spPr/>
+        <p:txBody>
+          <a:bodyPr/>
+          <a:lstStyle/>
+          <a:p>
+            <a:r>
+              <a:rPr lang="en-US" dirty="0"/>
+              <a:t>Manipulability of Sources (MOSES)</a:t>
+            </a:r>
+          </a:p>
+        </p:txBody>
+      </p:sp>
+      <p:sp>
+        <p:nvSpPr>
+          <p:cNvPr id="3" name="Content Placeholder 2">
+            <a:extLst>
+              <a:ext uri="{FF2B5EF4-FFF2-40B4-BE49-F238E27FC236}">
+                <a16:creationId xmlns:a16="http://schemas.microsoft.com/office/drawing/2014/main" id="{0A5EC664-EFAD-501E-02EA-4124C835D47B}"/>
+              </a:ext>
+            </a:extLst>
+          </p:cNvPr>
+          <p:cNvSpPr>
+            <a:spLocks noGrp="1"/>
+          </p:cNvSpPr>
+          <p:nvPr>
+            <p:ph idx="1"/>
+          </p:nvPr>
+        </p:nvSpPr>
+        <p:spPr/>
+        <p:txBody>
+          <a:bodyPr/>
+          <a:lstStyle/>
+          <a:p>
+            <a:r>
+              <a:rPr lang="en-US" dirty="0"/>
+              <a:t>Which sources were used to spread the information?</a:t>
+            </a:r>
+          </a:p>
+          <a:p>
+            <a:endParaRPr lang="en-US" dirty="0"/>
+          </a:p>
+          <a:p>
+            <a:endParaRPr lang="en-US" dirty="0"/>
+          </a:p>
+        </p:txBody>
+      </p:sp>
+    </p:spTree>
+    <p:extLst>
+      <p:ext uri="{BB962C8B-B14F-4D97-AF65-F5344CB8AC3E}">
+        <p14:creationId xmlns:p14="http://schemas.microsoft.com/office/powerpoint/2010/main" val="1172918924"/>
+      </p:ext>
+    </p:extLst>
+  </p:cSld>
+  <p:clrMapOvr>
+    <a:masterClrMapping/>
+  </p:clrMapOvr>
+</p:sld>
+</file>
+
+<file path=ppt/slides/slide18.xml><?xml version="1.0" encoding="utf-8"?>
+<p:sld xmlns:a="http://schemas.openxmlformats.org/drawingml/2006/main" xmlns:r="http://schemas.openxmlformats.org/officeDocument/2006/relationships" xmlns:p="http://schemas.openxmlformats.org/presentationml/2006/main">
+  <p:cSld>
+    <p:spTree>
+      <p:nvGrpSpPr>
+        <p:cNvPr id="1" name=""/>
+        <p:cNvGrpSpPr/>
+        <p:nvPr/>
+      </p:nvGrpSpPr>
+      <p:grpSpPr>
+        <a:xfrm>
+          <a:off x="0" y="0"/>
+          <a:ext cx="0" cy="0"/>
+          <a:chOff x="0" y="0"/>
+          <a:chExt cx="0" cy="0"/>
+        </a:xfrm>
+      </p:grpSpPr>
+      <p:sp>
+        <p:nvSpPr>
+          <p:cNvPr id="2" name="Title 1">
+            <a:extLst>
+              <a:ext uri="{FF2B5EF4-FFF2-40B4-BE49-F238E27FC236}">
+                <a16:creationId xmlns:a16="http://schemas.microsoft.com/office/drawing/2014/main" id="{0E7CCAEB-D84E-456D-3B6B-2E9573C73F98}"/>
+              </a:ext>
+            </a:extLst>
+          </p:cNvPr>
+          <p:cNvSpPr>
+            <a:spLocks noGrp="1"/>
+          </p:cNvSpPr>
+          <p:nvPr>
+            <p:ph type="title"/>
+          </p:nvPr>
+        </p:nvSpPr>
+        <p:spPr/>
+        <p:txBody>
+          <a:bodyPr/>
+          <a:lstStyle/>
+          <a:p>
+            <a:r>
+              <a:rPr lang="en-US" dirty="0"/>
+              <a:t>Evaluation of Evidence (EVE)</a:t>
+            </a:r>
+          </a:p>
+        </p:txBody>
+      </p:sp>
+      <p:sp>
+        <p:nvSpPr>
+          <p:cNvPr id="3" name="Content Placeholder 2">
+            <a:extLst>
+              <a:ext uri="{FF2B5EF4-FFF2-40B4-BE49-F238E27FC236}">
+                <a16:creationId xmlns:a16="http://schemas.microsoft.com/office/drawing/2014/main" id="{0A5EC664-EFAD-501E-02EA-4124C835D47B}"/>
+              </a:ext>
+            </a:extLst>
+          </p:cNvPr>
+          <p:cNvSpPr>
+            <a:spLocks noGrp="1"/>
+          </p:cNvSpPr>
+          <p:nvPr>
+            <p:ph idx="1"/>
+          </p:nvPr>
+        </p:nvSpPr>
+        <p:spPr/>
+        <p:txBody>
+          <a:bodyPr/>
+          <a:lstStyle/>
+          <a:p>
+            <a:r>
+              <a:rPr lang="en-US" dirty="0"/>
+              <a:t>When to use it: Use when analyzing the validity and reliability of evidence presented.</a:t>
+            </a:r>
+          </a:p>
+          <a:p>
+            <a:r>
+              <a:rPr lang="en-US" dirty="0"/>
+              <a:t>Where to use it: Applicable in any analytical context requiring evidence validation.</a:t>
+            </a:r>
+          </a:p>
+          <a:p>
+            <a:r>
+              <a:rPr lang="en-US" dirty="0"/>
+              <a:t>Why to use it: Ensures the integrity and accuracy of the conclusions drawn from the evidence.</a:t>
+            </a:r>
+          </a:p>
+        </p:txBody>
+      </p:sp>
+    </p:spTree>
+    <p:extLst>
+      <p:ext uri="{BB962C8B-B14F-4D97-AF65-F5344CB8AC3E}">
+        <p14:creationId xmlns:p14="http://schemas.microsoft.com/office/powerpoint/2010/main" val="1396963370"/>
+      </p:ext>
+    </p:extLst>
+  </p:cSld>
+  <p:clrMapOvr>
+    <a:masterClrMapping/>
+  </p:clrMapOvr>
+</p:sld>
+</file>
+
+<file path=ppt/slides/slide19.xml><?xml version="1.0" encoding="utf-8"?>
+<p:sld xmlns:a="http://schemas.openxmlformats.org/drawingml/2006/main" xmlns:r="http://schemas.openxmlformats.org/officeDocument/2006/relationships" xmlns:p="http://schemas.openxmlformats.org/presentationml/2006/main">
+  <p:cSld>
+    <p:spTree>
+      <p:nvGrpSpPr>
+        <p:cNvPr id="1" name=""/>
+        <p:cNvGrpSpPr/>
+        <p:nvPr/>
+      </p:nvGrpSpPr>
+      <p:grpSpPr>
+        <a:xfrm>
+          <a:off x="0" y="0"/>
+          <a:ext cx="0" cy="0"/>
+          <a:chOff x="0" y="0"/>
+          <a:chExt cx="0" cy="0"/>
+        </a:xfrm>
+      </p:grpSpPr>
+      <p:sp>
+        <p:nvSpPr>
+          <p:cNvPr id="2" name="Title 1">
+            <a:extLst>
+              <a:ext uri="{FF2B5EF4-FFF2-40B4-BE49-F238E27FC236}">
+                <a16:creationId xmlns:a16="http://schemas.microsoft.com/office/drawing/2014/main" id="{0E7CCAEB-D84E-456D-3B6B-2E9573C73F98}"/>
+              </a:ext>
+            </a:extLst>
+          </p:cNvPr>
+          <p:cNvSpPr>
+            <a:spLocks noGrp="1"/>
+          </p:cNvSpPr>
+          <p:nvPr>
+            <p:ph type="title"/>
+          </p:nvPr>
+        </p:nvSpPr>
+        <p:spPr/>
+        <p:txBody>
+          <a:bodyPr/>
+          <a:lstStyle/>
+          <a:p>
+            <a:r>
+              <a:rPr lang="en-US" dirty="0"/>
+              <a:t>Apply</a:t>
+            </a:r>
+          </a:p>
+        </p:txBody>
+      </p:sp>
+      <p:sp>
+        <p:nvSpPr>
+          <p:cNvPr id="3" name="Content Placeholder 2">
+            <a:extLst>
+              <a:ext uri="{FF2B5EF4-FFF2-40B4-BE49-F238E27FC236}">
+                <a16:creationId xmlns:a16="http://schemas.microsoft.com/office/drawing/2014/main" id="{0A5EC664-EFAD-501E-02EA-4124C835D47B}"/>
+              </a:ext>
+            </a:extLst>
+          </p:cNvPr>
+          <p:cNvSpPr>
+            <a:spLocks noGrp="1"/>
+          </p:cNvSpPr>
+          <p:nvPr>
+            <p:ph idx="1"/>
+          </p:nvPr>
+        </p:nvSpPr>
+        <p:spPr/>
+        <p:txBody>
+          <a:bodyPr/>
+          <a:lstStyle/>
+          <a:p>
+            <a:r>
+              <a:rPr lang="en-US" dirty="0"/>
+              <a:t>See Practical Exercise Handout</a:t>
+            </a:r>
+          </a:p>
+          <a:p>
+            <a:r>
+              <a:rPr lang="en-US" dirty="0"/>
+              <a:t>Apply the Structured Analytic Techniques to the Handout</a:t>
+            </a:r>
           </a:p>
         </p:txBody>
       </p:sp>
@@ -7559,7 +9319,121 @@
 </p:sld>
 </file>
 
-<file path=ppt/slides/slide15.xml><?xml version="1.0" encoding="utf-8"?>
+<file path=ppt/slides/slide2.xml><?xml version="1.0" encoding="utf-8"?>
+<p:sld xmlns:a="http://schemas.openxmlformats.org/drawingml/2006/main" xmlns:r="http://schemas.openxmlformats.org/officeDocument/2006/relationships" xmlns:p="http://schemas.openxmlformats.org/presentationml/2006/main">
+  <p:cSld>
+    <p:spTree>
+      <p:nvGrpSpPr>
+        <p:cNvPr id="1" name=""/>
+        <p:cNvGrpSpPr/>
+        <p:nvPr/>
+      </p:nvGrpSpPr>
+      <p:grpSpPr>
+        <a:xfrm>
+          <a:off x="0" y="0"/>
+          <a:ext cx="0" cy="0"/>
+          <a:chOff x="0" y="0"/>
+          <a:chExt cx="0" cy="0"/>
+        </a:xfrm>
+      </p:grpSpPr>
+      <p:sp>
+        <p:nvSpPr>
+          <p:cNvPr id="2" name="Title 1">
+            <a:extLst>
+              <a:ext uri="{FF2B5EF4-FFF2-40B4-BE49-F238E27FC236}">
+                <a16:creationId xmlns:a16="http://schemas.microsoft.com/office/drawing/2014/main" id="{0E7CCAEB-D84E-456D-3B6B-2E9573C73F98}"/>
+              </a:ext>
+            </a:extLst>
+          </p:cNvPr>
+          <p:cNvSpPr>
+            <a:spLocks noGrp="1"/>
+          </p:cNvSpPr>
+          <p:nvPr>
+            <p:ph type="title"/>
+          </p:nvPr>
+        </p:nvSpPr>
+        <p:spPr/>
+        <p:txBody>
+          <a:bodyPr/>
+          <a:lstStyle/>
+          <a:p>
+            <a:r>
+              <a:rPr lang="en-US" dirty="0"/>
+              <a:t>Concrete Experience</a:t>
+            </a:r>
+          </a:p>
+        </p:txBody>
+      </p:sp>
+      <p:sp>
+        <p:nvSpPr>
+          <p:cNvPr id="4" name="Content Placeholder 3">
+            <a:extLst>
+              <a:ext uri="{FF2B5EF4-FFF2-40B4-BE49-F238E27FC236}">
+                <a16:creationId xmlns:a16="http://schemas.microsoft.com/office/drawing/2014/main" id="{6829B1A1-22E4-F78F-D9BF-6FBA3FDF0A5B}"/>
+              </a:ext>
+            </a:extLst>
+          </p:cNvPr>
+          <p:cNvSpPr>
+            <a:spLocks noGrp="1"/>
+          </p:cNvSpPr>
+          <p:nvPr>
+            <p:ph sz="half" idx="1"/>
+          </p:nvPr>
+        </p:nvSpPr>
+        <p:spPr/>
+        <p:txBody>
+          <a:bodyPr/>
+          <a:lstStyle/>
+          <a:p>
+            <a:r>
+              <a:rPr lang="en-US" dirty="0"/>
+              <a:t>The Earth is Flat	</a:t>
+            </a:r>
+          </a:p>
+        </p:txBody>
+      </p:sp>
+      <p:sp>
+        <p:nvSpPr>
+          <p:cNvPr id="5" name="Content Placeholder 4">
+            <a:extLst>
+              <a:ext uri="{FF2B5EF4-FFF2-40B4-BE49-F238E27FC236}">
+                <a16:creationId xmlns:a16="http://schemas.microsoft.com/office/drawing/2014/main" id="{5F4F656B-7E5D-5B6A-49BD-608B49861CF4}"/>
+              </a:ext>
+            </a:extLst>
+          </p:cNvPr>
+          <p:cNvSpPr>
+            <a:spLocks noGrp="1"/>
+          </p:cNvSpPr>
+          <p:nvPr>
+            <p:ph sz="half" idx="2"/>
+          </p:nvPr>
+        </p:nvSpPr>
+        <p:spPr/>
+        <p:txBody>
+          <a:bodyPr/>
+          <a:lstStyle/>
+          <a:p>
+            <a:r>
+              <a:rPr lang="en-US" dirty="0"/>
+              <a:t>The Earth is a Cube</a:t>
+            </a:r>
+          </a:p>
+        </p:txBody>
+      </p:sp>
+    </p:spTree>
+    <p:extLst>
+      <p:ext uri="{BB962C8B-B14F-4D97-AF65-F5344CB8AC3E}">
+        <p14:creationId xmlns:p14="http://schemas.microsoft.com/office/powerpoint/2010/main" val="2792640674"/>
+      </p:ext>
+    </p:extLst>
+  </p:cSld>
+  <p:clrMapOvr>
+    <a:masterClrMapping/>
+  </p:clrMapOvr>
+</p:sld>
+</file>
+
+<file path=ppt/slides/slide20.xml><?xml version="1.0" encoding="utf-8"?>
 <p:sld xmlns:a="http://schemas.openxmlformats.org/drawingml/2006/main" xmlns:r="http://schemas.openxmlformats.org/officeDocument/2006/relationships" xmlns:p="http://schemas.openxmlformats.org/presentationml/2006/main">
   <p:cSld>
     <p:bg>
@@ -7665,7 +9539,7 @@
           <a:lstStyle/>
           <a:p>
             <a:fld id="{86CB4B4D-7CA3-9044-876B-883B54F8677D}" type="slidenum">
-              <a:t>15</a:t>
+              <a:t>20</a:t>
             </a:fld>
             <a:endParaRPr/>
           </a:p>
@@ -7680,7 +9554,7 @@
 </p:sld>
 </file>
 
-<file path=ppt/slides/slide16.xml><?xml version="1.0" encoding="utf-8"?>
+<file path=ppt/slides/slide21.xml><?xml version="1.0" encoding="utf-8"?>
 <p:sld xmlns:a="http://schemas.openxmlformats.org/drawingml/2006/main" xmlns:r="http://schemas.openxmlformats.org/officeDocument/2006/relationships" xmlns:p="http://schemas.openxmlformats.org/presentationml/2006/main">
   <p:cSld>
     <p:spTree>
@@ -7778,7 +9652,7 @@
           <a:lstStyle/>
           <a:p>
             <a:fld id="{86CB4B4D-7CA3-9044-876B-883B54F8677D}" type="slidenum">
-              <a:t>16</a:t>
+              <a:t>21</a:t>
             </a:fld>
             <a:endParaRPr/>
           </a:p>
@@ -7804,7 +9678,7 @@
 </p:sld>
 </file>
 
-<file path=ppt/slides/slide17.xml><?xml version="1.0" encoding="utf-8"?>
+<file path=ppt/slides/slide22.xml><?xml version="1.0" encoding="utf-8"?>
 <p:sld xmlns:a="http://schemas.openxmlformats.org/drawingml/2006/main" xmlns:r="http://schemas.openxmlformats.org/officeDocument/2006/relationships" xmlns:p="http://schemas.openxmlformats.org/presentationml/2006/main">
   <p:cSld>
     <p:bg>
@@ -7962,7 +9836,7 @@
           <a:p>
             <a:fld id="{86CB4B4D-7CA3-9044-876B-883B54F8677D}" type="slidenum">
               <a:rPr/>
-              <a:t>17</a:t>
+              <a:t>22</a:t>
             </a:fld>
             <a:endParaRPr/>
           </a:p>
@@ -7988,7 +9862,7 @@
 </p:sld>
 </file>
 
-<file path=ppt/slides/slide18.xml><?xml version="1.0" encoding="utf-8"?>
+<file path=ppt/slides/slide23.xml><?xml version="1.0" encoding="utf-8"?>
 <p:sld xmlns:a="http://schemas.openxmlformats.org/drawingml/2006/main" xmlns:r="http://schemas.openxmlformats.org/officeDocument/2006/relationships" xmlns:p="http://schemas.openxmlformats.org/presentationml/2006/main">
   <p:cSld>
     <p:spTree>
@@ -8137,7 +10011,7 @@
           <a:lstStyle/>
           <a:p>
             <a:fld id="{86CB4B4D-7CA3-9044-876B-883B54F8677D}" type="slidenum">
-              <a:t>18</a:t>
+              <a:t>23</a:t>
             </a:fld>
             <a:endParaRPr/>
           </a:p>
@@ -8149,120 +10023,6 @@
     <a:masterClrMapping/>
   </p:clrMapOvr>
   <p:transition spd="med"/>
-</p:sld>
-</file>
-
-<file path=ppt/slides/slide2.xml><?xml version="1.0" encoding="utf-8"?>
-<p:sld xmlns:a="http://schemas.openxmlformats.org/drawingml/2006/main" xmlns:r="http://schemas.openxmlformats.org/officeDocument/2006/relationships" xmlns:p="http://schemas.openxmlformats.org/presentationml/2006/main">
-  <p:cSld>
-    <p:spTree>
-      <p:nvGrpSpPr>
-        <p:cNvPr id="1" name=""/>
-        <p:cNvGrpSpPr/>
-        <p:nvPr/>
-      </p:nvGrpSpPr>
-      <p:grpSpPr>
-        <a:xfrm>
-          <a:off x="0" y="0"/>
-          <a:ext cx="0" cy="0"/>
-          <a:chOff x="0" y="0"/>
-          <a:chExt cx="0" cy="0"/>
-        </a:xfrm>
-      </p:grpSpPr>
-      <p:sp>
-        <p:nvSpPr>
-          <p:cNvPr id="2" name="Title 1">
-            <a:extLst>
-              <a:ext uri="{FF2B5EF4-FFF2-40B4-BE49-F238E27FC236}">
-                <a16:creationId xmlns:a16="http://schemas.microsoft.com/office/drawing/2014/main" id="{0E7CCAEB-D84E-456D-3B6B-2E9573C73F98}"/>
-              </a:ext>
-            </a:extLst>
-          </p:cNvPr>
-          <p:cNvSpPr>
-            <a:spLocks noGrp="1"/>
-          </p:cNvSpPr>
-          <p:nvPr>
-            <p:ph type="title"/>
-          </p:nvPr>
-        </p:nvSpPr>
-        <p:spPr/>
-        <p:txBody>
-          <a:bodyPr/>
-          <a:lstStyle/>
-          <a:p>
-            <a:r>
-              <a:rPr lang="en-US" dirty="0"/>
-              <a:t>Concrete Experience</a:t>
-            </a:r>
-          </a:p>
-        </p:txBody>
-      </p:sp>
-      <p:sp>
-        <p:nvSpPr>
-          <p:cNvPr id="4" name="Content Placeholder 3">
-            <a:extLst>
-              <a:ext uri="{FF2B5EF4-FFF2-40B4-BE49-F238E27FC236}">
-                <a16:creationId xmlns:a16="http://schemas.microsoft.com/office/drawing/2014/main" id="{6829B1A1-22E4-F78F-D9BF-6FBA3FDF0A5B}"/>
-              </a:ext>
-            </a:extLst>
-          </p:cNvPr>
-          <p:cNvSpPr>
-            <a:spLocks noGrp="1"/>
-          </p:cNvSpPr>
-          <p:nvPr>
-            <p:ph sz="half" idx="1"/>
-          </p:nvPr>
-        </p:nvSpPr>
-        <p:spPr/>
-        <p:txBody>
-          <a:bodyPr/>
-          <a:lstStyle/>
-          <a:p>
-            <a:r>
-              <a:rPr lang="en-US" dirty="0"/>
-              <a:t>The Earth is Flat	</a:t>
-            </a:r>
-          </a:p>
-        </p:txBody>
-      </p:sp>
-      <p:sp>
-        <p:nvSpPr>
-          <p:cNvPr id="5" name="Content Placeholder 4">
-            <a:extLst>
-              <a:ext uri="{FF2B5EF4-FFF2-40B4-BE49-F238E27FC236}">
-                <a16:creationId xmlns:a16="http://schemas.microsoft.com/office/drawing/2014/main" id="{5F4F656B-7E5D-5B6A-49BD-608B49861CF4}"/>
-              </a:ext>
-            </a:extLst>
-          </p:cNvPr>
-          <p:cNvSpPr>
-            <a:spLocks noGrp="1"/>
-          </p:cNvSpPr>
-          <p:nvPr>
-            <p:ph sz="half" idx="2"/>
-          </p:nvPr>
-        </p:nvSpPr>
-        <p:spPr/>
-        <p:txBody>
-          <a:bodyPr/>
-          <a:lstStyle/>
-          <a:p>
-            <a:r>
-              <a:rPr lang="en-US" dirty="0"/>
-              <a:t>The Earth is a Cube</a:t>
-            </a:r>
-          </a:p>
-        </p:txBody>
-      </p:sp>
-    </p:spTree>
-    <p:extLst>
-      <p:ext uri="{BB962C8B-B14F-4D97-AF65-F5344CB8AC3E}">
-        <p14:creationId xmlns:p14="http://schemas.microsoft.com/office/powerpoint/2010/main" val="2792640674"/>
-      </p:ext>
-    </p:extLst>
-  </p:cSld>
-  <p:clrMapOvr>
-    <a:masterClrMapping/>
-  </p:clrMapOvr>
 </p:sld>
 </file>
 
@@ -8636,26 +10396,42 @@
           </a:p>
           <a:p>
             <a:r>
-              <a:rPr lang="en-US" dirty="0"/>
-              <a:t>MOM Framework: Motive, Opportunity, and Means </a:t>
-            </a:r>
-          </a:p>
-          <a:p>
-            <a:r>
-              <a:rPr lang="en-US" dirty="0"/>
-              <a:t>POP Framework: Past Opposition Practices </a:t>
-            </a:r>
-          </a:p>
-          <a:p>
-            <a:r>
-              <a:rPr lang="en-US" dirty="0"/>
-              <a:t>MOSES Framework: Manipulability of Sources </a:t>
-            </a:r>
-          </a:p>
-          <a:p>
-            <a:r>
-              <a:rPr lang="en-US" dirty="0"/>
-              <a:t>EVE Framework: Evaluation of Evidence</a:t>
+              <a:rPr lang="en-US" b="1" dirty="0"/>
+              <a:t>MOM</a:t>
+            </a:r>
+            <a:r>
+              <a:rPr lang="en-US" dirty="0"/>
+              <a:t> : Motive, Opportunity, and Means </a:t>
+            </a:r>
+          </a:p>
+          <a:p>
+            <a:r>
+              <a:rPr lang="en-US" b="1" dirty="0"/>
+              <a:t>POP</a:t>
+            </a:r>
+            <a:r>
+              <a:rPr lang="en-US" dirty="0"/>
+              <a:t> : Past Opposition Practices </a:t>
+            </a:r>
+          </a:p>
+          <a:p>
+            <a:r>
+              <a:rPr lang="en-US" b="1" dirty="0"/>
+              <a:t>MOSES</a:t>
+            </a:r>
+            <a:r>
+              <a:rPr lang="en-US" dirty="0"/>
+              <a:t> : Manipulability of Sources </a:t>
+            </a:r>
+          </a:p>
+          <a:p>
+            <a:r>
+              <a:rPr lang="en-US" b="1" dirty="0"/>
+              <a:t>EVE</a:t>
+            </a:r>
+            <a:r>
+              <a:rPr lang="en-US" dirty="0"/>
+              <a:t> : Evaluation of Evidence</a:t>
             </a:r>
           </a:p>
         </p:txBody>
@@ -8743,43 +10519,19 @@
           <a:p>
             <a:r>
               <a:rPr lang="en-US" dirty="0"/>
-              <a:t>1. Present examples of different motives, opportunities, and means in influence operations:</a:t>
-            </a:r>
-          </a:p>
-          <a:p>
-            <a:r>
-              <a:rPr lang="en-US" dirty="0"/>
-              <a:t>    - Example: Political gains from spreading false allegation about rival.</a:t>
-            </a:r>
-          </a:p>
-          <a:p>
-            <a:r>
-              <a:rPr lang="en-US" dirty="0"/>
-              <a:t>    - Example: Using social media channels to disseminate false information.</a:t>
-            </a:r>
-          </a:p>
-          <a:p>
-            <a:r>
-              <a:rPr lang="en-US" dirty="0"/>
-              <a:t>2. Discuss how to assess these components in various scenarios:</a:t>
-            </a:r>
-          </a:p>
-          <a:p>
-            <a:r>
-              <a:rPr lang="en-US" dirty="0"/>
-              <a:t>    - Identify the goals and motives behind the information.</a:t>
-            </a:r>
-          </a:p>
-          <a:p>
-            <a:r>
-              <a:rPr lang="en-US" dirty="0"/>
-              <a:t>    - Evaluate the channels available for spreading misinformation.</a:t>
-            </a:r>
-          </a:p>
-          <a:p>
-            <a:r>
-              <a:rPr lang="en-US" dirty="0"/>
-              <a:t>    - Assess the risks and costs involved in the deception.</a:t>
+              <a:t>When to use it: Use when evaluating the likelihood of a source having the motive and means to produce misinformation.</a:t>
+            </a:r>
+          </a:p>
+          <a:p>
+            <a:r>
+              <a:rPr lang="en-US" dirty="0"/>
+              <a:t>Where to use it: Applicable in scenarios where identifying the intent behind information is crucial.</a:t>
+            </a:r>
+          </a:p>
+          <a:p>
+            <a:r>
+              <a:rPr lang="en-US" dirty="0"/>
+              <a:t>Why to use it: Helps in understanding the potential reasons and capabilities behind the creation of misinformation.</a:t>
             </a:r>
           </a:p>
         </p:txBody>
@@ -8863,7 +10615,28 @@
           <a:bodyPr/>
           <a:lstStyle/>
           <a:p>
-            <a:endParaRPr lang="en-US"/>
+            <a:r>
+              <a:rPr lang="en-US" dirty="0"/>
+              <a:t>When to use it: Use when historical context of misinformation from an adversary is available.</a:t>
+            </a:r>
+          </a:p>
+          <a:p>
+            <a:r>
+              <a:rPr lang="en-US" dirty="0"/>
+              <a:t>Where to use it: Useful in intelligence and strategic analysis settings.</a:t>
+            </a:r>
+          </a:p>
+          <a:p>
+            <a:r>
+              <a:rPr lang="en-US" dirty="0"/>
+              <a:t>Why to use it: Helps predict future misinformation strategies based on past behavior.</a:t>
+            </a:r>
+          </a:p>
+          <a:p>
+            <a:pPr marL="0" indent="0">
+              <a:buNone/>
+            </a:pPr>
+            <a:endParaRPr lang="en-US" dirty="0"/>
           </a:p>
         </p:txBody>
       </p:sp>
@@ -8946,7 +10719,22 @@
           <a:bodyPr/>
           <a:lstStyle/>
           <a:p>
-            <a:endParaRPr lang="en-US"/>
+            <a:r>
+              <a:rPr lang="en-US" dirty="0"/>
+              <a:t>When to use it: Use when assessing the reliability and susceptibility of sources to manipulation.</a:t>
+            </a:r>
+          </a:p>
+          <a:p>
+            <a:r>
+              <a:rPr lang="en-US" dirty="0"/>
+              <a:t>Where to use it: Relevant in journalistic and intelligence analysis.</a:t>
+            </a:r>
+          </a:p>
+          <a:p>
+            <a:r>
+              <a:rPr lang="en-US" dirty="0"/>
+              <a:t>Why to use it: Ensures the credibility of the information and reduces the risk of accepting manipulated data.</a:t>
+            </a:r>
           </a:p>
         </p:txBody>
       </p:sp>

</xml_diff>